<commit_message>
Add proof that SubscribableMutableid implementation is broken
</commit_message>
<xml_diff>
--- a/docs/architecture.pptx
+++ b/docs/architecture.pptx
@@ -261,7 +261,7 @@
           <a:p>
             <a:fld id="{0A05F3B5-6F50-4323-80C0-955EB0110BAC}" type="datetimeFigureOut">
               <a:rPr lang="en-US" smtClean="0"/>
-              <a:t>11/27/2017</a:t>
+              <a:t>11/29/2017</a:t>
             </a:fld>
             <a:endParaRPr lang="en-US"/>
           </a:p>
@@ -431,7 +431,7 @@
           <a:p>
             <a:fld id="{0A05F3B5-6F50-4323-80C0-955EB0110BAC}" type="datetimeFigureOut">
               <a:rPr lang="en-US" smtClean="0"/>
-              <a:t>11/27/2017</a:t>
+              <a:t>11/29/2017</a:t>
             </a:fld>
             <a:endParaRPr lang="en-US"/>
           </a:p>
@@ -611,7 +611,7 @@
           <a:p>
             <a:fld id="{0A05F3B5-6F50-4323-80C0-955EB0110BAC}" type="datetimeFigureOut">
               <a:rPr lang="en-US" smtClean="0"/>
-              <a:t>11/27/2017</a:t>
+              <a:t>11/29/2017</a:t>
             </a:fld>
             <a:endParaRPr lang="en-US"/>
           </a:p>
@@ -781,7 +781,7 @@
           <a:p>
             <a:fld id="{0A05F3B5-6F50-4323-80C0-955EB0110BAC}" type="datetimeFigureOut">
               <a:rPr lang="en-US" smtClean="0"/>
-              <a:t>11/27/2017</a:t>
+              <a:t>11/29/2017</a:t>
             </a:fld>
             <a:endParaRPr lang="en-US"/>
           </a:p>
@@ -1025,7 +1025,7 @@
           <a:p>
             <a:fld id="{0A05F3B5-6F50-4323-80C0-955EB0110BAC}" type="datetimeFigureOut">
               <a:rPr lang="en-US" smtClean="0"/>
-              <a:t>11/27/2017</a:t>
+              <a:t>11/29/2017</a:t>
             </a:fld>
             <a:endParaRPr lang="en-US"/>
           </a:p>
@@ -1257,7 +1257,7 @@
           <a:p>
             <a:fld id="{0A05F3B5-6F50-4323-80C0-955EB0110BAC}" type="datetimeFigureOut">
               <a:rPr lang="en-US" smtClean="0"/>
-              <a:t>11/27/2017</a:t>
+              <a:t>11/29/2017</a:t>
             </a:fld>
             <a:endParaRPr lang="en-US"/>
           </a:p>
@@ -1624,7 +1624,7 @@
           <a:p>
             <a:fld id="{0A05F3B5-6F50-4323-80C0-955EB0110BAC}" type="datetimeFigureOut">
               <a:rPr lang="en-US" smtClean="0"/>
-              <a:t>11/27/2017</a:t>
+              <a:t>11/29/2017</a:t>
             </a:fld>
             <a:endParaRPr lang="en-US"/>
           </a:p>
@@ -1742,7 +1742,7 @@
           <a:p>
             <a:fld id="{0A05F3B5-6F50-4323-80C0-955EB0110BAC}" type="datetimeFigureOut">
               <a:rPr lang="en-US" smtClean="0"/>
-              <a:t>11/27/2017</a:t>
+              <a:t>11/29/2017</a:t>
             </a:fld>
             <a:endParaRPr lang="en-US"/>
           </a:p>
@@ -1837,7 +1837,7 @@
           <a:p>
             <a:fld id="{0A05F3B5-6F50-4323-80C0-955EB0110BAC}" type="datetimeFigureOut">
               <a:rPr lang="en-US" smtClean="0"/>
-              <a:t>11/27/2017</a:t>
+              <a:t>11/29/2017</a:t>
             </a:fld>
             <a:endParaRPr lang="en-US"/>
           </a:p>
@@ -2114,7 +2114,7 @@
           <a:p>
             <a:fld id="{0A05F3B5-6F50-4323-80C0-955EB0110BAC}" type="datetimeFigureOut">
               <a:rPr lang="en-US" smtClean="0"/>
-              <a:t>11/27/2017</a:t>
+              <a:t>11/29/2017</a:t>
             </a:fld>
             <a:endParaRPr lang="en-US"/>
           </a:p>
@@ -2371,7 +2371,7 @@
           <a:p>
             <a:fld id="{0A05F3B5-6F50-4323-80C0-955EB0110BAC}" type="datetimeFigureOut">
               <a:rPr lang="en-US" smtClean="0"/>
-              <a:t>11/27/2017</a:t>
+              <a:t>11/29/2017</a:t>
             </a:fld>
             <a:endParaRPr lang="en-US"/>
           </a:p>
@@ -2584,7 +2584,7 @@
           <a:p>
             <a:fld id="{0A05F3B5-6F50-4323-80C0-955EB0110BAC}" type="datetimeFigureOut">
               <a:rPr lang="en-US" smtClean="0"/>
-              <a:t>11/27/2017</a:t>
+              <a:t>11/29/2017</a:t>
             </a:fld>
             <a:endParaRPr lang="en-US"/>
           </a:p>
@@ -6608,7 +6608,7 @@
         <p:spPr>
           <a:xfrm>
             <a:off x="20936399" y="19469967"/>
-            <a:ext cx="2011080" cy="3099124"/>
+            <a:ext cx="2011080" cy="2997240"/>
           </a:xfrm>
           <a:prstGeom prst="straightConnector1">
             <a:avLst/>
@@ -6649,8 +6649,8 @@
         </p:nvSpPr>
         <p:spPr>
           <a:xfrm>
-            <a:off x="21759196" y="22569091"/>
-            <a:ext cx="2376566" cy="707886"/>
+            <a:off x="21759196" y="22467207"/>
+            <a:ext cx="2376566" cy="830997"/>
           </a:xfrm>
           <a:prstGeom prst="rect">
             <a:avLst/>
@@ -6760,6 +6760,53 @@
               <a:rPr lang="en-US" sz="400" dirty="0"/>
               <a:t> method that DATA_UI_BRIDGE or other objects can subscribe to</a:t>
             </a:r>
+          </a:p>
+          <a:p>
+            <a:pPr marL="287338" lvl="1" indent="-115888">
+              <a:buFont typeface="Arial" panose="020B0604020202020204" pitchFamily="34" charset="0"/>
+              <a:buChar char="•"/>
+            </a:pPr>
+            <a:r>
+              <a:rPr lang="en-US" sz="400" dirty="0"/>
+              <a:t>This method publishes the entire </a:t>
+            </a:r>
+            <a:r>
+              <a:rPr lang="en-US" sz="400" dirty="0" err="1"/>
+              <a:t>tree_data</a:t>
+            </a:r>
+            <a:r>
+              <a:rPr lang="en-US" sz="400" dirty="0"/>
+              <a:t>, or </a:t>
+            </a:r>
+            <a:r>
+              <a:rPr lang="en-US" sz="400" dirty="0" err="1"/>
+              <a:t>tree_location_data</a:t>
+            </a:r>
+            <a:r>
+              <a:rPr lang="en-US" sz="400" dirty="0"/>
+              <a:t>, </a:t>
+            </a:r>
+            <a:r>
+              <a:rPr lang="en-US" sz="400" dirty="0" err="1"/>
+              <a:t>tree_user_data</a:t>
+            </a:r>
+            <a:r>
+              <a:rPr lang="en-US" sz="400" dirty="0"/>
+              <a:t> value etc. along with the </a:t>
+            </a:r>
+            <a:r>
+              <a:rPr lang="en-US" sz="400" dirty="0" err="1"/>
+              <a:t>data_type</a:t>
+            </a:r>
+            <a:r>
+              <a:rPr lang="en-US" sz="400" dirty="0"/>
+              <a:t>, and </a:t>
+            </a:r>
+            <a:r>
+              <a:rPr lang="en-US" sz="400" dirty="0" err="1"/>
+              <a:t>objectId</a:t>
+            </a:r>
+            <a:endParaRPr lang="en-US" sz="400" dirty="0"/>
           </a:p>
           <a:p>
             <a:pPr marL="171450" indent="-171450">
@@ -9374,7 +9421,7 @@
         <p:spPr>
           <a:xfrm>
             <a:off x="20107537" y="21201246"/>
-            <a:ext cx="2839942" cy="1367845"/>
+            <a:ext cx="2839942" cy="1265961"/>
           </a:xfrm>
           <a:prstGeom prst="straightConnector1">
             <a:avLst/>
@@ -9606,8 +9653,8 @@
         </p:nvCxnSpPr>
         <p:spPr>
           <a:xfrm>
-            <a:off x="22947479" y="23276977"/>
-            <a:ext cx="0" cy="35368"/>
+            <a:off x="22947479" y="23298204"/>
+            <a:ext cx="0" cy="14141"/>
           </a:xfrm>
           <a:prstGeom prst="line">
             <a:avLst/>
@@ -10322,7 +10369,7 @@
         </p:nvSpPr>
         <p:spPr>
           <a:xfrm rot="10800000">
-            <a:off x="18305105" y="23920342"/>
+            <a:off x="18269078" y="23923111"/>
             <a:ext cx="369332" cy="655307"/>
           </a:xfrm>
           <a:prstGeom prst="rect">
@@ -10506,7 +10553,7 @@
           </a:xfrm>
           <a:prstGeom prst="bentConnector3">
             <a:avLst>
-              <a:gd name="adj1" fmla="val 725804"/>
+              <a:gd name="adj1" fmla="val 1079728"/>
             </a:avLst>
           </a:prstGeom>
           <a:ln w="3175">
@@ -10545,8 +10592,8 @@
         </p:nvSpPr>
         <p:spPr>
           <a:xfrm>
-            <a:off x="18630706" y="24066152"/>
-            <a:ext cx="307777" cy="562763"/>
+            <a:off x="18582623" y="24106066"/>
+            <a:ext cx="369332" cy="562763"/>
           </a:xfrm>
           <a:prstGeom prst="rect">
             <a:avLst/>
@@ -10565,7 +10612,7 @@
                   <a:schemeClr val="accent6"/>
                 </a:solidFill>
               </a:rPr>
-              <a:t>Add </a:t>
+              <a:t>Publishes via </a:t>
             </a:r>
             <a:r>
               <a:rPr lang="en-US" sz="400" dirty="0" err="1">
@@ -10573,7 +10620,7 @@
                   <a:schemeClr val="accent6"/>
                 </a:solidFill>
               </a:rPr>
-              <a:t>propertyName</a:t>
+              <a:t>onUpdate</a:t>
             </a:r>
             <a:r>
               <a:rPr lang="en-US" sz="400" dirty="0">
@@ -10581,7 +10628,7 @@
                   <a:schemeClr val="accent6"/>
                 </a:solidFill>
               </a:rPr>
-              <a:t> on </a:t>
+              <a:t> the entire .</a:t>
             </a:r>
             <a:r>
               <a:rPr lang="en-US" sz="400" dirty="0" err="1">
@@ -10589,7 +10636,7 @@
                   <a:schemeClr val="accent6"/>
                 </a:solidFill>
               </a:rPr>
-              <a:t>Iupdates</a:t>
+              <a:t>val</a:t>
             </a:r>
             <a:r>
               <a:rPr lang="en-US" sz="400" dirty="0">
@@ -10597,7 +10644,7 @@
                   <a:schemeClr val="accent6"/>
                 </a:solidFill>
               </a:rPr>
-              <a:t> Object</a:t>
+              <a:t>() of the tree</a:t>
             </a:r>
           </a:p>
         </p:txBody>
@@ -10625,7 +10672,7 @@
           </a:xfrm>
           <a:prstGeom prst="bentConnector3">
             <a:avLst>
-              <a:gd name="adj1" fmla="val -7650602"/>
+              <a:gd name="adj1" fmla="val -9460007"/>
             </a:avLst>
           </a:prstGeom>
           <a:ln w="9525">
@@ -10668,8 +10715,8 @@
         </p:nvCxnSpPr>
         <p:spPr>
           <a:xfrm rot="10800000" flipH="1">
-            <a:off x="19235884" y="22923034"/>
-            <a:ext cx="2523311" cy="1167796"/>
+            <a:off x="19235884" y="22882706"/>
+            <a:ext cx="2523311" cy="1208124"/>
           </a:xfrm>
           <a:prstGeom prst="bentConnector3">
             <a:avLst>
@@ -10788,7 +10835,7 @@
         <p:spPr>
           <a:xfrm flipH="1" flipV="1">
             <a:off x="17201837" y="22454526"/>
-            <a:ext cx="4557359" cy="468508"/>
+            <a:ext cx="4557359" cy="428180"/>
           </a:xfrm>
           <a:prstGeom prst="straightConnector1">
             <a:avLst/>

</xml_diff>

<commit_message>
Start Unit tests for TreeLoader
</commit_message>
<xml_diff>
--- a/docs/architecture.pptx
+++ b/docs/architecture.pptx
@@ -6,8 +6,9 @@
   </p:sldMasterIdLst>
   <p:sldIdLst>
     <p:sldId id="256" r:id="rId2"/>
-    <p:sldId id="258" r:id="rId3"/>
-    <p:sldId id="257" r:id="rId4"/>
+    <p:sldId id="259" r:id="rId3"/>
+    <p:sldId id="258" r:id="rId4"/>
+    <p:sldId id="257" r:id="rId5"/>
   </p:sldIdLst>
   <p:sldSz cx="51206400" cy="51206400"/>
   <p:notesSz cx="6858000" cy="9144000"/>
@@ -261,7 +262,7 @@
           <a:p>
             <a:fld id="{0A05F3B5-6F50-4323-80C0-955EB0110BAC}" type="datetimeFigureOut">
               <a:rPr lang="en-US" smtClean="0"/>
-              <a:t>11/29/2017</a:t>
+              <a:t>12/6/2017</a:t>
             </a:fld>
             <a:endParaRPr lang="en-US"/>
           </a:p>
@@ -431,7 +432,7 @@
           <a:p>
             <a:fld id="{0A05F3B5-6F50-4323-80C0-955EB0110BAC}" type="datetimeFigureOut">
               <a:rPr lang="en-US" smtClean="0"/>
-              <a:t>11/29/2017</a:t>
+              <a:t>12/6/2017</a:t>
             </a:fld>
             <a:endParaRPr lang="en-US"/>
           </a:p>
@@ -611,7 +612,7 @@
           <a:p>
             <a:fld id="{0A05F3B5-6F50-4323-80C0-955EB0110BAC}" type="datetimeFigureOut">
               <a:rPr lang="en-US" smtClean="0"/>
-              <a:t>11/29/2017</a:t>
+              <a:t>12/6/2017</a:t>
             </a:fld>
             <a:endParaRPr lang="en-US"/>
           </a:p>
@@ -781,7 +782,7 @@
           <a:p>
             <a:fld id="{0A05F3B5-6F50-4323-80C0-955EB0110BAC}" type="datetimeFigureOut">
               <a:rPr lang="en-US" smtClean="0"/>
-              <a:t>11/29/2017</a:t>
+              <a:t>12/6/2017</a:t>
             </a:fld>
             <a:endParaRPr lang="en-US"/>
           </a:p>
@@ -1025,7 +1026,7 @@
           <a:p>
             <a:fld id="{0A05F3B5-6F50-4323-80C0-955EB0110BAC}" type="datetimeFigureOut">
               <a:rPr lang="en-US" smtClean="0"/>
-              <a:t>11/29/2017</a:t>
+              <a:t>12/6/2017</a:t>
             </a:fld>
             <a:endParaRPr lang="en-US"/>
           </a:p>
@@ -1257,7 +1258,7 @@
           <a:p>
             <a:fld id="{0A05F3B5-6F50-4323-80C0-955EB0110BAC}" type="datetimeFigureOut">
               <a:rPr lang="en-US" smtClean="0"/>
-              <a:t>11/29/2017</a:t>
+              <a:t>12/6/2017</a:t>
             </a:fld>
             <a:endParaRPr lang="en-US"/>
           </a:p>
@@ -1624,7 +1625,7 @@
           <a:p>
             <a:fld id="{0A05F3B5-6F50-4323-80C0-955EB0110BAC}" type="datetimeFigureOut">
               <a:rPr lang="en-US" smtClean="0"/>
-              <a:t>11/29/2017</a:t>
+              <a:t>12/6/2017</a:t>
             </a:fld>
             <a:endParaRPr lang="en-US"/>
           </a:p>
@@ -1742,7 +1743,7 @@
           <a:p>
             <a:fld id="{0A05F3B5-6F50-4323-80C0-955EB0110BAC}" type="datetimeFigureOut">
               <a:rPr lang="en-US" smtClean="0"/>
-              <a:t>11/29/2017</a:t>
+              <a:t>12/6/2017</a:t>
             </a:fld>
             <a:endParaRPr lang="en-US"/>
           </a:p>
@@ -1837,7 +1838,7 @@
           <a:p>
             <a:fld id="{0A05F3B5-6F50-4323-80C0-955EB0110BAC}" type="datetimeFigureOut">
               <a:rPr lang="en-US" smtClean="0"/>
-              <a:t>11/29/2017</a:t>
+              <a:t>12/6/2017</a:t>
             </a:fld>
             <a:endParaRPr lang="en-US"/>
           </a:p>
@@ -2114,7 +2115,7 @@
           <a:p>
             <a:fld id="{0A05F3B5-6F50-4323-80C0-955EB0110BAC}" type="datetimeFigureOut">
               <a:rPr lang="en-US" smtClean="0"/>
-              <a:t>11/29/2017</a:t>
+              <a:t>12/6/2017</a:t>
             </a:fld>
             <a:endParaRPr lang="en-US"/>
           </a:p>
@@ -2371,7 +2372,7 @@
           <a:p>
             <a:fld id="{0A05F3B5-6F50-4323-80C0-955EB0110BAC}" type="datetimeFigureOut">
               <a:rPr lang="en-US" smtClean="0"/>
-              <a:t>11/29/2017</a:t>
+              <a:t>12/6/2017</a:t>
             </a:fld>
             <a:endParaRPr lang="en-US"/>
           </a:p>
@@ -2584,7 +2585,7 @@
           <a:p>
             <a:fld id="{0A05F3B5-6F50-4323-80C0-955EB0110BAC}" type="datetimeFigureOut">
               <a:rPr lang="en-US" smtClean="0"/>
-              <a:t>11/29/2017</a:t>
+              <a:t>12/6/2017</a:t>
             </a:fld>
             <a:endParaRPr lang="en-US"/>
           </a:p>
@@ -5290,6 +5291,41 @@
           </a:p>
         </p:txBody>
       </p:sp>
+      <p:sp>
+        <p:nvSpPr>
+          <p:cNvPr id="2" name="TextBox 1">
+            <a:extLst>
+              <a:ext uri="{FF2B5EF4-FFF2-40B4-BE49-F238E27FC236}">
+                <a16:creationId xmlns:a16="http://schemas.microsoft.com/office/drawing/2014/main" id="{EA370618-05C0-4FEC-875C-A3BF933428FD}"/>
+              </a:ext>
+            </a:extLst>
+          </p:cNvPr>
+          <p:cNvSpPr txBox="1"/>
+          <p:nvPr/>
+        </p:nvSpPr>
+        <p:spPr>
+          <a:xfrm>
+            <a:off x="4921135" y="11371811"/>
+            <a:ext cx="10440785" cy="369332"/>
+          </a:xfrm>
+          <a:prstGeom prst="rect">
+            <a:avLst/>
+          </a:prstGeom>
+          <a:noFill/>
+        </p:spPr>
+        <p:txBody>
+          <a:bodyPr wrap="square" rtlCol="0">
+            <a:spAutoFit/>
+          </a:bodyPr>
+          <a:lstStyle/>
+          <a:p>
+            <a:r>
+              <a:rPr lang="en-US"/>
+              <a:t>Data_LOADER</a:t>
+            </a:r>
+          </a:p>
+        </p:txBody>
+      </p:sp>
     </p:spTree>
     <p:extLst>
       <p:ext uri="{BB962C8B-B14F-4D97-AF65-F5344CB8AC3E}">
@@ -5304,6 +5340,86 @@
 </file>
 
 <file path=ppt/slides/slide2.xml><?xml version="1.0" encoding="utf-8"?>
+<p:sld xmlns:a="http://schemas.openxmlformats.org/drawingml/2006/main" xmlns:r="http://schemas.openxmlformats.org/officeDocument/2006/relationships" xmlns:p="http://schemas.openxmlformats.org/presentationml/2006/main">
+  <p:cSld>
+    <p:spTree>
+      <p:nvGrpSpPr>
+        <p:cNvPr id="1" name=""/>
+        <p:cNvGrpSpPr/>
+        <p:nvPr/>
+      </p:nvGrpSpPr>
+      <p:grpSpPr>
+        <a:xfrm>
+          <a:off x="0" y="0"/>
+          <a:ext cx="0" cy="0"/>
+          <a:chOff x="0" y="0"/>
+          <a:chExt cx="0" cy="0"/>
+        </a:xfrm>
+      </p:grpSpPr>
+      <p:sp>
+        <p:nvSpPr>
+          <p:cNvPr id="2" name="Title 1">
+            <a:extLst>
+              <a:ext uri="{FF2B5EF4-FFF2-40B4-BE49-F238E27FC236}">
+                <a16:creationId xmlns:a16="http://schemas.microsoft.com/office/drawing/2014/main" id="{C3C78CE3-64B4-4FE2-A104-2D91ED6136F0}"/>
+              </a:ext>
+            </a:extLst>
+          </p:cNvPr>
+          <p:cNvSpPr>
+            <a:spLocks noGrp="1"/>
+          </p:cNvSpPr>
+          <p:nvPr>
+            <p:ph type="title"/>
+          </p:nvPr>
+        </p:nvSpPr>
+        <p:spPr/>
+        <p:txBody>
+          <a:bodyPr/>
+          <a:lstStyle/>
+          <a:p>
+            <a:endParaRPr lang="en-US"/>
+          </a:p>
+        </p:txBody>
+      </p:sp>
+      <p:sp>
+        <p:nvSpPr>
+          <p:cNvPr id="3" name="Content Placeholder 2">
+            <a:extLst>
+              <a:ext uri="{FF2B5EF4-FFF2-40B4-BE49-F238E27FC236}">
+                <a16:creationId xmlns:a16="http://schemas.microsoft.com/office/drawing/2014/main" id="{D8740FB9-1276-4E68-A390-991A10158EC7}"/>
+              </a:ext>
+            </a:extLst>
+          </p:cNvPr>
+          <p:cNvSpPr>
+            <a:spLocks noGrp="1"/>
+          </p:cNvSpPr>
+          <p:nvPr>
+            <p:ph idx="1"/>
+          </p:nvPr>
+        </p:nvSpPr>
+        <p:spPr/>
+        <p:txBody>
+          <a:bodyPr/>
+          <a:lstStyle/>
+          <a:p>
+            <a:endParaRPr lang="en-US"/>
+          </a:p>
+        </p:txBody>
+      </p:sp>
+    </p:spTree>
+    <p:extLst>
+      <p:ext uri="{BB962C8B-B14F-4D97-AF65-F5344CB8AC3E}">
+        <p14:creationId xmlns:p14="http://schemas.microsoft.com/office/powerpoint/2010/main" val="570421381"/>
+      </p:ext>
+    </p:extLst>
+  </p:cSld>
+  <p:clrMapOvr>
+    <a:masterClrMapping/>
+  </p:clrMapOvr>
+</p:sld>
+</file>
+
+<file path=ppt/slides/slide3.xml><?xml version="1.0" encoding="utf-8"?>
 <p:sld xmlns:a="http://schemas.openxmlformats.org/drawingml/2006/main" xmlns:r="http://schemas.openxmlformats.org/officeDocument/2006/relationships" xmlns:p="http://schemas.openxmlformats.org/presentationml/2006/main">
   <p:cSld>
     <p:spTree>
@@ -12156,7 +12272,7 @@
 </p:sld>
 </file>
 
-<file path=ppt/slides/slide3.xml><?xml version="1.0" encoding="utf-8"?>
+<file path=ppt/slides/slide4.xml><?xml version="1.0" encoding="utf-8"?>
 <p:sld xmlns:a="http://schemas.openxmlformats.org/drawingml/2006/main" xmlns:r="http://schemas.openxmlformats.org/officeDocument/2006/relationships" xmlns:p="http://schemas.openxmlformats.org/presentationml/2006/main">
   <p:cSld>
     <p:spTree>

</xml_diff>

<commit_message>
rename sigmaNodeHandler to sigmaNodesUpdater
</commit_message>
<xml_diff>
--- a/docs/architecture.pptx
+++ b/docs/architecture.pptx
@@ -262,7 +262,7 @@
           <a:p>
             <a:fld id="{0A05F3B5-6F50-4323-80C0-955EB0110BAC}" type="datetimeFigureOut">
               <a:rPr lang="en-US" smtClean="0"/>
-              <a:t>12/8/2017</a:t>
+              <a:t>12/9/2017</a:t>
             </a:fld>
             <a:endParaRPr lang="en-US"/>
           </a:p>
@@ -432,7 +432,7 @@
           <a:p>
             <a:fld id="{0A05F3B5-6F50-4323-80C0-955EB0110BAC}" type="datetimeFigureOut">
               <a:rPr lang="en-US" smtClean="0"/>
-              <a:t>12/8/2017</a:t>
+              <a:t>12/9/2017</a:t>
             </a:fld>
             <a:endParaRPr lang="en-US"/>
           </a:p>
@@ -612,7 +612,7 @@
           <a:p>
             <a:fld id="{0A05F3B5-6F50-4323-80C0-955EB0110BAC}" type="datetimeFigureOut">
               <a:rPr lang="en-US" smtClean="0"/>
-              <a:t>12/8/2017</a:t>
+              <a:t>12/9/2017</a:t>
             </a:fld>
             <a:endParaRPr lang="en-US"/>
           </a:p>
@@ -782,7 +782,7 @@
           <a:p>
             <a:fld id="{0A05F3B5-6F50-4323-80C0-955EB0110BAC}" type="datetimeFigureOut">
               <a:rPr lang="en-US" smtClean="0"/>
-              <a:t>12/8/2017</a:t>
+              <a:t>12/9/2017</a:t>
             </a:fld>
             <a:endParaRPr lang="en-US"/>
           </a:p>
@@ -1026,7 +1026,7 @@
           <a:p>
             <a:fld id="{0A05F3B5-6F50-4323-80C0-955EB0110BAC}" type="datetimeFigureOut">
               <a:rPr lang="en-US" smtClean="0"/>
-              <a:t>12/8/2017</a:t>
+              <a:t>12/9/2017</a:t>
             </a:fld>
             <a:endParaRPr lang="en-US"/>
           </a:p>
@@ -1258,7 +1258,7 @@
           <a:p>
             <a:fld id="{0A05F3B5-6F50-4323-80C0-955EB0110BAC}" type="datetimeFigureOut">
               <a:rPr lang="en-US" smtClean="0"/>
-              <a:t>12/8/2017</a:t>
+              <a:t>12/9/2017</a:t>
             </a:fld>
             <a:endParaRPr lang="en-US"/>
           </a:p>
@@ -1625,7 +1625,7 @@
           <a:p>
             <a:fld id="{0A05F3B5-6F50-4323-80C0-955EB0110BAC}" type="datetimeFigureOut">
               <a:rPr lang="en-US" smtClean="0"/>
-              <a:t>12/8/2017</a:t>
+              <a:t>12/9/2017</a:t>
             </a:fld>
             <a:endParaRPr lang="en-US"/>
           </a:p>
@@ -1743,7 +1743,7 @@
           <a:p>
             <a:fld id="{0A05F3B5-6F50-4323-80C0-955EB0110BAC}" type="datetimeFigureOut">
               <a:rPr lang="en-US" smtClean="0"/>
-              <a:t>12/8/2017</a:t>
+              <a:t>12/9/2017</a:t>
             </a:fld>
             <a:endParaRPr lang="en-US"/>
           </a:p>
@@ -1838,7 +1838,7 @@
           <a:p>
             <a:fld id="{0A05F3B5-6F50-4323-80C0-955EB0110BAC}" type="datetimeFigureOut">
               <a:rPr lang="en-US" smtClean="0"/>
-              <a:t>12/8/2017</a:t>
+              <a:t>12/9/2017</a:t>
             </a:fld>
             <a:endParaRPr lang="en-US"/>
           </a:p>
@@ -2115,7 +2115,7 @@
           <a:p>
             <a:fld id="{0A05F3B5-6F50-4323-80C0-955EB0110BAC}" type="datetimeFigureOut">
               <a:rPr lang="en-US" smtClean="0"/>
-              <a:t>12/8/2017</a:t>
+              <a:t>12/9/2017</a:t>
             </a:fld>
             <a:endParaRPr lang="en-US"/>
           </a:p>
@@ -2372,7 +2372,7 @@
           <a:p>
             <a:fld id="{0A05F3B5-6F50-4323-80C0-955EB0110BAC}" type="datetimeFigureOut">
               <a:rPr lang="en-US" smtClean="0"/>
-              <a:t>12/8/2017</a:t>
+              <a:t>12/9/2017</a:t>
             </a:fld>
             <a:endParaRPr lang="en-US"/>
           </a:p>
@@ -2585,7 +2585,7 @@
           <a:p>
             <a:fld id="{0A05F3B5-6F50-4323-80C0-955EB0110BAC}" type="datetimeFigureOut">
               <a:rPr lang="en-US" smtClean="0"/>
-              <a:t>12/8/2017</a:t>
+              <a:t>12/9/2017</a:t>
             </a:fld>
             <a:endParaRPr lang="en-US"/>
           </a:p>
@@ -6938,93 +6938,6 @@
       </p:sp>
       <p:sp>
         <p:nvSpPr>
-          <p:cNvPr id="12" name="TextBox 11">
-            <a:extLst>
-              <a:ext uri="{FF2B5EF4-FFF2-40B4-BE49-F238E27FC236}">
-                <a16:creationId xmlns:a16="http://schemas.microsoft.com/office/drawing/2014/main" id="{4B37ED4C-78D1-4932-A469-317043D020BC}"/>
-              </a:ext>
-            </a:extLst>
-          </p:cNvPr>
-          <p:cNvSpPr txBox="1"/>
-          <p:nvPr/>
-        </p:nvSpPr>
-        <p:spPr>
-          <a:xfrm>
-            <a:off x="19235885" y="23767664"/>
-            <a:ext cx="2061776" cy="646331"/>
-          </a:xfrm>
-          <a:prstGeom prst="rect">
-            <a:avLst/>
-          </a:prstGeom>
-          <a:noFill/>
-        </p:spPr>
-        <p:txBody>
-          <a:bodyPr wrap="square" rtlCol="0">
-            <a:spAutoFit/>
-          </a:bodyPr>
-          <a:lstStyle/>
-          <a:p>
-            <a:r>
-              <a:rPr lang="en-US" sz="400" dirty="0"/>
-              <a:t>TREE_DATA STORE</a:t>
-            </a:r>
-          </a:p>
-          <a:p>
-            <a:pPr defTabSz="160020"/>
-            <a:r>
-              <a:rPr lang="en-US" sz="400" dirty="0"/>
-              <a:t>	- receive messages/TYPE_LEVEL_DATA_MUTATIONS via </a:t>
-            </a:r>
-            <a:r>
-              <a:rPr lang="en-US" sz="400" dirty="0" err="1"/>
-              <a:t>this.addMutation</a:t>
-            </a:r>
-            <a:r>
-              <a:rPr lang="en-US" sz="400" dirty="0"/>
-              <a:t>()</a:t>
-            </a:r>
-          </a:p>
-          <a:p>
-            <a:pPr defTabSz="160020"/>
-            <a:r>
-              <a:rPr lang="en-US" sz="400" dirty="0"/>
-              <a:t>	- chooses to pass the message along to correct data object as an INSTANCE_LEVEL_DATA_MUTATION</a:t>
-            </a:r>
-          </a:p>
-          <a:p>
-            <a:pPr defTabSz="160020"/>
-            <a:r>
-              <a:rPr lang="en-US" sz="400" dirty="0"/>
-              <a:t>	- e.g. tree = </a:t>
-            </a:r>
-            <a:r>
-              <a:rPr lang="en-US" sz="400" dirty="0" err="1"/>
-              <a:t>TREE_DATA_STORE.get</a:t>
-            </a:r>
-            <a:r>
-              <a:rPr lang="en-US" sz="400" dirty="0"/>
-              <a:t>(‘efa234’); </a:t>
-            </a:r>
-            <a:r>
-              <a:rPr lang="en-US" sz="400" dirty="0" err="1"/>
-              <a:t>tree.addMutation</a:t>
-            </a:r>
-            <a:r>
-              <a:rPr lang="en-US" sz="400" dirty="0"/>
-              <a:t>({property: children, mutation})</a:t>
-            </a:r>
-          </a:p>
-          <a:p>
-            <a:pPr defTabSz="160020"/>
-            <a:r>
-              <a:rPr lang="en-US" sz="400" dirty="0"/>
-              <a:t>	-also subscribes to each of its members’ update events, appends the object id to the update/event, and bubbles up these modified events to any objects that subscribed to it</a:t>
-            </a:r>
-          </a:p>
-        </p:txBody>
-      </p:sp>
-      <p:sp>
-        <p:nvSpPr>
           <p:cNvPr id="13" name="TextBox 12">
             <a:extLst>
               <a:ext uri="{FF2B5EF4-FFF2-40B4-BE49-F238E27FC236}">
@@ -12073,7 +11986,7 @@
         </p:nvSpPr>
         <p:spPr>
           <a:xfrm>
-            <a:off x="14382913" y="22419733"/>
+            <a:off x="14173588" y="22735823"/>
             <a:ext cx="1107179" cy="1477328"/>
           </a:xfrm>
           <a:prstGeom prst="rect">
@@ -12312,8 +12225,8 @@
         </p:nvCxnSpPr>
         <p:spPr>
           <a:xfrm flipH="1" flipV="1">
-            <a:off x="17398120" y="20255820"/>
-            <a:ext cx="11601" cy="733190"/>
+            <a:off x="17314213" y="20255893"/>
+            <a:ext cx="95508" cy="733117"/>
           </a:xfrm>
           <a:prstGeom prst="straightConnector1">
             <a:avLst/>
@@ -12461,10 +12374,10 @@
         </p:nvGrpSpPr>
         <p:grpSpPr>
           <a:xfrm>
-            <a:off x="17120073" y="20101932"/>
-            <a:ext cx="611354" cy="153888"/>
+            <a:off x="16966170" y="20102004"/>
+            <a:ext cx="765257" cy="153889"/>
             <a:chOff x="17131674" y="20101587"/>
-            <a:chExt cx="611354" cy="153888"/>
+            <a:chExt cx="611354" cy="122849"/>
           </a:xfrm>
         </p:grpSpPr>
         <p:sp>
@@ -12482,7 +12395,7 @@
           <p:spPr>
             <a:xfrm>
               <a:off x="17131674" y="20101587"/>
-              <a:ext cx="556094" cy="153888"/>
+              <a:ext cx="556094" cy="122849"/>
             </a:xfrm>
             <a:prstGeom prst="rect">
               <a:avLst/>
@@ -12497,7 +12410,7 @@
             <a:p>
               <a:r>
                 <a:rPr lang="en-US" sz="400" dirty="0" err="1"/>
-                <a:t>sigmaNodeStore</a:t>
+                <a:t>sigmaNodesUpdater</a:t>
               </a:r>
               <a:endParaRPr lang="en-US" sz="400" dirty="0"/>
             </a:p>
@@ -12550,42 +12463,6 @@
           </p:txBody>
         </p:sp>
       </p:grpSp>
-      <p:sp>
-        <p:nvSpPr>
-          <p:cNvPr id="251" name="TextBox 250">
-            <a:extLst>
-              <a:ext uri="{FF2B5EF4-FFF2-40B4-BE49-F238E27FC236}">
-                <a16:creationId xmlns:a16="http://schemas.microsoft.com/office/drawing/2014/main" id="{696B0F49-FCDC-4106-A8C6-49C1AAF765B8}"/>
-              </a:ext>
-            </a:extLst>
-          </p:cNvPr>
-          <p:cNvSpPr txBox="1"/>
-          <p:nvPr/>
-        </p:nvSpPr>
-        <p:spPr>
-          <a:xfrm>
-            <a:off x="18167876" y="20106275"/>
-            <a:ext cx="599413" cy="153888"/>
-          </a:xfrm>
-          <a:prstGeom prst="rect">
-            <a:avLst/>
-          </a:prstGeom>
-          <a:noFill/>
-        </p:spPr>
-        <p:txBody>
-          <a:bodyPr wrap="square" rtlCol="0">
-            <a:spAutoFit/>
-          </a:bodyPr>
-          <a:lstStyle/>
-          <a:p>
-            <a:r>
-              <a:rPr lang="en-US" sz="400" dirty="0" err="1"/>
-              <a:t>sigmaNode</a:t>
-            </a:r>
-            <a:endParaRPr lang="en-US" sz="400" dirty="0"/>
-          </a:p>
-        </p:txBody>
-      </p:sp>
       <p:grpSp>
         <p:nvGrpSpPr>
           <p:cNvPr id="33" name="Group 32">
@@ -12601,9 +12478,9 @@
         <p:grpSpPr>
           <a:xfrm>
             <a:off x="17667076" y="19990279"/>
-            <a:ext cx="571126" cy="192940"/>
+            <a:ext cx="571126" cy="211437"/>
             <a:chOff x="17667076" y="19990279"/>
-            <a:chExt cx="571126" cy="192940"/>
+            <a:chExt cx="571126" cy="211437"/>
           </a:xfrm>
         </p:grpSpPr>
         <p:cxnSp>
@@ -12623,9 +12500,9 @@
             <p:nvPr/>
           </p:nvCxnSpPr>
           <p:spPr>
-            <a:xfrm>
-              <a:off x="17731427" y="20181532"/>
-              <a:ext cx="436449" cy="1687"/>
+            <a:xfrm flipV="1">
+              <a:off x="17731427" y="20175262"/>
+              <a:ext cx="436449" cy="26454"/>
             </a:xfrm>
             <a:prstGeom prst="straightConnector1">
               <a:avLst/>
@@ -12760,6 +12637,1047 @@
           </a:p>
         </p:txBody>
       </p:sp>
+      <p:sp>
+        <p:nvSpPr>
+          <p:cNvPr id="7" name="TextBox 6">
+            <a:extLst>
+              <a:ext uri="{FF2B5EF4-FFF2-40B4-BE49-F238E27FC236}">
+                <a16:creationId xmlns:a16="http://schemas.microsoft.com/office/drawing/2014/main" id="{24373883-A316-4753-B237-B9C89AAAD269}"/>
+              </a:ext>
+            </a:extLst>
+          </p:cNvPr>
+          <p:cNvSpPr txBox="1"/>
+          <p:nvPr/>
+        </p:nvSpPr>
+        <p:spPr>
+          <a:xfrm>
+            <a:off x="16531657" y="23670659"/>
+            <a:ext cx="559474" cy="338554"/>
+          </a:xfrm>
+          <a:prstGeom prst="rect">
+            <a:avLst/>
+          </a:prstGeom>
+          <a:noFill/>
+        </p:spPr>
+        <p:txBody>
+          <a:bodyPr wrap="square" rtlCol="0">
+            <a:spAutoFit/>
+          </a:bodyPr>
+          <a:lstStyle/>
+          <a:p>
+            <a:r>
+              <a:rPr lang="en-US" sz="400" dirty="0" err="1"/>
+              <a:t>treeStoreSource</a:t>
+            </a:r>
+            <a:endParaRPr lang="en-US" sz="400" dirty="0"/>
+          </a:p>
+          <a:p>
+            <a:r>
+              <a:rPr lang="en-US" sz="400" dirty="0"/>
+              <a:t>+get</a:t>
+            </a:r>
+          </a:p>
+          <a:p>
+            <a:r>
+              <a:rPr lang="en-US" sz="400" dirty="0"/>
+              <a:t>+set</a:t>
+            </a:r>
+          </a:p>
+          <a:p>
+            <a:r>
+              <a:rPr lang="en-US" sz="400" dirty="0"/>
+              <a:t>+</a:t>
+            </a:r>
+            <a:r>
+              <a:rPr lang="en-US" sz="400" dirty="0" err="1"/>
+              <a:t>onUpdate</a:t>
+            </a:r>
+            <a:endParaRPr lang="en-US" sz="400" dirty="0"/>
+          </a:p>
+        </p:txBody>
+      </p:sp>
+      <p:sp>
+        <p:nvSpPr>
+          <p:cNvPr id="12" name="TextBox 11">
+            <a:extLst>
+              <a:ext uri="{FF2B5EF4-FFF2-40B4-BE49-F238E27FC236}">
+                <a16:creationId xmlns:a16="http://schemas.microsoft.com/office/drawing/2014/main" id="{4B37ED4C-78D1-4932-A469-317043D020BC}"/>
+              </a:ext>
+            </a:extLst>
+          </p:cNvPr>
+          <p:cNvSpPr txBox="1"/>
+          <p:nvPr/>
+        </p:nvSpPr>
+        <p:spPr>
+          <a:xfrm>
+            <a:off x="19235885" y="23767664"/>
+            <a:ext cx="2061776" cy="646331"/>
+          </a:xfrm>
+          <a:prstGeom prst="rect">
+            <a:avLst/>
+          </a:prstGeom>
+          <a:noFill/>
+        </p:spPr>
+        <p:txBody>
+          <a:bodyPr wrap="square" rtlCol="0">
+            <a:spAutoFit/>
+          </a:bodyPr>
+          <a:lstStyle/>
+          <a:p>
+            <a:r>
+              <a:rPr lang="en-US" sz="400" dirty="0"/>
+              <a:t>TREE_DATA STORE</a:t>
+            </a:r>
+          </a:p>
+          <a:p>
+            <a:pPr defTabSz="160020"/>
+            <a:r>
+              <a:rPr lang="en-US" sz="400" dirty="0"/>
+              <a:t>	- receive messages/TYPE_LEVEL_DATA_MUTATIONS via </a:t>
+            </a:r>
+            <a:r>
+              <a:rPr lang="en-US" sz="400" dirty="0" err="1"/>
+              <a:t>this.addMutation</a:t>
+            </a:r>
+            <a:r>
+              <a:rPr lang="en-US" sz="400" dirty="0"/>
+              <a:t>()</a:t>
+            </a:r>
+          </a:p>
+          <a:p>
+            <a:pPr defTabSz="160020"/>
+            <a:r>
+              <a:rPr lang="en-US" sz="400" dirty="0"/>
+              <a:t>	- chooses to pass the message along to correct data object as an INSTANCE_LEVEL_DATA_MUTATION</a:t>
+            </a:r>
+          </a:p>
+          <a:p>
+            <a:pPr defTabSz="160020"/>
+            <a:r>
+              <a:rPr lang="en-US" sz="400" dirty="0"/>
+              <a:t>	- e.g. tree = </a:t>
+            </a:r>
+            <a:r>
+              <a:rPr lang="en-US" sz="400" dirty="0" err="1"/>
+              <a:t>TREE_DATA_STORE.get</a:t>
+            </a:r>
+            <a:r>
+              <a:rPr lang="en-US" sz="400" dirty="0"/>
+              <a:t>(‘efa234’); </a:t>
+            </a:r>
+            <a:r>
+              <a:rPr lang="en-US" sz="400" dirty="0" err="1"/>
+              <a:t>tree.addMutation</a:t>
+            </a:r>
+            <a:r>
+              <a:rPr lang="en-US" sz="400" dirty="0"/>
+              <a:t>({property: children, mutation})</a:t>
+            </a:r>
+          </a:p>
+          <a:p>
+            <a:pPr defTabSz="160020"/>
+            <a:r>
+              <a:rPr lang="en-US" sz="400" dirty="0"/>
+              <a:t>	-also subscribes to each of its members’ update events, appends the object id to the update/event, and bubbles up these modified events to any objects that subscribed to it</a:t>
+            </a:r>
+          </a:p>
+        </p:txBody>
+      </p:sp>
+      <p:sp>
+        <p:nvSpPr>
+          <p:cNvPr id="9" name="Diamond 8">
+            <a:extLst>
+              <a:ext uri="{FF2B5EF4-FFF2-40B4-BE49-F238E27FC236}">
+                <a16:creationId xmlns:a16="http://schemas.microsoft.com/office/drawing/2014/main" id="{C761699F-6789-49A5-8A90-B1B5CF0F8243}"/>
+              </a:ext>
+            </a:extLst>
+          </p:cNvPr>
+          <p:cNvSpPr/>
+          <p:nvPr/>
+        </p:nvSpPr>
+        <p:spPr>
+          <a:xfrm>
+            <a:off x="19251162" y="23814862"/>
+            <a:ext cx="90360" cy="65319"/>
+          </a:xfrm>
+          <a:prstGeom prst="diamond">
+            <a:avLst/>
+          </a:prstGeom>
+          <a:noFill/>
+        </p:spPr>
+        <p:style>
+          <a:lnRef idx="2">
+            <a:schemeClr val="accent1">
+              <a:shade val="50000"/>
+            </a:schemeClr>
+          </a:lnRef>
+          <a:fillRef idx="1">
+            <a:schemeClr val="accent1"/>
+          </a:fillRef>
+          <a:effectRef idx="0">
+            <a:schemeClr val="accent1"/>
+          </a:effectRef>
+          <a:fontRef idx="minor">
+            <a:schemeClr val="lt1"/>
+          </a:fontRef>
+        </p:style>
+        <p:txBody>
+          <a:bodyPr rtlCol="0" anchor="ctr"/>
+          <a:lstStyle/>
+          <a:p>
+            <a:pPr algn="ctr"/>
+            <a:endParaRPr lang="en-US"/>
+          </a:p>
+        </p:txBody>
+      </p:sp>
+      <p:cxnSp>
+        <p:nvCxnSpPr>
+          <p:cNvPr id="19" name="Straight Connector 18">
+            <a:extLst>
+              <a:ext uri="{FF2B5EF4-FFF2-40B4-BE49-F238E27FC236}">
+                <a16:creationId xmlns:a16="http://schemas.microsoft.com/office/drawing/2014/main" id="{F84F211D-5DDF-4CD0-A33F-D612EB95343D}"/>
+              </a:ext>
+            </a:extLst>
+          </p:cNvPr>
+          <p:cNvCxnSpPr>
+            <a:cxnSpLocks/>
+            <a:stCxn id="9" idx="1"/>
+            <a:endCxn id="7" idx="3"/>
+          </p:cNvCxnSpPr>
+          <p:nvPr/>
+        </p:nvCxnSpPr>
+        <p:spPr>
+          <a:xfrm flipH="1" flipV="1">
+            <a:off x="17091131" y="23839936"/>
+            <a:ext cx="2160031" cy="7586"/>
+          </a:xfrm>
+          <a:prstGeom prst="line">
+            <a:avLst/>
+          </a:prstGeom>
+        </p:spPr>
+        <p:style>
+          <a:lnRef idx="1">
+            <a:schemeClr val="accent1"/>
+          </a:lnRef>
+          <a:fillRef idx="0">
+            <a:schemeClr val="accent1"/>
+          </a:fillRef>
+          <a:effectRef idx="0">
+            <a:schemeClr val="accent1"/>
+          </a:effectRef>
+          <a:fontRef idx="minor">
+            <a:schemeClr val="tx1"/>
+          </a:fontRef>
+        </p:style>
+      </p:cxnSp>
+      <p:sp>
+        <p:nvSpPr>
+          <p:cNvPr id="24" name="TextBox 23">
+            <a:extLst>
+              <a:ext uri="{FF2B5EF4-FFF2-40B4-BE49-F238E27FC236}">
+                <a16:creationId xmlns:a16="http://schemas.microsoft.com/office/drawing/2014/main" id="{07C93F7F-3E40-4678-BAAA-0BCFDB3D87DB}"/>
+              </a:ext>
+            </a:extLst>
+          </p:cNvPr>
+          <p:cNvSpPr txBox="1"/>
+          <p:nvPr/>
+        </p:nvSpPr>
+        <p:spPr>
+          <a:xfrm>
+            <a:off x="19520146" y="23357305"/>
+            <a:ext cx="1285175" cy="215444"/>
+          </a:xfrm>
+          <a:prstGeom prst="rect">
+            <a:avLst/>
+          </a:prstGeom>
+          <a:noFill/>
+        </p:spPr>
+        <p:txBody>
+          <a:bodyPr wrap="square" rtlCol="0">
+            <a:spAutoFit/>
+          </a:bodyPr>
+          <a:lstStyle/>
+          <a:p>
+            <a:r>
+              <a:rPr lang="en-US" sz="400" dirty="0"/>
+              <a:t>Will somehow have an add tree or </a:t>
+            </a:r>
+            <a:r>
+              <a:rPr lang="en-US" sz="400" dirty="0" err="1"/>
+              <a:t>addContent</a:t>
+            </a:r>
+            <a:r>
+              <a:rPr lang="en-US" sz="400" dirty="0"/>
+              <a:t> mutation as well</a:t>
+            </a:r>
+          </a:p>
+        </p:txBody>
+      </p:sp>
+      <p:grpSp>
+        <p:nvGrpSpPr>
+          <p:cNvPr id="233" name="Group 232">
+            <a:extLst>
+              <a:ext uri="{FF2B5EF4-FFF2-40B4-BE49-F238E27FC236}">
+                <a16:creationId xmlns:a16="http://schemas.microsoft.com/office/drawing/2014/main" id="{12020553-0C66-45C0-BB7F-6B10FEAE2C53}"/>
+              </a:ext>
+            </a:extLst>
+          </p:cNvPr>
+          <p:cNvGrpSpPr/>
+          <p:nvPr/>
+        </p:nvGrpSpPr>
+        <p:grpSpPr>
+          <a:xfrm>
+            <a:off x="15119419" y="23803237"/>
+            <a:ext cx="445475" cy="153888"/>
+            <a:chOff x="15107011" y="23742908"/>
+            <a:chExt cx="445475" cy="153888"/>
+          </a:xfrm>
+        </p:grpSpPr>
+        <p:sp>
+          <p:nvSpPr>
+            <p:cNvPr id="31" name="TextBox 30">
+              <a:extLst>
+                <a:ext uri="{FF2B5EF4-FFF2-40B4-BE49-F238E27FC236}">
+                  <a16:creationId xmlns:a16="http://schemas.microsoft.com/office/drawing/2014/main" id="{0DDEC84C-E9C1-4C9B-A0A0-181E0B41DC19}"/>
+                </a:ext>
+              </a:extLst>
+            </p:cNvPr>
+            <p:cNvSpPr txBox="1"/>
+            <p:nvPr/>
+          </p:nvSpPr>
+          <p:spPr>
+            <a:xfrm>
+              <a:off x="15107011" y="23742908"/>
+              <a:ext cx="445475" cy="153888"/>
+            </a:xfrm>
+            <a:prstGeom prst="rect">
+              <a:avLst/>
+            </a:prstGeom>
+            <a:noFill/>
+          </p:spPr>
+          <p:txBody>
+            <a:bodyPr wrap="square" rtlCol="0">
+              <a:spAutoFit/>
+            </a:bodyPr>
+            <a:lstStyle/>
+            <a:p>
+              <a:r>
+                <a:rPr lang="en-US" sz="400" dirty="0" err="1"/>
+                <a:t>treeLoader</a:t>
+              </a:r>
+              <a:endParaRPr lang="en-US" sz="400" dirty="0"/>
+            </a:p>
+          </p:txBody>
+        </p:sp>
+        <p:sp>
+          <p:nvSpPr>
+            <p:cNvPr id="225" name="Diamond 224">
+              <a:extLst>
+                <a:ext uri="{FF2B5EF4-FFF2-40B4-BE49-F238E27FC236}">
+                  <a16:creationId xmlns:a16="http://schemas.microsoft.com/office/drawing/2014/main" id="{F5BAA9DC-DB49-4DB9-AEA3-78CD0218C8EB}"/>
+                </a:ext>
+              </a:extLst>
+            </p:cNvPr>
+            <p:cNvSpPr/>
+            <p:nvPr/>
+          </p:nvSpPr>
+          <p:spPr>
+            <a:xfrm>
+              <a:off x="15439488" y="23795197"/>
+              <a:ext cx="89877" cy="75310"/>
+            </a:xfrm>
+            <a:prstGeom prst="diamond">
+              <a:avLst/>
+            </a:prstGeom>
+            <a:noFill/>
+          </p:spPr>
+          <p:style>
+            <a:lnRef idx="2">
+              <a:schemeClr val="accent1">
+                <a:shade val="50000"/>
+              </a:schemeClr>
+            </a:lnRef>
+            <a:fillRef idx="1">
+              <a:schemeClr val="accent1"/>
+            </a:fillRef>
+            <a:effectRef idx="0">
+              <a:schemeClr val="accent1"/>
+            </a:effectRef>
+            <a:fontRef idx="minor">
+              <a:schemeClr val="lt1"/>
+            </a:fontRef>
+          </p:style>
+          <p:txBody>
+            <a:bodyPr rtlCol="0" anchor="ctr"/>
+            <a:lstStyle/>
+            <a:p>
+              <a:pPr algn="ctr"/>
+              <a:endParaRPr lang="en-US"/>
+            </a:p>
+          </p:txBody>
+        </p:sp>
+      </p:grpSp>
+      <p:cxnSp>
+        <p:nvCxnSpPr>
+          <p:cNvPr id="229" name="Straight Connector 228">
+            <a:extLst>
+              <a:ext uri="{FF2B5EF4-FFF2-40B4-BE49-F238E27FC236}">
+                <a16:creationId xmlns:a16="http://schemas.microsoft.com/office/drawing/2014/main" id="{C4093DAC-B0F0-4FBC-9C1C-2DCFC4559793}"/>
+              </a:ext>
+            </a:extLst>
+          </p:cNvPr>
+          <p:cNvCxnSpPr>
+            <a:cxnSpLocks/>
+            <a:stCxn id="225" idx="3"/>
+            <a:endCxn id="7" idx="1"/>
+          </p:cNvCxnSpPr>
+          <p:nvPr/>
+        </p:nvCxnSpPr>
+        <p:spPr>
+          <a:xfrm flipV="1">
+            <a:off x="15541773" y="23839936"/>
+            <a:ext cx="989884" cy="53245"/>
+          </a:xfrm>
+          <a:prstGeom prst="line">
+            <a:avLst/>
+          </a:prstGeom>
+        </p:spPr>
+        <p:style>
+          <a:lnRef idx="1">
+            <a:schemeClr val="accent1"/>
+          </a:lnRef>
+          <a:fillRef idx="0">
+            <a:schemeClr val="accent1"/>
+          </a:fillRef>
+          <a:effectRef idx="0">
+            <a:schemeClr val="accent1"/>
+          </a:effectRef>
+          <a:fontRef idx="minor">
+            <a:schemeClr val="tx1"/>
+          </a:fontRef>
+        </p:style>
+      </p:cxnSp>
+      <p:cxnSp>
+        <p:nvCxnSpPr>
+          <p:cNvPr id="242" name="Straight Arrow Connector 241">
+            <a:extLst>
+              <a:ext uri="{FF2B5EF4-FFF2-40B4-BE49-F238E27FC236}">
+                <a16:creationId xmlns:a16="http://schemas.microsoft.com/office/drawing/2014/main" id="{F12ED237-9C6D-4CE2-8840-69D2FDF75C78}"/>
+              </a:ext>
+            </a:extLst>
+          </p:cNvPr>
+          <p:cNvCxnSpPr>
+            <a:cxnSpLocks/>
+            <a:stCxn id="7" idx="0"/>
+            <a:endCxn id="162" idx="2"/>
+          </p:cNvCxnSpPr>
+          <p:nvPr/>
+        </p:nvCxnSpPr>
+        <p:spPr>
+          <a:xfrm flipV="1">
+            <a:off x="16811394" y="21052198"/>
+            <a:ext cx="1734404" cy="2618461"/>
+          </a:xfrm>
+          <a:prstGeom prst="straightConnector1">
+            <a:avLst/>
+          </a:prstGeom>
+          <a:ln>
+            <a:prstDash val="sysDash"/>
+            <a:tailEnd type="triangle"/>
+          </a:ln>
+        </p:spPr>
+        <p:style>
+          <a:lnRef idx="1">
+            <a:schemeClr val="accent1"/>
+          </a:lnRef>
+          <a:fillRef idx="0">
+            <a:schemeClr val="accent1"/>
+          </a:fillRef>
+          <a:effectRef idx="0">
+            <a:schemeClr val="accent1"/>
+          </a:effectRef>
+          <a:fontRef idx="minor">
+            <a:schemeClr val="tx1"/>
+          </a:fontRef>
+        </p:style>
+      </p:cxnSp>
+      <p:sp>
+        <p:nvSpPr>
+          <p:cNvPr id="243" name="TextBox 242">
+            <a:extLst>
+              <a:ext uri="{FF2B5EF4-FFF2-40B4-BE49-F238E27FC236}">
+                <a16:creationId xmlns:a16="http://schemas.microsoft.com/office/drawing/2014/main" id="{D5AEADCA-05EC-4FDB-9E9A-EC29DF7073A2}"/>
+              </a:ext>
+            </a:extLst>
+          </p:cNvPr>
+          <p:cNvSpPr txBox="1"/>
+          <p:nvPr/>
+        </p:nvSpPr>
+        <p:spPr>
+          <a:xfrm>
+            <a:off x="18546281" y="20010651"/>
+            <a:ext cx="965310" cy="215444"/>
+          </a:xfrm>
+          <a:prstGeom prst="rect">
+            <a:avLst/>
+          </a:prstGeom>
+          <a:noFill/>
+        </p:spPr>
+        <p:txBody>
+          <a:bodyPr wrap="square" rtlCol="0">
+            <a:spAutoFit/>
+          </a:bodyPr>
+          <a:lstStyle/>
+          <a:p>
+            <a:r>
+              <a:rPr lang="en-US" sz="800" dirty="0" err="1"/>
+              <a:t>SigmaNodes</a:t>
+            </a:r>
+            <a:endParaRPr lang="en-US" sz="800" dirty="0"/>
+          </a:p>
+        </p:txBody>
+      </p:sp>
+      <p:sp>
+        <p:nvSpPr>
+          <p:cNvPr id="245" name="Rectangle: Rounded Corners 244">
+            <a:extLst>
+              <a:ext uri="{FF2B5EF4-FFF2-40B4-BE49-F238E27FC236}">
+                <a16:creationId xmlns:a16="http://schemas.microsoft.com/office/drawing/2014/main" id="{FAAFEE83-9D33-459C-A735-568F8E954317}"/>
+              </a:ext>
+            </a:extLst>
+          </p:cNvPr>
+          <p:cNvSpPr/>
+          <p:nvPr/>
+        </p:nvSpPr>
+        <p:spPr>
+          <a:xfrm>
+            <a:off x="18211535" y="20052962"/>
+            <a:ext cx="1149670" cy="413144"/>
+          </a:xfrm>
+          <a:prstGeom prst="roundRect">
+            <a:avLst/>
+          </a:prstGeom>
+          <a:noFill/>
+        </p:spPr>
+        <p:style>
+          <a:lnRef idx="2">
+            <a:schemeClr val="accent1">
+              <a:shade val="50000"/>
+            </a:schemeClr>
+          </a:lnRef>
+          <a:fillRef idx="1">
+            <a:schemeClr val="accent1"/>
+          </a:fillRef>
+          <a:effectRef idx="0">
+            <a:schemeClr val="accent1"/>
+          </a:effectRef>
+          <a:fontRef idx="minor">
+            <a:schemeClr val="lt1"/>
+          </a:fontRef>
+        </p:style>
+        <p:txBody>
+          <a:bodyPr rtlCol="0" anchor="ctr"/>
+          <a:lstStyle/>
+          <a:p>
+            <a:pPr algn="ctr"/>
+            <a:endParaRPr lang="en-US"/>
+          </a:p>
+        </p:txBody>
+      </p:sp>
+      <p:grpSp>
+        <p:nvGrpSpPr>
+          <p:cNvPr id="253" name="Group 252">
+            <a:extLst>
+              <a:ext uri="{FF2B5EF4-FFF2-40B4-BE49-F238E27FC236}">
+                <a16:creationId xmlns:a16="http://schemas.microsoft.com/office/drawing/2014/main" id="{5AB2885E-1821-4228-930E-27BDBA9F43EF}"/>
+              </a:ext>
+            </a:extLst>
+          </p:cNvPr>
+          <p:cNvGrpSpPr/>
+          <p:nvPr/>
+        </p:nvGrpSpPr>
+        <p:grpSpPr>
+          <a:xfrm>
+            <a:off x="18167876" y="20098318"/>
+            <a:ext cx="426899" cy="153888"/>
+            <a:chOff x="18167876" y="20098318"/>
+            <a:chExt cx="426899" cy="153888"/>
+          </a:xfrm>
+        </p:grpSpPr>
+        <p:sp>
+          <p:nvSpPr>
+            <p:cNvPr id="251" name="TextBox 250">
+              <a:extLst>
+                <a:ext uri="{FF2B5EF4-FFF2-40B4-BE49-F238E27FC236}">
+                  <a16:creationId xmlns:a16="http://schemas.microsoft.com/office/drawing/2014/main" id="{696B0F49-FCDC-4106-A8C6-49C1AAF765B8}"/>
+                </a:ext>
+              </a:extLst>
+            </p:cNvPr>
+            <p:cNvSpPr txBox="1"/>
+            <p:nvPr/>
+          </p:nvSpPr>
+          <p:spPr>
+            <a:xfrm>
+              <a:off x="18167876" y="20098318"/>
+              <a:ext cx="426899" cy="153888"/>
+            </a:xfrm>
+            <a:prstGeom prst="rect">
+              <a:avLst/>
+            </a:prstGeom>
+            <a:noFill/>
+          </p:spPr>
+          <p:txBody>
+            <a:bodyPr wrap="square" rtlCol="0">
+              <a:spAutoFit/>
+            </a:bodyPr>
+            <a:lstStyle/>
+            <a:p>
+              <a:r>
+                <a:rPr lang="en-US" sz="400" dirty="0" err="1"/>
+                <a:t>sigmaNode</a:t>
+              </a:r>
+              <a:endParaRPr lang="en-US" sz="400" dirty="0"/>
+            </a:p>
+          </p:txBody>
+        </p:sp>
+        <p:sp>
+          <p:nvSpPr>
+            <p:cNvPr id="246" name="Oval 245">
+              <a:extLst>
+                <a:ext uri="{FF2B5EF4-FFF2-40B4-BE49-F238E27FC236}">
+                  <a16:creationId xmlns:a16="http://schemas.microsoft.com/office/drawing/2014/main" id="{635112E9-574A-429B-9C42-D1F54E86AE10}"/>
+                </a:ext>
+              </a:extLst>
+            </p:cNvPr>
+            <p:cNvSpPr/>
+            <p:nvPr/>
+          </p:nvSpPr>
+          <p:spPr>
+            <a:xfrm>
+              <a:off x="18224910" y="20116528"/>
+              <a:ext cx="296863" cy="126948"/>
+            </a:xfrm>
+            <a:prstGeom prst="ellipse">
+              <a:avLst/>
+            </a:prstGeom>
+            <a:noFill/>
+          </p:spPr>
+          <p:style>
+            <a:lnRef idx="2">
+              <a:schemeClr val="accent1">
+                <a:shade val="50000"/>
+              </a:schemeClr>
+            </a:lnRef>
+            <a:fillRef idx="1">
+              <a:schemeClr val="accent1"/>
+            </a:fillRef>
+            <a:effectRef idx="0">
+              <a:schemeClr val="accent1"/>
+            </a:effectRef>
+            <a:fontRef idx="minor">
+              <a:schemeClr val="lt1"/>
+            </a:fontRef>
+          </p:style>
+          <p:txBody>
+            <a:bodyPr rtlCol="0" anchor="ctr"/>
+            <a:lstStyle/>
+            <a:p>
+              <a:pPr algn="ctr"/>
+              <a:endParaRPr lang="en-US"/>
+            </a:p>
+          </p:txBody>
+        </p:sp>
+      </p:grpSp>
+      <p:grpSp>
+        <p:nvGrpSpPr>
+          <p:cNvPr id="154" name="Group 153">
+            <a:extLst>
+              <a:ext uri="{FF2B5EF4-FFF2-40B4-BE49-F238E27FC236}">
+                <a16:creationId xmlns:a16="http://schemas.microsoft.com/office/drawing/2014/main" id="{6DFC7741-4582-453B-B6F7-A536A1BE6C7F}"/>
+              </a:ext>
+            </a:extLst>
+          </p:cNvPr>
+          <p:cNvGrpSpPr/>
+          <p:nvPr/>
+        </p:nvGrpSpPr>
+        <p:grpSpPr>
+          <a:xfrm>
+            <a:off x="18398522" y="20231503"/>
+            <a:ext cx="426899" cy="153888"/>
+            <a:chOff x="18167876" y="20098318"/>
+            <a:chExt cx="426899" cy="153888"/>
+          </a:xfrm>
+        </p:grpSpPr>
+        <p:sp>
+          <p:nvSpPr>
+            <p:cNvPr id="155" name="TextBox 154">
+              <a:extLst>
+                <a:ext uri="{FF2B5EF4-FFF2-40B4-BE49-F238E27FC236}">
+                  <a16:creationId xmlns:a16="http://schemas.microsoft.com/office/drawing/2014/main" id="{8D401AFD-02DA-4CDA-A912-2002B6E3578F}"/>
+                </a:ext>
+              </a:extLst>
+            </p:cNvPr>
+            <p:cNvSpPr txBox="1"/>
+            <p:nvPr/>
+          </p:nvSpPr>
+          <p:spPr>
+            <a:xfrm>
+              <a:off x="18167876" y="20098318"/>
+              <a:ext cx="426899" cy="153888"/>
+            </a:xfrm>
+            <a:prstGeom prst="rect">
+              <a:avLst/>
+            </a:prstGeom>
+            <a:noFill/>
+          </p:spPr>
+          <p:txBody>
+            <a:bodyPr wrap="square" rtlCol="0">
+              <a:spAutoFit/>
+            </a:bodyPr>
+            <a:lstStyle/>
+            <a:p>
+              <a:r>
+                <a:rPr lang="en-US" sz="400" dirty="0" err="1"/>
+                <a:t>sigmaNode</a:t>
+              </a:r>
+              <a:endParaRPr lang="en-US" sz="400" dirty="0"/>
+            </a:p>
+          </p:txBody>
+        </p:sp>
+        <p:sp>
+          <p:nvSpPr>
+            <p:cNvPr id="156" name="Oval 155">
+              <a:extLst>
+                <a:ext uri="{FF2B5EF4-FFF2-40B4-BE49-F238E27FC236}">
+                  <a16:creationId xmlns:a16="http://schemas.microsoft.com/office/drawing/2014/main" id="{17B7C42D-8875-4AE3-8682-12D00C0ED468}"/>
+                </a:ext>
+              </a:extLst>
+            </p:cNvPr>
+            <p:cNvSpPr/>
+            <p:nvPr/>
+          </p:nvSpPr>
+          <p:spPr>
+            <a:xfrm>
+              <a:off x="18224910" y="20116528"/>
+              <a:ext cx="296863" cy="126948"/>
+            </a:xfrm>
+            <a:prstGeom prst="ellipse">
+              <a:avLst/>
+            </a:prstGeom>
+            <a:noFill/>
+          </p:spPr>
+          <p:style>
+            <a:lnRef idx="2">
+              <a:schemeClr val="accent1">
+                <a:shade val="50000"/>
+              </a:schemeClr>
+            </a:lnRef>
+            <a:fillRef idx="1">
+              <a:schemeClr val="accent1"/>
+            </a:fillRef>
+            <a:effectRef idx="0">
+              <a:schemeClr val="accent1"/>
+            </a:effectRef>
+            <a:fontRef idx="minor">
+              <a:schemeClr val="lt1"/>
+            </a:fontRef>
+          </p:style>
+          <p:txBody>
+            <a:bodyPr rtlCol="0" anchor="ctr"/>
+            <a:lstStyle/>
+            <a:p>
+              <a:pPr algn="ctr"/>
+              <a:endParaRPr lang="en-US"/>
+            </a:p>
+          </p:txBody>
+        </p:sp>
+      </p:grpSp>
+      <p:grpSp>
+        <p:nvGrpSpPr>
+          <p:cNvPr id="158" name="Group 157">
+            <a:extLst>
+              <a:ext uri="{FF2B5EF4-FFF2-40B4-BE49-F238E27FC236}">
+                <a16:creationId xmlns:a16="http://schemas.microsoft.com/office/drawing/2014/main" id="{15EFBC32-8E53-46D4-8D0F-0304EF0A138F}"/>
+              </a:ext>
+            </a:extLst>
+          </p:cNvPr>
+          <p:cNvGrpSpPr/>
+          <p:nvPr/>
+        </p:nvGrpSpPr>
+        <p:grpSpPr>
+          <a:xfrm>
+            <a:off x="18773514" y="20217315"/>
+            <a:ext cx="426899" cy="153888"/>
+            <a:chOff x="18167876" y="20098318"/>
+            <a:chExt cx="426899" cy="153888"/>
+          </a:xfrm>
+        </p:grpSpPr>
+        <p:sp>
+          <p:nvSpPr>
+            <p:cNvPr id="159" name="TextBox 158">
+              <a:extLst>
+                <a:ext uri="{FF2B5EF4-FFF2-40B4-BE49-F238E27FC236}">
+                  <a16:creationId xmlns:a16="http://schemas.microsoft.com/office/drawing/2014/main" id="{D93AC00E-CF7B-4B33-A1B7-136AB7C705FB}"/>
+                </a:ext>
+              </a:extLst>
+            </p:cNvPr>
+            <p:cNvSpPr txBox="1"/>
+            <p:nvPr/>
+          </p:nvSpPr>
+          <p:spPr>
+            <a:xfrm>
+              <a:off x="18167876" y="20098318"/>
+              <a:ext cx="426899" cy="153888"/>
+            </a:xfrm>
+            <a:prstGeom prst="rect">
+              <a:avLst/>
+            </a:prstGeom>
+            <a:noFill/>
+          </p:spPr>
+          <p:txBody>
+            <a:bodyPr wrap="square" rtlCol="0">
+              <a:spAutoFit/>
+            </a:bodyPr>
+            <a:lstStyle/>
+            <a:p>
+              <a:r>
+                <a:rPr lang="en-US" sz="400" dirty="0" err="1"/>
+                <a:t>sigmaNode</a:t>
+              </a:r>
+              <a:endParaRPr lang="en-US" sz="400" dirty="0"/>
+            </a:p>
+          </p:txBody>
+        </p:sp>
+        <p:sp>
+          <p:nvSpPr>
+            <p:cNvPr id="160" name="Oval 159">
+              <a:extLst>
+                <a:ext uri="{FF2B5EF4-FFF2-40B4-BE49-F238E27FC236}">
+                  <a16:creationId xmlns:a16="http://schemas.microsoft.com/office/drawing/2014/main" id="{5FAC8C05-B59E-4498-9BDB-56EA97B59FA7}"/>
+                </a:ext>
+              </a:extLst>
+            </p:cNvPr>
+            <p:cNvSpPr/>
+            <p:nvPr/>
+          </p:nvSpPr>
+          <p:spPr>
+            <a:xfrm>
+              <a:off x="18224910" y="20116528"/>
+              <a:ext cx="296863" cy="126948"/>
+            </a:xfrm>
+            <a:prstGeom prst="ellipse">
+              <a:avLst/>
+            </a:prstGeom>
+            <a:noFill/>
+          </p:spPr>
+          <p:style>
+            <a:lnRef idx="2">
+              <a:schemeClr val="accent1">
+                <a:shade val="50000"/>
+              </a:schemeClr>
+            </a:lnRef>
+            <a:fillRef idx="1">
+              <a:schemeClr val="accent1"/>
+            </a:fillRef>
+            <a:effectRef idx="0">
+              <a:schemeClr val="accent1"/>
+            </a:effectRef>
+            <a:fontRef idx="minor">
+              <a:schemeClr val="lt1"/>
+            </a:fontRef>
+          </p:style>
+          <p:txBody>
+            <a:bodyPr rtlCol="0" anchor="ctr"/>
+            <a:lstStyle/>
+            <a:p>
+              <a:pPr algn="ctr"/>
+              <a:endParaRPr lang="en-US"/>
+            </a:p>
+          </p:txBody>
+        </p:sp>
+      </p:grpSp>
+      <p:sp>
+        <p:nvSpPr>
+          <p:cNvPr id="162" name="TextBox 161">
+            <a:extLst>
+              <a:ext uri="{FF2B5EF4-FFF2-40B4-BE49-F238E27FC236}">
+                <a16:creationId xmlns:a16="http://schemas.microsoft.com/office/drawing/2014/main" id="{C5453BFB-426C-41F1-A3BF-028AE67B1AA7}"/>
+              </a:ext>
+            </a:extLst>
+          </p:cNvPr>
+          <p:cNvSpPr txBox="1"/>
+          <p:nvPr/>
+        </p:nvSpPr>
+        <p:spPr>
+          <a:xfrm>
+            <a:off x="18224910" y="20898310"/>
+            <a:ext cx="641775" cy="153888"/>
+          </a:xfrm>
+          <a:prstGeom prst="rect">
+            <a:avLst/>
+          </a:prstGeom>
+          <a:noFill/>
+        </p:spPr>
+        <p:txBody>
+          <a:bodyPr wrap="square" rtlCol="0">
+            <a:spAutoFit/>
+          </a:bodyPr>
+          <a:lstStyle/>
+          <a:p>
+            <a:r>
+              <a:rPr lang="en-US" sz="400" dirty="0" err="1"/>
+              <a:t>sigmaNodeCreator</a:t>
+            </a:r>
+            <a:endParaRPr lang="en-US" sz="400" dirty="0"/>
+          </a:p>
+        </p:txBody>
+      </p:sp>
+      <p:cxnSp>
+        <p:nvCxnSpPr>
+          <p:cNvPr id="35" name="Straight Arrow Connector 34">
+            <a:extLst>
+              <a:ext uri="{FF2B5EF4-FFF2-40B4-BE49-F238E27FC236}">
+                <a16:creationId xmlns:a16="http://schemas.microsoft.com/office/drawing/2014/main" id="{A7EB4DE8-ED52-445E-B031-CC5DDD1B6F37}"/>
+              </a:ext>
+            </a:extLst>
+          </p:cNvPr>
+          <p:cNvCxnSpPr>
+            <a:stCxn id="162" idx="0"/>
+            <a:endCxn id="245" idx="2"/>
+          </p:cNvCxnSpPr>
+          <p:nvPr/>
+        </p:nvCxnSpPr>
+        <p:spPr>
+          <a:xfrm flipV="1">
+            <a:off x="18545798" y="20466106"/>
+            <a:ext cx="240572" cy="432204"/>
+          </a:xfrm>
+          <a:prstGeom prst="straightConnector1">
+            <a:avLst/>
+          </a:prstGeom>
+          <a:ln>
+            <a:tailEnd type="triangle"/>
+          </a:ln>
+        </p:spPr>
+        <p:style>
+          <a:lnRef idx="1">
+            <a:schemeClr val="accent1"/>
+          </a:lnRef>
+          <a:fillRef idx="0">
+            <a:schemeClr val="accent1"/>
+          </a:fillRef>
+          <a:effectRef idx="0">
+            <a:schemeClr val="accent1"/>
+          </a:effectRef>
+          <a:fontRef idx="minor">
+            <a:schemeClr val="tx1"/>
+          </a:fontRef>
+        </p:style>
+      </p:cxnSp>
+      <p:grpSp>
+        <p:nvGrpSpPr>
+          <p:cNvPr id="164" name="Group 163">
+            <a:extLst>
+              <a:ext uri="{FF2B5EF4-FFF2-40B4-BE49-F238E27FC236}">
+                <a16:creationId xmlns:a16="http://schemas.microsoft.com/office/drawing/2014/main" id="{4A67F3CD-4DBD-433F-9419-7B5331B647DB}"/>
+              </a:ext>
+            </a:extLst>
+          </p:cNvPr>
+          <p:cNvGrpSpPr/>
+          <p:nvPr/>
+        </p:nvGrpSpPr>
+        <p:grpSpPr>
+          <a:xfrm>
+            <a:off x="18505086" y="20620882"/>
+            <a:ext cx="426899" cy="153888"/>
+            <a:chOff x="18167876" y="20098318"/>
+            <a:chExt cx="426899" cy="153888"/>
+          </a:xfrm>
+        </p:grpSpPr>
+        <p:sp>
+          <p:nvSpPr>
+            <p:cNvPr id="165" name="TextBox 164">
+              <a:extLst>
+                <a:ext uri="{FF2B5EF4-FFF2-40B4-BE49-F238E27FC236}">
+                  <a16:creationId xmlns:a16="http://schemas.microsoft.com/office/drawing/2014/main" id="{BE6C3B9D-A28F-41FE-ABBE-2FAF00053EB2}"/>
+                </a:ext>
+              </a:extLst>
+            </p:cNvPr>
+            <p:cNvSpPr txBox="1"/>
+            <p:nvPr/>
+          </p:nvSpPr>
+          <p:spPr>
+            <a:xfrm>
+              <a:off x="18167876" y="20098318"/>
+              <a:ext cx="426899" cy="153888"/>
+            </a:xfrm>
+            <a:prstGeom prst="rect">
+              <a:avLst/>
+            </a:prstGeom>
+            <a:noFill/>
+          </p:spPr>
+          <p:txBody>
+            <a:bodyPr wrap="square" rtlCol="0">
+              <a:spAutoFit/>
+            </a:bodyPr>
+            <a:lstStyle/>
+            <a:p>
+              <a:r>
+                <a:rPr lang="en-US" sz="400" dirty="0" err="1"/>
+                <a:t>sigmaNode</a:t>
+              </a:r>
+              <a:endParaRPr lang="en-US" sz="400" dirty="0"/>
+            </a:p>
+          </p:txBody>
+        </p:sp>
+        <p:sp>
+          <p:nvSpPr>
+            <p:cNvPr id="166" name="Oval 165">
+              <a:extLst>
+                <a:ext uri="{FF2B5EF4-FFF2-40B4-BE49-F238E27FC236}">
+                  <a16:creationId xmlns:a16="http://schemas.microsoft.com/office/drawing/2014/main" id="{5504E514-EAC3-4BEC-9AE5-963D0782342F}"/>
+                </a:ext>
+              </a:extLst>
+            </p:cNvPr>
+            <p:cNvSpPr/>
+            <p:nvPr/>
+          </p:nvSpPr>
+          <p:spPr>
+            <a:xfrm>
+              <a:off x="18224910" y="20116528"/>
+              <a:ext cx="296863" cy="126948"/>
+            </a:xfrm>
+            <a:prstGeom prst="ellipse">
+              <a:avLst/>
+            </a:prstGeom>
+            <a:noFill/>
+          </p:spPr>
+          <p:style>
+            <a:lnRef idx="2">
+              <a:schemeClr val="accent1">
+                <a:shade val="50000"/>
+              </a:schemeClr>
+            </a:lnRef>
+            <a:fillRef idx="1">
+              <a:schemeClr val="accent1"/>
+            </a:fillRef>
+            <a:effectRef idx="0">
+              <a:schemeClr val="accent1"/>
+            </a:effectRef>
+            <a:fontRef idx="minor">
+              <a:schemeClr val="lt1"/>
+            </a:fontRef>
+          </p:style>
+          <p:txBody>
+            <a:bodyPr rtlCol="0" anchor="ctr"/>
+            <a:lstStyle/>
+            <a:p>
+              <a:pPr algn="ctr"/>
+              <a:endParaRPr lang="en-US"/>
+            </a:p>
+          </p:txBody>
+        </p:sp>
+      </p:grpSp>
     </p:spTree>
     <p:extLst>
       <p:ext uri="{BB962C8B-B14F-4D97-AF65-F5344CB8AC3E}">

</xml_diff>

<commit_message>
Update Architecture diagram to include storeSource, loaders, and creations
</commit_message>
<xml_diff>
--- a/docs/architecture.pptx
+++ b/docs/architecture.pptx
@@ -262,7 +262,7 @@
           <a:p>
             <a:fld id="{0A05F3B5-6F50-4323-80C0-955EB0110BAC}" type="datetimeFigureOut">
               <a:rPr lang="en-US" smtClean="0"/>
-              <a:t>12/9/2017</a:t>
+              <a:t>12/10/2017</a:t>
             </a:fld>
             <a:endParaRPr lang="en-US"/>
           </a:p>
@@ -432,7 +432,7 @@
           <a:p>
             <a:fld id="{0A05F3B5-6F50-4323-80C0-955EB0110BAC}" type="datetimeFigureOut">
               <a:rPr lang="en-US" smtClean="0"/>
-              <a:t>12/9/2017</a:t>
+              <a:t>12/10/2017</a:t>
             </a:fld>
             <a:endParaRPr lang="en-US"/>
           </a:p>
@@ -612,7 +612,7 @@
           <a:p>
             <a:fld id="{0A05F3B5-6F50-4323-80C0-955EB0110BAC}" type="datetimeFigureOut">
               <a:rPr lang="en-US" smtClean="0"/>
-              <a:t>12/9/2017</a:t>
+              <a:t>12/10/2017</a:t>
             </a:fld>
             <a:endParaRPr lang="en-US"/>
           </a:p>
@@ -782,7 +782,7 @@
           <a:p>
             <a:fld id="{0A05F3B5-6F50-4323-80C0-955EB0110BAC}" type="datetimeFigureOut">
               <a:rPr lang="en-US" smtClean="0"/>
-              <a:t>12/9/2017</a:t>
+              <a:t>12/10/2017</a:t>
             </a:fld>
             <a:endParaRPr lang="en-US"/>
           </a:p>
@@ -1026,7 +1026,7 @@
           <a:p>
             <a:fld id="{0A05F3B5-6F50-4323-80C0-955EB0110BAC}" type="datetimeFigureOut">
               <a:rPr lang="en-US" smtClean="0"/>
-              <a:t>12/9/2017</a:t>
+              <a:t>12/10/2017</a:t>
             </a:fld>
             <a:endParaRPr lang="en-US"/>
           </a:p>
@@ -1258,7 +1258,7 @@
           <a:p>
             <a:fld id="{0A05F3B5-6F50-4323-80C0-955EB0110BAC}" type="datetimeFigureOut">
               <a:rPr lang="en-US" smtClean="0"/>
-              <a:t>12/9/2017</a:t>
+              <a:t>12/10/2017</a:t>
             </a:fld>
             <a:endParaRPr lang="en-US"/>
           </a:p>
@@ -1625,7 +1625,7 @@
           <a:p>
             <a:fld id="{0A05F3B5-6F50-4323-80C0-955EB0110BAC}" type="datetimeFigureOut">
               <a:rPr lang="en-US" smtClean="0"/>
-              <a:t>12/9/2017</a:t>
+              <a:t>12/10/2017</a:t>
             </a:fld>
             <a:endParaRPr lang="en-US"/>
           </a:p>
@@ -1743,7 +1743,7 @@
           <a:p>
             <a:fld id="{0A05F3B5-6F50-4323-80C0-955EB0110BAC}" type="datetimeFigureOut">
               <a:rPr lang="en-US" smtClean="0"/>
-              <a:t>12/9/2017</a:t>
+              <a:t>12/10/2017</a:t>
             </a:fld>
             <a:endParaRPr lang="en-US"/>
           </a:p>
@@ -1838,7 +1838,7 @@
           <a:p>
             <a:fld id="{0A05F3B5-6F50-4323-80C0-955EB0110BAC}" type="datetimeFigureOut">
               <a:rPr lang="en-US" smtClean="0"/>
-              <a:t>12/9/2017</a:t>
+              <a:t>12/10/2017</a:t>
             </a:fld>
             <a:endParaRPr lang="en-US"/>
           </a:p>
@@ -2115,7 +2115,7 @@
           <a:p>
             <a:fld id="{0A05F3B5-6F50-4323-80C0-955EB0110BAC}" type="datetimeFigureOut">
               <a:rPr lang="en-US" smtClean="0"/>
-              <a:t>12/9/2017</a:t>
+              <a:t>12/10/2017</a:t>
             </a:fld>
             <a:endParaRPr lang="en-US"/>
           </a:p>
@@ -2372,7 +2372,7 @@
           <a:p>
             <a:fld id="{0A05F3B5-6F50-4323-80C0-955EB0110BAC}" type="datetimeFigureOut">
               <a:rPr lang="en-US" smtClean="0"/>
-              <a:t>12/9/2017</a:t>
+              <a:t>12/10/2017</a:t>
             </a:fld>
             <a:endParaRPr lang="en-US"/>
           </a:p>
@@ -2585,7 +2585,7 @@
           <a:p>
             <a:fld id="{0A05F3B5-6F50-4323-80C0-955EB0110BAC}" type="datetimeFigureOut">
               <a:rPr lang="en-US" smtClean="0"/>
-              <a:t>12/9/2017</a:t>
+              <a:t>12/10/2017</a:t>
             </a:fld>
             <a:endParaRPr lang="en-US"/>
           </a:p>
@@ -5436,6 +5436,190 @@
           <a:chExt cx="0" cy="0"/>
         </a:xfrm>
       </p:grpSpPr>
+      <p:cxnSp>
+        <p:nvCxnSpPr>
+          <p:cNvPr id="213" name="Straight Arrow Connector 212">
+            <a:extLst>
+              <a:ext uri="{FF2B5EF4-FFF2-40B4-BE49-F238E27FC236}">
+                <a16:creationId xmlns:a16="http://schemas.microsoft.com/office/drawing/2014/main" id="{A9ABA01D-D24D-4271-9E63-E950FDA48EF7}"/>
+              </a:ext>
+            </a:extLst>
+          </p:cNvPr>
+          <p:cNvCxnSpPr>
+            <a:cxnSpLocks/>
+            <a:stCxn id="92" idx="3"/>
+            <a:endCxn id="180" idx="3"/>
+          </p:cNvCxnSpPr>
+          <p:nvPr/>
+        </p:nvCxnSpPr>
+        <p:spPr>
+          <a:xfrm flipH="1">
+            <a:off x="17091131" y="23984139"/>
+            <a:ext cx="6626491" cy="722998"/>
+          </a:xfrm>
+          <a:prstGeom prst="straightConnector1">
+            <a:avLst/>
+          </a:prstGeom>
+          <a:ln w="28575">
+            <a:solidFill>
+              <a:srgbClr val="92D050"/>
+            </a:solidFill>
+            <a:tailEnd type="triangle"/>
+          </a:ln>
+        </p:spPr>
+        <p:style>
+          <a:lnRef idx="1">
+            <a:schemeClr val="accent1"/>
+          </a:lnRef>
+          <a:fillRef idx="0">
+            <a:schemeClr val="accent1"/>
+          </a:fillRef>
+          <a:effectRef idx="0">
+            <a:schemeClr val="accent1"/>
+          </a:effectRef>
+          <a:fontRef idx="minor">
+            <a:schemeClr val="tx1"/>
+          </a:fontRef>
+        </p:style>
+      </p:cxnSp>
+      <p:cxnSp>
+        <p:nvCxnSpPr>
+          <p:cNvPr id="217" name="Straight Arrow Connector 216">
+            <a:extLst>
+              <a:ext uri="{FF2B5EF4-FFF2-40B4-BE49-F238E27FC236}">
+                <a16:creationId xmlns:a16="http://schemas.microsoft.com/office/drawing/2014/main" id="{BB68E463-C5A3-4317-ACF8-81A3E5F530C4}"/>
+              </a:ext>
+            </a:extLst>
+          </p:cNvPr>
+          <p:cNvCxnSpPr>
+            <a:cxnSpLocks/>
+            <a:stCxn id="14" idx="1"/>
+            <a:endCxn id="188" idx="3"/>
+          </p:cNvCxnSpPr>
+          <p:nvPr/>
+        </p:nvCxnSpPr>
+        <p:spPr>
+          <a:xfrm flipH="1">
+            <a:off x="17093758" y="24011395"/>
+            <a:ext cx="7461091" cy="1076273"/>
+          </a:xfrm>
+          <a:prstGeom prst="straightConnector1">
+            <a:avLst/>
+          </a:prstGeom>
+          <a:ln w="28575">
+            <a:solidFill>
+              <a:srgbClr val="92D050"/>
+            </a:solidFill>
+            <a:tailEnd type="triangle"/>
+          </a:ln>
+        </p:spPr>
+        <p:style>
+          <a:lnRef idx="1">
+            <a:schemeClr val="accent1"/>
+          </a:lnRef>
+          <a:fillRef idx="0">
+            <a:schemeClr val="accent1"/>
+          </a:fillRef>
+          <a:effectRef idx="0">
+            <a:schemeClr val="accent1"/>
+          </a:effectRef>
+          <a:fontRef idx="minor">
+            <a:schemeClr val="tx1"/>
+          </a:fontRef>
+        </p:style>
+      </p:cxnSp>
+      <p:cxnSp>
+        <p:nvCxnSpPr>
+          <p:cNvPr id="220" name="Straight Arrow Connector 219">
+            <a:extLst>
+              <a:ext uri="{FF2B5EF4-FFF2-40B4-BE49-F238E27FC236}">
+                <a16:creationId xmlns:a16="http://schemas.microsoft.com/office/drawing/2014/main" id="{1BB03162-E841-4337-B43D-EB7E7880294A}"/>
+              </a:ext>
+            </a:extLst>
+          </p:cNvPr>
+          <p:cNvCxnSpPr>
+            <a:cxnSpLocks/>
+            <a:stCxn id="15" idx="1"/>
+            <a:endCxn id="196" idx="3"/>
+          </p:cNvCxnSpPr>
+          <p:nvPr/>
+        </p:nvCxnSpPr>
+        <p:spPr>
+          <a:xfrm flipH="1">
+            <a:off x="17091131" y="24004889"/>
+            <a:ext cx="8326495" cy="1434480"/>
+          </a:xfrm>
+          <a:prstGeom prst="straightConnector1">
+            <a:avLst/>
+          </a:prstGeom>
+          <a:ln w="28575">
+            <a:solidFill>
+              <a:srgbClr val="92D050"/>
+            </a:solidFill>
+            <a:tailEnd type="triangle"/>
+          </a:ln>
+        </p:spPr>
+        <p:style>
+          <a:lnRef idx="1">
+            <a:schemeClr val="accent1"/>
+          </a:lnRef>
+          <a:fillRef idx="0">
+            <a:schemeClr val="accent1"/>
+          </a:fillRef>
+          <a:effectRef idx="0">
+            <a:schemeClr val="accent1"/>
+          </a:effectRef>
+          <a:fontRef idx="minor">
+            <a:schemeClr val="tx1"/>
+          </a:fontRef>
+        </p:style>
+      </p:cxnSp>
+      <p:cxnSp>
+        <p:nvCxnSpPr>
+          <p:cNvPr id="210" name="Straight Arrow Connector 209">
+            <a:extLst>
+              <a:ext uri="{FF2B5EF4-FFF2-40B4-BE49-F238E27FC236}">
+                <a16:creationId xmlns:a16="http://schemas.microsoft.com/office/drawing/2014/main" id="{1F1C2115-404C-4E3A-B9A5-6E267DF6143D}"/>
+              </a:ext>
+            </a:extLst>
+          </p:cNvPr>
+          <p:cNvCxnSpPr>
+            <a:cxnSpLocks/>
+            <a:stCxn id="92" idx="1"/>
+            <a:endCxn id="175" idx="3"/>
+          </p:cNvCxnSpPr>
+          <p:nvPr/>
+        </p:nvCxnSpPr>
+        <p:spPr>
+          <a:xfrm flipH="1">
+            <a:off x="17091131" y="23984139"/>
+            <a:ext cx="4703481" cy="321556"/>
+          </a:xfrm>
+          <a:prstGeom prst="straightConnector1">
+            <a:avLst/>
+          </a:prstGeom>
+          <a:ln w="28575">
+            <a:solidFill>
+              <a:srgbClr val="92D050"/>
+            </a:solidFill>
+            <a:tailEnd type="triangle"/>
+          </a:ln>
+        </p:spPr>
+        <p:style>
+          <a:lnRef idx="1">
+            <a:schemeClr val="accent1"/>
+          </a:lnRef>
+          <a:fillRef idx="0">
+            <a:schemeClr val="accent1"/>
+          </a:fillRef>
+          <a:effectRef idx="0">
+            <a:schemeClr val="accent1"/>
+          </a:effectRef>
+          <a:fontRef idx="minor">
+            <a:schemeClr val="tx1"/>
+          </a:fontRef>
+        </p:style>
+      </p:cxnSp>
       <p:sp>
         <p:nvSpPr>
           <p:cNvPr id="39" name="TextBox 38">
@@ -7669,7 +7853,7 @@
           </a:prstGeom>
           <a:ln w="3175">
             <a:solidFill>
-              <a:srgbClr val="00B050"/>
+              <a:srgbClr val="00B0F0"/>
             </a:solidFill>
             <a:tailEnd type="triangle"/>
           </a:ln>
@@ -7715,7 +7899,7 @@
           </a:prstGeom>
           <a:ln w="3175">
             <a:solidFill>
-              <a:srgbClr val="00B050"/>
+              <a:srgbClr val="00B0F0"/>
             </a:solidFill>
             <a:tailEnd type="triangle"/>
           </a:ln>
@@ -8033,6 +8217,9 @@
             <a:avLst/>
           </a:prstGeom>
           <a:ln>
+            <a:solidFill>
+              <a:srgbClr val="00B0F0"/>
+            </a:solidFill>
             <a:tailEnd type="triangle"/>
           </a:ln>
         </p:spPr>
@@ -8076,6 +8263,9 @@
             <a:avLst/>
           </a:prstGeom>
           <a:ln>
+            <a:solidFill>
+              <a:srgbClr val="00B050"/>
+            </a:solidFill>
             <a:tailEnd type="triangle"/>
           </a:ln>
         </p:spPr>
@@ -8119,6 +8309,9 @@
             <a:avLst/>
           </a:prstGeom>
           <a:ln>
+            <a:solidFill>
+              <a:srgbClr val="00B050"/>
+            </a:solidFill>
             <a:tailEnd type="triangle"/>
           </a:ln>
         </p:spPr>
@@ -8201,6 +8394,9 @@
             <a:avLst/>
           </a:prstGeom>
           <a:ln>
+            <a:solidFill>
+              <a:srgbClr val="FFC000"/>
+            </a:solidFill>
             <a:tailEnd type="triangle"/>
           </a:ln>
         </p:spPr>
@@ -8333,6 +8529,9 @@
             <a:avLst/>
           </a:prstGeom>
           <a:ln>
+            <a:solidFill>
+              <a:srgbClr val="00B050"/>
+            </a:solidFill>
             <a:tailEnd type="triangle"/>
           </a:ln>
         </p:spPr>
@@ -8372,6 +8571,11 @@
             <a:avLst/>
           </a:prstGeom>
           <a:noFill/>
+          <a:ln>
+            <a:solidFill>
+              <a:srgbClr val="00B050"/>
+            </a:solidFill>
+          </a:ln>
         </p:spPr>
         <p:txBody>
           <a:bodyPr wrap="square" rtlCol="0">
@@ -8411,6 +8615,9 @@
             <a:avLst/>
           </a:prstGeom>
           <a:ln>
+            <a:solidFill>
+              <a:schemeClr val="accent4"/>
+            </a:solidFill>
             <a:tailEnd type="triangle"/>
           </a:ln>
         </p:spPr>
@@ -8598,7 +8805,7 @@
           </a:prstGeom>
           <a:ln w="3175">
             <a:solidFill>
-              <a:srgbClr val="00B050"/>
+              <a:srgbClr val="00B0F0"/>
             </a:solidFill>
             <a:tailEnd type="triangle"/>
           </a:ln>
@@ -8644,7 +8851,7 @@
           </a:prstGeom>
           <a:ln w="3175">
             <a:solidFill>
-              <a:srgbClr val="00B050"/>
+              <a:srgbClr val="00B0F0"/>
             </a:solidFill>
             <a:tailEnd type="triangle"/>
           </a:ln>
@@ -8786,7 +8993,7 @@
           </a:prstGeom>
           <a:ln w="3175">
             <a:solidFill>
-              <a:srgbClr val="00B050"/>
+              <a:srgbClr val="00B0F0"/>
             </a:solidFill>
             <a:tailEnd type="triangle"/>
           </a:ln>
@@ -8884,7 +9091,7 @@
           </a:prstGeom>
           <a:ln w="3175">
             <a:solidFill>
-              <a:srgbClr val="00B050"/>
+              <a:srgbClr val="00B0F0"/>
             </a:solidFill>
             <a:tailEnd type="triangle"/>
           </a:ln>
@@ -9148,6 +9355,9 @@
             <a:avLst/>
           </a:prstGeom>
           <a:ln>
+            <a:solidFill>
+              <a:srgbClr val="00B050"/>
+            </a:solidFill>
             <a:tailEnd type="triangle"/>
           </a:ln>
         </p:spPr>
@@ -9231,6 +9441,11 @@
           <a:prstGeom prst="line">
             <a:avLst/>
           </a:prstGeom>
+          <a:ln>
+            <a:solidFill>
+              <a:srgbClr val="00B050"/>
+            </a:solidFill>
+          </a:ln>
         </p:spPr>
         <p:style>
           <a:lnRef idx="1">
@@ -10129,7 +10344,7 @@
           </a:prstGeom>
           <a:ln w="3175">
             <a:solidFill>
-              <a:srgbClr val="00B050"/>
+              <a:srgbClr val="00B0F0"/>
             </a:solidFill>
             <a:tailEnd type="triangle"/>
           </a:ln>
@@ -10174,7 +10389,7 @@
           </a:prstGeom>
           <a:ln w="3175">
             <a:solidFill>
-              <a:srgbClr val="00B050"/>
+              <a:srgbClr val="00B0F0"/>
             </a:solidFill>
             <a:tailEnd type="triangle"/>
           </a:ln>
@@ -10405,7 +10620,9 @@
           </a:prstGeom>
           <a:noFill/>
           <a:ln>
-            <a:noFill/>
+            <a:solidFill>
+              <a:srgbClr val="00B0F0"/>
+            </a:solidFill>
           </a:ln>
         </p:spPr>
         <p:txBody>
@@ -10417,7 +10634,7 @@
             <a:r>
               <a:rPr lang="en-US" sz="1200" dirty="0">
                 <a:solidFill>
-                  <a:schemeClr val="accent6"/>
+                  <a:srgbClr val="00B0F0"/>
                 </a:solidFill>
               </a:rPr>
               <a:t>Updates</a:t>
@@ -10449,7 +10666,7 @@
           </a:prstGeom>
           <a:ln>
             <a:solidFill>
-              <a:schemeClr val="accent6"/>
+              <a:srgbClr val="00B0F0"/>
             </a:solidFill>
             <a:tailEnd type="triangle"/>
           </a:ln>
@@ -10586,7 +10803,7 @@
           </a:prstGeom>
           <a:ln w="3175">
             <a:solidFill>
-              <a:srgbClr val="00B050"/>
+              <a:srgbClr val="00B0F0"/>
             </a:solidFill>
             <a:tailEnd type="triangle"/>
           </a:ln>
@@ -10627,6 +10844,11 @@
             <a:avLst/>
           </a:prstGeom>
           <a:noFill/>
+          <a:ln>
+            <a:solidFill>
+              <a:srgbClr val="00B0F0"/>
+            </a:solidFill>
+          </a:ln>
         </p:spPr>
         <p:txBody>
           <a:bodyPr vert="eaVert" wrap="square" rtlCol="0">
@@ -10637,7 +10859,7 @@
             <a:r>
               <a:rPr lang="en-US" sz="400" dirty="0">
                 <a:solidFill>
-                  <a:schemeClr val="accent6"/>
+                  <a:srgbClr val="00B0F0"/>
                 </a:solidFill>
               </a:rPr>
               <a:t>Publishes via </a:t>
@@ -10645,7 +10867,7 @@
             <a:r>
               <a:rPr lang="en-US" sz="400" dirty="0" err="1">
                 <a:solidFill>
-                  <a:schemeClr val="accent6"/>
+                  <a:srgbClr val="00B0F0"/>
                 </a:solidFill>
               </a:rPr>
               <a:t>onUpdate</a:t>
@@ -10653,7 +10875,7 @@
             <a:r>
               <a:rPr lang="en-US" sz="400" dirty="0">
                 <a:solidFill>
-                  <a:schemeClr val="accent6"/>
+                  <a:srgbClr val="00B0F0"/>
                 </a:solidFill>
               </a:rPr>
               <a:t> the entire .</a:t>
@@ -10661,7 +10883,7 @@
             <a:r>
               <a:rPr lang="en-US" sz="400" dirty="0" err="1">
                 <a:solidFill>
-                  <a:schemeClr val="accent6"/>
+                  <a:srgbClr val="00B0F0"/>
                 </a:solidFill>
               </a:rPr>
               <a:t>val</a:t>
@@ -10669,7 +10891,7 @@
             <a:r>
               <a:rPr lang="en-US" sz="400" dirty="0">
                 <a:solidFill>
-                  <a:schemeClr val="accent6"/>
+                  <a:srgbClr val="00B0F0"/>
                 </a:solidFill>
               </a:rPr>
               <a:t>() of the tree</a:t>
@@ -10705,7 +10927,7 @@
           </a:prstGeom>
           <a:ln w="9525">
             <a:solidFill>
-              <a:srgbClr val="00B050"/>
+              <a:srgbClr val="00B0F0"/>
             </a:solidFill>
             <a:tailEnd type="triangle"/>
           </a:ln>
@@ -10753,7 +10975,7 @@
           </a:prstGeom>
           <a:ln w="19050">
             <a:solidFill>
-              <a:srgbClr val="00B050"/>
+              <a:srgbClr val="00B0F0"/>
             </a:solidFill>
             <a:tailEnd type="triangle"/>
           </a:ln>
@@ -10870,7 +11092,7 @@
           </a:prstGeom>
           <a:ln w="38100">
             <a:solidFill>
-              <a:srgbClr val="00B050"/>
+              <a:srgbClr val="00B0F0"/>
             </a:solidFill>
             <a:tailEnd type="triangle"/>
           </a:ln>
@@ -11815,6 +12037,9 @@
             <a:avLst/>
           </a:prstGeom>
           <a:ln>
+            <a:solidFill>
+              <a:srgbClr val="00B0F0"/>
+            </a:solidFill>
             <a:tailEnd type="triangle"/>
           </a:ln>
         </p:spPr>
@@ -12075,6 +12300,9 @@
             <a:avLst/>
           </a:prstGeom>
           <a:ln>
+            <a:solidFill>
+              <a:srgbClr val="FFC000"/>
+            </a:solidFill>
             <a:tailEnd type="triangle"/>
           </a:ln>
         </p:spPr>
@@ -12192,6 +12420,11 @@
             <a:avLst/>
           </a:prstGeom>
           <a:noFill/>
+          <a:ln>
+            <a:solidFill>
+              <a:schemeClr val="tx1"/>
+            </a:solidFill>
+          </a:ln>
         </p:spPr>
         <p:txBody>
           <a:bodyPr wrap="square" rtlCol="0">
@@ -12225,13 +12458,16 @@
         </p:nvCxnSpPr>
         <p:spPr>
           <a:xfrm flipH="1" flipV="1">
-            <a:off x="17314213" y="20255893"/>
-            <a:ext cx="95508" cy="733117"/>
+            <a:off x="16709140" y="20204204"/>
+            <a:ext cx="700581" cy="784806"/>
           </a:xfrm>
           <a:prstGeom prst="straightConnector1">
             <a:avLst/>
           </a:prstGeom>
           <a:ln>
+            <a:solidFill>
+              <a:srgbClr val="00B0F0"/>
+            </a:solidFill>
             <a:tailEnd type="triangle"/>
           </a:ln>
         </p:spPr>
@@ -12264,7 +12500,7 @@
         </p:nvSpPr>
         <p:spPr>
           <a:xfrm>
-            <a:off x="17640370" y="20170688"/>
+            <a:off x="17035297" y="20118999"/>
             <a:ext cx="861489" cy="400110"/>
           </a:xfrm>
           <a:prstGeom prst="rect">
@@ -12374,7 +12610,7 @@
         </p:nvGrpSpPr>
         <p:grpSpPr>
           <a:xfrm>
-            <a:off x="16966170" y="20102004"/>
+            <a:off x="16361097" y="20050315"/>
             <a:ext cx="765257" cy="153889"/>
             <a:chOff x="17131674" y="20101587"/>
             <a:chExt cx="611354" cy="122849"/>
@@ -12436,6 +12672,7 @@
             <a:prstGeom prst="diamond">
               <a:avLst/>
             </a:prstGeom>
+            <a:noFill/>
           </p:spPr>
           <p:style>
             <a:lnRef idx="2">
@@ -12458,7 +12695,7 @@
             <a:lstStyle/>
             <a:p>
               <a:pPr algn="ctr"/>
-              <a:endParaRPr lang="en-US"/>
+              <a:endParaRPr lang="en-US" dirty="0"/>
             </a:p>
           </p:txBody>
         </p:sp>
@@ -12477,10 +12714,10 @@
         </p:nvGrpSpPr>
         <p:grpSpPr>
           <a:xfrm>
-            <a:off x="17667076" y="19990279"/>
-            <a:ext cx="571126" cy="211437"/>
-            <a:chOff x="17667076" y="19990279"/>
-            <a:chExt cx="571126" cy="211437"/>
+            <a:off x="17062003" y="19938590"/>
+            <a:ext cx="1111848" cy="211437"/>
+            <a:chOff x="17126354" y="19990279"/>
+            <a:chExt cx="1111848" cy="211437"/>
           </a:xfrm>
         </p:grpSpPr>
         <p:cxnSp>
@@ -12501,13 +12738,16 @@
           </p:nvCxnSpPr>
           <p:spPr>
             <a:xfrm flipV="1">
-              <a:off x="17731427" y="20175262"/>
+              <a:off x="17126354" y="20175262"/>
               <a:ext cx="436449" cy="26454"/>
             </a:xfrm>
             <a:prstGeom prst="straightConnector1">
               <a:avLst/>
             </a:prstGeom>
             <a:ln>
+              <a:solidFill>
+                <a:srgbClr val="00B0F0"/>
+              </a:solidFill>
               <a:tailEnd type="triangle"/>
             </a:ln>
           </p:spPr>
@@ -12547,6 +12787,11 @@
               <a:avLst/>
             </a:prstGeom>
             <a:noFill/>
+            <a:ln>
+              <a:solidFill>
+                <a:srgbClr val="00B0F0"/>
+              </a:solidFill>
+            </a:ln>
           </p:spPr>
           <p:txBody>
             <a:bodyPr wrap="square" rtlCol="0">
@@ -12576,7 +12821,7 @@
         </p:nvSpPr>
         <p:spPr>
           <a:xfrm>
-            <a:off x="18167876" y="19924455"/>
+            <a:off x="17562803" y="19872766"/>
             <a:ext cx="698809" cy="153888"/>
           </a:xfrm>
           <a:prstGeom prst="rect">
@@ -12612,7 +12857,7 @@
         </p:nvSpPr>
         <p:spPr>
           <a:xfrm>
-            <a:off x="17821017" y="19659473"/>
+            <a:off x="17656172" y="19414848"/>
             <a:ext cx="599413" cy="215444"/>
           </a:xfrm>
           <a:prstGeom prst="rect">
@@ -12630,7 +12875,7 @@
               <a:rPr lang="en-US" sz="400" dirty="0" err="1"/>
               <a:t>renderedNodes</a:t>
             </a:r>
-            <a:endParaRPr lang="en-US" sz="400"/>
+            <a:endParaRPr lang="en-US" sz="400" dirty="0"/>
           </a:p>
           <a:p>
             <a:endParaRPr lang="en-US" sz="400" dirty="0"/>
@@ -12854,6 +13099,11 @@
           <a:prstGeom prst="line">
             <a:avLst/>
           </a:prstGeom>
+          <a:ln>
+            <a:solidFill>
+              <a:srgbClr val="00B0F0"/>
+            </a:solidFill>
+          </a:ln>
         </p:spPr>
         <p:style>
           <a:lnRef idx="1">
@@ -12927,9 +13177,9 @@
         </p:nvGrpSpPr>
         <p:grpSpPr>
           <a:xfrm>
-            <a:off x="15119419" y="23803237"/>
+            <a:off x="15122364" y="23757096"/>
             <a:ext cx="445475" cy="153888"/>
-            <a:chOff x="15107011" y="23742908"/>
+            <a:chOff x="15109956" y="23755534"/>
             <a:chExt cx="445475" cy="153888"/>
           </a:xfrm>
         </p:grpSpPr>
@@ -12947,7 +13197,7 @@
           </p:nvSpPr>
           <p:spPr>
             <a:xfrm>
-              <a:off x="15107011" y="23742908"/>
+              <a:off x="15109956" y="23755534"/>
               <a:ext cx="445475" cy="153888"/>
             </a:xfrm>
             <a:prstGeom prst="rect">
@@ -13019,46 +13269,6 @@
       </p:grpSp>
       <p:cxnSp>
         <p:nvCxnSpPr>
-          <p:cNvPr id="229" name="Straight Connector 228">
-            <a:extLst>
-              <a:ext uri="{FF2B5EF4-FFF2-40B4-BE49-F238E27FC236}">
-                <a16:creationId xmlns:a16="http://schemas.microsoft.com/office/drawing/2014/main" id="{C4093DAC-B0F0-4FBC-9C1C-2DCFC4559793}"/>
-              </a:ext>
-            </a:extLst>
-          </p:cNvPr>
-          <p:cNvCxnSpPr>
-            <a:cxnSpLocks/>
-            <a:stCxn id="225" idx="3"/>
-            <a:endCxn id="7" idx="1"/>
-          </p:cNvCxnSpPr>
-          <p:nvPr/>
-        </p:nvCxnSpPr>
-        <p:spPr>
-          <a:xfrm flipV="1">
-            <a:off x="15541773" y="23839936"/>
-            <a:ext cx="989884" cy="53245"/>
-          </a:xfrm>
-          <a:prstGeom prst="line">
-            <a:avLst/>
-          </a:prstGeom>
-        </p:spPr>
-        <p:style>
-          <a:lnRef idx="1">
-            <a:schemeClr val="accent1"/>
-          </a:lnRef>
-          <a:fillRef idx="0">
-            <a:schemeClr val="accent1"/>
-          </a:fillRef>
-          <a:effectRef idx="0">
-            <a:schemeClr val="accent1"/>
-          </a:effectRef>
-          <a:fontRef idx="minor">
-            <a:schemeClr val="tx1"/>
-          </a:fontRef>
-        </p:style>
-      </p:cxnSp>
-      <p:cxnSp>
-        <p:nvCxnSpPr>
           <p:cNvPr id="242" name="Straight Arrow Connector 241">
             <a:extLst>
               <a:ext uri="{FF2B5EF4-FFF2-40B4-BE49-F238E27FC236}">
@@ -13075,13 +13285,16 @@
         </p:nvCxnSpPr>
         <p:spPr>
           <a:xfrm flipV="1">
-            <a:off x="16811394" y="21052198"/>
-            <a:ext cx="1734404" cy="2618461"/>
+            <a:off x="16811394" y="20994970"/>
+            <a:ext cx="1180759" cy="2675689"/>
           </a:xfrm>
           <a:prstGeom prst="straightConnector1">
             <a:avLst/>
           </a:prstGeom>
           <a:ln>
+            <a:solidFill>
+              <a:srgbClr val="92D050"/>
+            </a:solidFill>
             <a:prstDash val="sysDash"/>
             <a:tailEnd type="triangle"/>
           </a:ln>
@@ -13115,7 +13328,7 @@
         </p:nvSpPr>
         <p:spPr>
           <a:xfrm>
-            <a:off x="18546281" y="20010651"/>
+            <a:off x="17941208" y="19958962"/>
             <a:ext cx="965310" cy="215444"/>
           </a:xfrm>
           <a:prstGeom prst="rect">
@@ -13151,13 +13364,18 @@
         </p:nvSpPr>
         <p:spPr>
           <a:xfrm>
-            <a:off x="18211535" y="20052962"/>
+            <a:off x="17606462" y="20001273"/>
             <a:ext cx="1149670" cy="413144"/>
           </a:xfrm>
           <a:prstGeom prst="roundRect">
             <a:avLst/>
           </a:prstGeom>
           <a:noFill/>
+          <a:ln>
+            <a:solidFill>
+              <a:schemeClr val="tx1"/>
+            </a:solidFill>
+          </a:ln>
         </p:spPr>
         <p:style>
           <a:lnRef idx="2">
@@ -13198,7 +13416,7 @@
         </p:nvGrpSpPr>
         <p:grpSpPr>
           <a:xfrm>
-            <a:off x="18167876" y="20098318"/>
+            <a:off x="17562803" y="20046629"/>
             <a:ext cx="426899" cy="153888"/>
             <a:chOff x="18167876" y="20098318"/>
             <a:chExt cx="426899" cy="153888"/>
@@ -13225,6 +13443,11 @@
               <a:avLst/>
             </a:prstGeom>
             <a:noFill/>
+            <a:ln>
+              <a:solidFill>
+                <a:schemeClr val="tx1"/>
+              </a:solidFill>
+            </a:ln>
           </p:spPr>
           <p:txBody>
             <a:bodyPr wrap="square" rtlCol="0">
@@ -13261,6 +13484,11 @@
               <a:avLst/>
             </a:prstGeom>
             <a:noFill/>
+            <a:ln>
+              <a:solidFill>
+                <a:schemeClr val="tx1"/>
+              </a:solidFill>
+            </a:ln>
           </p:spPr>
           <p:style>
             <a:lnRef idx="2">
@@ -13302,7 +13530,7 @@
         </p:nvGrpSpPr>
         <p:grpSpPr>
           <a:xfrm>
-            <a:off x="18398522" y="20231503"/>
+            <a:off x="17793449" y="20179814"/>
             <a:ext cx="426899" cy="153888"/>
             <a:chOff x="18167876" y="20098318"/>
             <a:chExt cx="426899" cy="153888"/>
@@ -13329,6 +13557,11 @@
               <a:avLst/>
             </a:prstGeom>
             <a:noFill/>
+            <a:ln>
+              <a:solidFill>
+                <a:schemeClr val="tx1"/>
+              </a:solidFill>
+            </a:ln>
           </p:spPr>
           <p:txBody>
             <a:bodyPr wrap="square" rtlCol="0">
@@ -13365,6 +13598,11 @@
               <a:avLst/>
             </a:prstGeom>
             <a:noFill/>
+            <a:ln>
+              <a:solidFill>
+                <a:schemeClr val="tx1"/>
+              </a:solidFill>
+            </a:ln>
           </p:spPr>
           <p:style>
             <a:lnRef idx="2">
@@ -13406,7 +13644,7 @@
         </p:nvGrpSpPr>
         <p:grpSpPr>
           <a:xfrm>
-            <a:off x="18773514" y="20217315"/>
+            <a:off x="18168441" y="20165626"/>
             <a:ext cx="426899" cy="153888"/>
             <a:chOff x="18167876" y="20098318"/>
             <a:chExt cx="426899" cy="153888"/>
@@ -13433,6 +13671,11 @@
               <a:avLst/>
             </a:prstGeom>
             <a:noFill/>
+            <a:ln>
+              <a:solidFill>
+                <a:schemeClr val="tx1"/>
+              </a:solidFill>
+            </a:ln>
           </p:spPr>
           <p:txBody>
             <a:bodyPr wrap="square" rtlCol="0">
@@ -13469,6 +13712,11 @@
               <a:avLst/>
             </a:prstGeom>
             <a:noFill/>
+            <a:ln>
+              <a:solidFill>
+                <a:schemeClr val="tx1"/>
+              </a:solidFill>
+            </a:ln>
           </p:spPr>
           <p:style>
             <a:lnRef idx="2">
@@ -13510,7 +13758,7 @@
         </p:nvSpPr>
         <p:spPr>
           <a:xfrm>
-            <a:off x="18224910" y="20898310"/>
+            <a:off x="17671265" y="20841082"/>
             <a:ext cx="641775" cy="153888"/>
           </a:xfrm>
           <a:prstGeom prst="rect">
@@ -13542,6 +13790,7 @@
             </a:extLst>
           </p:cNvPr>
           <p:cNvCxnSpPr>
+            <a:cxnSpLocks/>
             <a:stCxn id="162" idx="0"/>
             <a:endCxn id="245" idx="2"/>
           </p:cNvCxnSpPr>
@@ -13549,13 +13798,16 @@
         </p:nvCxnSpPr>
         <p:spPr>
           <a:xfrm flipV="1">
-            <a:off x="18545798" y="20466106"/>
-            <a:ext cx="240572" cy="432204"/>
+            <a:off x="17992153" y="20414417"/>
+            <a:ext cx="189144" cy="426665"/>
           </a:xfrm>
           <a:prstGeom prst="straightConnector1">
             <a:avLst/>
           </a:prstGeom>
           <a:ln>
+            <a:solidFill>
+              <a:srgbClr val="92D050"/>
+            </a:solidFill>
             <a:tailEnd type="triangle"/>
           </a:ln>
         </p:spPr>
@@ -13588,7 +13840,7 @@
         </p:nvGrpSpPr>
         <p:grpSpPr>
           <a:xfrm>
-            <a:off x="18505086" y="20620882"/>
+            <a:off x="17900013" y="20569193"/>
             <a:ext cx="426899" cy="153888"/>
             <a:chOff x="18167876" y="20098318"/>
             <a:chExt cx="426899" cy="153888"/>
@@ -13615,6 +13867,11 @@
               <a:avLst/>
             </a:prstGeom>
             <a:noFill/>
+            <a:ln>
+              <a:solidFill>
+                <a:srgbClr val="92D050"/>
+              </a:solidFill>
+            </a:ln>
           </p:spPr>
           <p:txBody>
             <a:bodyPr wrap="square" rtlCol="0">
@@ -13651,6 +13908,11 @@
               <a:avLst/>
             </a:prstGeom>
             <a:noFill/>
+            <a:ln>
+              <a:solidFill>
+                <a:srgbClr val="92D050"/>
+              </a:solidFill>
+            </a:ln>
           </p:spPr>
           <p:style>
             <a:lnRef idx="2">
@@ -13678,6 +13940,1811 @@
           </p:txBody>
         </p:sp>
       </p:grpSp>
+      <p:sp>
+        <p:nvSpPr>
+          <p:cNvPr id="145" name="Rectangle: Rounded Corners 144">
+            <a:extLst>
+              <a:ext uri="{FF2B5EF4-FFF2-40B4-BE49-F238E27FC236}">
+                <a16:creationId xmlns:a16="http://schemas.microsoft.com/office/drawing/2014/main" id="{28BF087E-A588-4367-B5A3-3F3F312AE07D}"/>
+              </a:ext>
+            </a:extLst>
+          </p:cNvPr>
+          <p:cNvSpPr/>
+          <p:nvPr/>
+        </p:nvSpPr>
+        <p:spPr>
+          <a:xfrm>
+            <a:off x="17409721" y="19425648"/>
+            <a:ext cx="1149670" cy="413144"/>
+          </a:xfrm>
+          <a:prstGeom prst="roundRect">
+            <a:avLst/>
+          </a:prstGeom>
+          <a:noFill/>
+          <a:ln>
+            <a:solidFill>
+              <a:schemeClr val="tx1"/>
+            </a:solidFill>
+          </a:ln>
+        </p:spPr>
+        <p:style>
+          <a:lnRef idx="2">
+            <a:schemeClr val="accent1">
+              <a:shade val="50000"/>
+            </a:schemeClr>
+          </a:lnRef>
+          <a:fillRef idx="1">
+            <a:schemeClr val="accent1"/>
+          </a:fillRef>
+          <a:effectRef idx="0">
+            <a:schemeClr val="accent1"/>
+          </a:effectRef>
+          <a:fontRef idx="minor">
+            <a:schemeClr val="lt1"/>
+          </a:fontRef>
+        </p:style>
+        <p:txBody>
+          <a:bodyPr rtlCol="0" anchor="ctr"/>
+          <a:lstStyle/>
+          <a:p>
+            <a:pPr algn="ctr"/>
+            <a:endParaRPr lang="en-US"/>
+          </a:p>
+        </p:txBody>
+      </p:sp>
+      <p:sp>
+        <p:nvSpPr>
+          <p:cNvPr id="23" name="TextBox 22">
+            <a:extLst>
+              <a:ext uri="{FF2B5EF4-FFF2-40B4-BE49-F238E27FC236}">
+                <a16:creationId xmlns:a16="http://schemas.microsoft.com/office/drawing/2014/main" id="{B28ABA47-4264-4167-BC0E-9F7B51553B63}"/>
+              </a:ext>
+            </a:extLst>
+          </p:cNvPr>
+          <p:cNvSpPr txBox="1"/>
+          <p:nvPr/>
+        </p:nvSpPr>
+        <p:spPr>
+          <a:xfrm>
+            <a:off x="18718536" y="20688439"/>
+            <a:ext cx="833667" cy="153888"/>
+          </a:xfrm>
+          <a:prstGeom prst="rect">
+            <a:avLst/>
+          </a:prstGeom>
+          <a:noFill/>
+        </p:spPr>
+        <p:txBody>
+          <a:bodyPr wrap="square" rtlCol="0">
+            <a:spAutoFit/>
+          </a:bodyPr>
+          <a:lstStyle/>
+          <a:p>
+            <a:r>
+              <a:rPr lang="en-US" sz="400" dirty="0" err="1"/>
+              <a:t>sigmaRenderManager</a:t>
+            </a:r>
+            <a:endParaRPr lang="en-US" sz="400" dirty="0"/>
+          </a:p>
+        </p:txBody>
+      </p:sp>
+      <p:cxnSp>
+        <p:nvCxnSpPr>
+          <p:cNvPr id="228" name="Straight Arrow Connector 227">
+            <a:extLst>
+              <a:ext uri="{FF2B5EF4-FFF2-40B4-BE49-F238E27FC236}">
+                <a16:creationId xmlns:a16="http://schemas.microsoft.com/office/drawing/2014/main" id="{DDA2EC47-BE2B-4111-BF0E-C0C09A2EC269}"/>
+              </a:ext>
+            </a:extLst>
+          </p:cNvPr>
+          <p:cNvCxnSpPr>
+            <a:stCxn id="162" idx="3"/>
+            <a:endCxn id="23" idx="1"/>
+          </p:cNvCxnSpPr>
+          <p:nvPr/>
+        </p:nvCxnSpPr>
+        <p:spPr>
+          <a:xfrm flipV="1">
+            <a:off x="18313040" y="20765383"/>
+            <a:ext cx="405496" cy="152643"/>
+          </a:xfrm>
+          <a:prstGeom prst="straightConnector1">
+            <a:avLst/>
+          </a:prstGeom>
+          <a:ln>
+            <a:solidFill>
+              <a:srgbClr val="92D050"/>
+            </a:solidFill>
+            <a:tailEnd type="triangle"/>
+          </a:ln>
+        </p:spPr>
+        <p:style>
+          <a:lnRef idx="1">
+            <a:schemeClr val="accent1"/>
+          </a:lnRef>
+          <a:fillRef idx="0">
+            <a:schemeClr val="accent1"/>
+          </a:fillRef>
+          <a:effectRef idx="0">
+            <a:schemeClr val="accent1"/>
+          </a:effectRef>
+          <a:fontRef idx="minor">
+            <a:schemeClr val="tx1"/>
+          </a:fontRef>
+        </p:style>
+      </p:cxnSp>
+      <p:cxnSp>
+        <p:nvCxnSpPr>
+          <p:cNvPr id="157" name="Straight Arrow Connector 156">
+            <a:extLst>
+              <a:ext uri="{FF2B5EF4-FFF2-40B4-BE49-F238E27FC236}">
+                <a16:creationId xmlns:a16="http://schemas.microsoft.com/office/drawing/2014/main" id="{80140D86-8B27-4F9D-BB11-4EBCF19E2C08}"/>
+              </a:ext>
+            </a:extLst>
+          </p:cNvPr>
+          <p:cNvCxnSpPr>
+            <a:cxnSpLocks/>
+            <a:stCxn id="27" idx="2"/>
+            <a:endCxn id="23" idx="1"/>
+          </p:cNvCxnSpPr>
+          <p:nvPr/>
+        </p:nvCxnSpPr>
+        <p:spPr>
+          <a:xfrm>
+            <a:off x="16709140" y="20204204"/>
+            <a:ext cx="2009396" cy="561179"/>
+          </a:xfrm>
+          <a:prstGeom prst="straightConnector1">
+            <a:avLst/>
+          </a:prstGeom>
+          <a:ln>
+            <a:solidFill>
+              <a:srgbClr val="00B0F0"/>
+            </a:solidFill>
+            <a:tailEnd type="triangle"/>
+          </a:ln>
+        </p:spPr>
+        <p:style>
+          <a:lnRef idx="1">
+            <a:schemeClr val="accent1"/>
+          </a:lnRef>
+          <a:fillRef idx="0">
+            <a:schemeClr val="accent1"/>
+          </a:fillRef>
+          <a:effectRef idx="0">
+            <a:schemeClr val="accent1"/>
+          </a:effectRef>
+          <a:fontRef idx="minor">
+            <a:schemeClr val="tx1"/>
+          </a:fontRef>
+        </p:style>
+      </p:cxnSp>
+      <p:grpSp>
+        <p:nvGrpSpPr>
+          <p:cNvPr id="161" name="Group 160">
+            <a:extLst>
+              <a:ext uri="{FF2B5EF4-FFF2-40B4-BE49-F238E27FC236}">
+                <a16:creationId xmlns:a16="http://schemas.microsoft.com/office/drawing/2014/main" id="{E8994C0B-84D7-4371-83B7-6A373B966CE4}"/>
+              </a:ext>
+            </a:extLst>
+          </p:cNvPr>
+          <p:cNvGrpSpPr/>
+          <p:nvPr/>
+        </p:nvGrpSpPr>
+        <p:grpSpPr>
+          <a:xfrm>
+            <a:off x="17486589" y="19575163"/>
+            <a:ext cx="426899" cy="153888"/>
+            <a:chOff x="18167876" y="20098318"/>
+            <a:chExt cx="426899" cy="153888"/>
+          </a:xfrm>
+        </p:grpSpPr>
+        <p:sp>
+          <p:nvSpPr>
+            <p:cNvPr id="163" name="TextBox 162">
+              <a:extLst>
+                <a:ext uri="{FF2B5EF4-FFF2-40B4-BE49-F238E27FC236}">
+                  <a16:creationId xmlns:a16="http://schemas.microsoft.com/office/drawing/2014/main" id="{5CE7F8DB-901A-4FC7-BBB9-4F0C6516FA23}"/>
+                </a:ext>
+              </a:extLst>
+            </p:cNvPr>
+            <p:cNvSpPr txBox="1"/>
+            <p:nvPr/>
+          </p:nvSpPr>
+          <p:spPr>
+            <a:xfrm>
+              <a:off x="18167876" y="20098318"/>
+              <a:ext cx="426899" cy="153888"/>
+            </a:xfrm>
+            <a:prstGeom prst="rect">
+              <a:avLst/>
+            </a:prstGeom>
+            <a:noFill/>
+            <a:ln>
+              <a:solidFill>
+                <a:schemeClr val="tx1"/>
+              </a:solidFill>
+            </a:ln>
+          </p:spPr>
+          <p:txBody>
+            <a:bodyPr wrap="square" rtlCol="0">
+              <a:spAutoFit/>
+            </a:bodyPr>
+            <a:lstStyle/>
+            <a:p>
+              <a:r>
+                <a:rPr lang="en-US" sz="400" dirty="0" err="1"/>
+                <a:t>sigmaNode</a:t>
+              </a:r>
+              <a:endParaRPr lang="en-US" sz="400" dirty="0"/>
+            </a:p>
+          </p:txBody>
+        </p:sp>
+        <p:sp>
+          <p:nvSpPr>
+            <p:cNvPr id="167" name="Oval 166">
+              <a:extLst>
+                <a:ext uri="{FF2B5EF4-FFF2-40B4-BE49-F238E27FC236}">
+                  <a16:creationId xmlns:a16="http://schemas.microsoft.com/office/drawing/2014/main" id="{C5FB491B-758C-4D10-8E15-AD51AAC35D2E}"/>
+                </a:ext>
+              </a:extLst>
+            </p:cNvPr>
+            <p:cNvSpPr/>
+            <p:nvPr/>
+          </p:nvSpPr>
+          <p:spPr>
+            <a:xfrm>
+              <a:off x="18224910" y="20116528"/>
+              <a:ext cx="296863" cy="126948"/>
+            </a:xfrm>
+            <a:prstGeom prst="ellipse">
+              <a:avLst/>
+            </a:prstGeom>
+            <a:noFill/>
+            <a:ln>
+              <a:solidFill>
+                <a:schemeClr val="tx1"/>
+              </a:solidFill>
+            </a:ln>
+          </p:spPr>
+          <p:style>
+            <a:lnRef idx="2">
+              <a:schemeClr val="accent1">
+                <a:shade val="50000"/>
+              </a:schemeClr>
+            </a:lnRef>
+            <a:fillRef idx="1">
+              <a:schemeClr val="accent1"/>
+            </a:fillRef>
+            <a:effectRef idx="0">
+              <a:schemeClr val="accent1"/>
+            </a:effectRef>
+            <a:fontRef idx="minor">
+              <a:schemeClr val="lt1"/>
+            </a:fontRef>
+          </p:style>
+          <p:txBody>
+            <a:bodyPr rtlCol="0" anchor="ctr"/>
+            <a:lstStyle/>
+            <a:p>
+              <a:pPr algn="ctr"/>
+              <a:endParaRPr lang="en-US"/>
+            </a:p>
+          </p:txBody>
+        </p:sp>
+      </p:grpSp>
+      <p:grpSp>
+        <p:nvGrpSpPr>
+          <p:cNvPr id="168" name="Group 167">
+            <a:extLst>
+              <a:ext uri="{FF2B5EF4-FFF2-40B4-BE49-F238E27FC236}">
+                <a16:creationId xmlns:a16="http://schemas.microsoft.com/office/drawing/2014/main" id="{A333DD01-74A0-4918-8CB3-09337B6DD317}"/>
+              </a:ext>
+            </a:extLst>
+          </p:cNvPr>
+          <p:cNvGrpSpPr/>
+          <p:nvPr/>
+        </p:nvGrpSpPr>
+        <p:grpSpPr>
+          <a:xfrm>
+            <a:off x="17823310" y="19566816"/>
+            <a:ext cx="426899" cy="153888"/>
+            <a:chOff x="18167876" y="20098318"/>
+            <a:chExt cx="426899" cy="153888"/>
+          </a:xfrm>
+        </p:grpSpPr>
+        <p:sp>
+          <p:nvSpPr>
+            <p:cNvPr id="169" name="TextBox 168">
+              <a:extLst>
+                <a:ext uri="{FF2B5EF4-FFF2-40B4-BE49-F238E27FC236}">
+                  <a16:creationId xmlns:a16="http://schemas.microsoft.com/office/drawing/2014/main" id="{39E31B5F-BD2E-422C-96A0-CCDD129E8CC5}"/>
+                </a:ext>
+              </a:extLst>
+            </p:cNvPr>
+            <p:cNvSpPr txBox="1"/>
+            <p:nvPr/>
+          </p:nvSpPr>
+          <p:spPr>
+            <a:xfrm>
+              <a:off x="18167876" y="20098318"/>
+              <a:ext cx="426899" cy="153888"/>
+            </a:xfrm>
+            <a:prstGeom prst="rect">
+              <a:avLst/>
+            </a:prstGeom>
+            <a:noFill/>
+            <a:ln>
+              <a:solidFill>
+                <a:schemeClr val="tx1"/>
+              </a:solidFill>
+            </a:ln>
+          </p:spPr>
+          <p:txBody>
+            <a:bodyPr wrap="square" rtlCol="0">
+              <a:spAutoFit/>
+            </a:bodyPr>
+            <a:lstStyle/>
+            <a:p>
+              <a:r>
+                <a:rPr lang="en-US" sz="400" dirty="0" err="1"/>
+                <a:t>sigmaNode</a:t>
+              </a:r>
+              <a:endParaRPr lang="en-US" sz="400" dirty="0"/>
+            </a:p>
+          </p:txBody>
+        </p:sp>
+        <p:sp>
+          <p:nvSpPr>
+            <p:cNvPr id="170" name="Oval 169">
+              <a:extLst>
+                <a:ext uri="{FF2B5EF4-FFF2-40B4-BE49-F238E27FC236}">
+                  <a16:creationId xmlns:a16="http://schemas.microsoft.com/office/drawing/2014/main" id="{2503F500-078F-49CC-AF7D-5AD5C7A3B112}"/>
+                </a:ext>
+              </a:extLst>
+            </p:cNvPr>
+            <p:cNvSpPr/>
+            <p:nvPr/>
+          </p:nvSpPr>
+          <p:spPr>
+            <a:xfrm>
+              <a:off x="18224910" y="20116528"/>
+              <a:ext cx="296863" cy="126948"/>
+            </a:xfrm>
+            <a:prstGeom prst="ellipse">
+              <a:avLst/>
+            </a:prstGeom>
+            <a:noFill/>
+            <a:ln>
+              <a:solidFill>
+                <a:schemeClr val="tx1"/>
+              </a:solidFill>
+            </a:ln>
+          </p:spPr>
+          <p:style>
+            <a:lnRef idx="2">
+              <a:schemeClr val="accent1">
+                <a:shade val="50000"/>
+              </a:schemeClr>
+            </a:lnRef>
+            <a:fillRef idx="1">
+              <a:schemeClr val="accent1"/>
+            </a:fillRef>
+            <a:effectRef idx="0">
+              <a:schemeClr val="accent1"/>
+            </a:effectRef>
+            <a:fontRef idx="minor">
+              <a:schemeClr val="lt1"/>
+            </a:fontRef>
+          </p:style>
+          <p:txBody>
+            <a:bodyPr rtlCol="0" anchor="ctr"/>
+            <a:lstStyle/>
+            <a:p>
+              <a:pPr algn="ctr"/>
+              <a:endParaRPr lang="en-US"/>
+            </a:p>
+          </p:txBody>
+        </p:sp>
+      </p:grpSp>
+      <p:cxnSp>
+        <p:nvCxnSpPr>
+          <p:cNvPr id="171" name="Straight Arrow Connector 170">
+            <a:extLst>
+              <a:ext uri="{FF2B5EF4-FFF2-40B4-BE49-F238E27FC236}">
+                <a16:creationId xmlns:a16="http://schemas.microsoft.com/office/drawing/2014/main" id="{383815E1-A9F4-4267-9431-ACDB54866999}"/>
+              </a:ext>
+            </a:extLst>
+          </p:cNvPr>
+          <p:cNvCxnSpPr>
+            <a:cxnSpLocks/>
+            <a:stCxn id="23" idx="0"/>
+            <a:endCxn id="232" idx="2"/>
+          </p:cNvCxnSpPr>
+          <p:nvPr/>
+        </p:nvCxnSpPr>
+        <p:spPr>
+          <a:xfrm flipV="1">
+            <a:off x="19135370" y="19747830"/>
+            <a:ext cx="14800" cy="940609"/>
+          </a:xfrm>
+          <a:prstGeom prst="straightConnector1">
+            <a:avLst/>
+          </a:prstGeom>
+          <a:ln>
+            <a:prstDash val="sysDash"/>
+            <a:tailEnd type="triangle"/>
+          </a:ln>
+        </p:spPr>
+        <p:style>
+          <a:lnRef idx="1">
+            <a:schemeClr val="accent1"/>
+          </a:lnRef>
+          <a:fillRef idx="0">
+            <a:schemeClr val="accent1"/>
+          </a:fillRef>
+          <a:effectRef idx="0">
+            <a:schemeClr val="accent1"/>
+          </a:effectRef>
+          <a:fontRef idx="minor">
+            <a:schemeClr val="tx1"/>
+          </a:fontRef>
+        </p:style>
+      </p:cxnSp>
+      <p:grpSp>
+        <p:nvGrpSpPr>
+          <p:cNvPr id="241" name="Group 240">
+            <a:extLst>
+              <a:ext uri="{FF2B5EF4-FFF2-40B4-BE49-F238E27FC236}">
+                <a16:creationId xmlns:a16="http://schemas.microsoft.com/office/drawing/2014/main" id="{BD68E3EB-CFFE-47C0-9936-836A3BD6C5F1}"/>
+              </a:ext>
+            </a:extLst>
+          </p:cNvPr>
+          <p:cNvGrpSpPr/>
+          <p:nvPr/>
+        </p:nvGrpSpPr>
+        <p:grpSpPr>
+          <a:xfrm>
+            <a:off x="18837460" y="19532386"/>
+            <a:ext cx="593642" cy="215444"/>
+            <a:chOff x="18837460" y="19532386"/>
+            <a:chExt cx="593642" cy="215444"/>
+          </a:xfrm>
+        </p:grpSpPr>
+        <p:sp>
+          <p:nvSpPr>
+            <p:cNvPr id="232" name="TextBox 231">
+              <a:extLst>
+                <a:ext uri="{FF2B5EF4-FFF2-40B4-BE49-F238E27FC236}">
+                  <a16:creationId xmlns:a16="http://schemas.microsoft.com/office/drawing/2014/main" id="{F2E46262-3422-4237-B820-CA1786CECC67}"/>
+                </a:ext>
+              </a:extLst>
+            </p:cNvPr>
+            <p:cNvSpPr txBox="1"/>
+            <p:nvPr/>
+          </p:nvSpPr>
+          <p:spPr>
+            <a:xfrm>
+              <a:off x="18869238" y="19532386"/>
+              <a:ext cx="561864" cy="215444"/>
+            </a:xfrm>
+            <a:prstGeom prst="rect">
+              <a:avLst/>
+            </a:prstGeom>
+            <a:noFill/>
+            <a:ln>
+              <a:solidFill>
+                <a:schemeClr val="tx1"/>
+              </a:solidFill>
+            </a:ln>
+          </p:spPr>
+          <p:txBody>
+            <a:bodyPr wrap="square" rtlCol="0">
+              <a:spAutoFit/>
+            </a:bodyPr>
+            <a:lstStyle/>
+            <a:p>
+              <a:r>
+                <a:rPr lang="en-US" sz="400" dirty="0" err="1"/>
+                <a:t>renderedNodesManager</a:t>
+              </a:r>
+              <a:endParaRPr lang="en-US" sz="400" dirty="0"/>
+            </a:p>
+          </p:txBody>
+        </p:sp>
+        <p:sp>
+          <p:nvSpPr>
+            <p:cNvPr id="240" name="Diamond 239">
+              <a:extLst>
+                <a:ext uri="{FF2B5EF4-FFF2-40B4-BE49-F238E27FC236}">
+                  <a16:creationId xmlns:a16="http://schemas.microsoft.com/office/drawing/2014/main" id="{CCB403D2-52DD-4EFA-A610-B2B6AD601E7C}"/>
+                </a:ext>
+              </a:extLst>
+            </p:cNvPr>
+            <p:cNvSpPr/>
+            <p:nvPr/>
+          </p:nvSpPr>
+          <p:spPr>
+            <a:xfrm>
+              <a:off x="18837460" y="19584559"/>
+              <a:ext cx="101062" cy="80742"/>
+            </a:xfrm>
+            <a:prstGeom prst="diamond">
+              <a:avLst/>
+            </a:prstGeom>
+            <a:noFill/>
+            <a:ln>
+              <a:solidFill>
+                <a:schemeClr val="tx1"/>
+              </a:solidFill>
+            </a:ln>
+          </p:spPr>
+          <p:style>
+            <a:lnRef idx="2">
+              <a:schemeClr val="accent1">
+                <a:shade val="50000"/>
+              </a:schemeClr>
+            </a:lnRef>
+            <a:fillRef idx="1">
+              <a:schemeClr val="accent1"/>
+            </a:fillRef>
+            <a:effectRef idx="0">
+              <a:schemeClr val="accent1"/>
+            </a:effectRef>
+            <a:fontRef idx="minor">
+              <a:schemeClr val="lt1"/>
+            </a:fontRef>
+          </p:style>
+          <p:txBody>
+            <a:bodyPr rtlCol="0" anchor="ctr"/>
+            <a:lstStyle/>
+            <a:p>
+              <a:pPr algn="ctr"/>
+              <a:endParaRPr lang="en-US"/>
+            </a:p>
+          </p:txBody>
+        </p:sp>
+      </p:grpSp>
+      <p:cxnSp>
+        <p:nvCxnSpPr>
+          <p:cNvPr id="252" name="Straight Arrow Connector 251">
+            <a:extLst>
+              <a:ext uri="{FF2B5EF4-FFF2-40B4-BE49-F238E27FC236}">
+                <a16:creationId xmlns:a16="http://schemas.microsoft.com/office/drawing/2014/main" id="{3CBE2F0C-8D9D-4CDA-8849-5365AD17AFE2}"/>
+              </a:ext>
+            </a:extLst>
+          </p:cNvPr>
+          <p:cNvCxnSpPr>
+            <a:stCxn id="240" idx="1"/>
+            <a:endCxn id="145" idx="3"/>
+          </p:cNvCxnSpPr>
+          <p:nvPr/>
+        </p:nvCxnSpPr>
+        <p:spPr>
+          <a:xfrm flipH="1">
+            <a:off x="18559391" y="19624930"/>
+            <a:ext cx="278069" cy="7290"/>
+          </a:xfrm>
+          <a:prstGeom prst="straightConnector1">
+            <a:avLst/>
+          </a:prstGeom>
+          <a:ln>
+            <a:solidFill>
+              <a:srgbClr val="00B050"/>
+            </a:solidFill>
+            <a:tailEnd type="triangle"/>
+          </a:ln>
+        </p:spPr>
+        <p:style>
+          <a:lnRef idx="1">
+            <a:schemeClr val="accent1"/>
+          </a:lnRef>
+          <a:fillRef idx="0">
+            <a:schemeClr val="accent1"/>
+          </a:fillRef>
+          <a:effectRef idx="0">
+            <a:schemeClr val="accent1"/>
+          </a:effectRef>
+          <a:fontRef idx="minor">
+            <a:schemeClr val="tx1"/>
+          </a:fontRef>
+        </p:style>
+      </p:cxnSp>
+      <p:cxnSp>
+        <p:nvCxnSpPr>
+          <p:cNvPr id="42" name="Straight Arrow Connector 41">
+            <a:extLst>
+              <a:ext uri="{FF2B5EF4-FFF2-40B4-BE49-F238E27FC236}">
+                <a16:creationId xmlns:a16="http://schemas.microsoft.com/office/drawing/2014/main" id="{2E39A5BD-240B-4F53-B97A-1B830C08AA5F}"/>
+              </a:ext>
+            </a:extLst>
+          </p:cNvPr>
+          <p:cNvCxnSpPr>
+            <a:stCxn id="225" idx="3"/>
+            <a:endCxn id="7" idx="1"/>
+          </p:cNvCxnSpPr>
+          <p:nvPr/>
+        </p:nvCxnSpPr>
+        <p:spPr>
+          <a:xfrm>
+            <a:off x="15541773" y="23834414"/>
+            <a:ext cx="989884" cy="5522"/>
+          </a:xfrm>
+          <a:prstGeom prst="straightConnector1">
+            <a:avLst/>
+          </a:prstGeom>
+          <a:ln>
+            <a:solidFill>
+              <a:srgbClr val="92D050"/>
+            </a:solidFill>
+            <a:tailEnd type="triangle"/>
+          </a:ln>
+        </p:spPr>
+        <p:style>
+          <a:lnRef idx="1">
+            <a:schemeClr val="accent1"/>
+          </a:lnRef>
+          <a:fillRef idx="0">
+            <a:schemeClr val="accent1"/>
+          </a:fillRef>
+          <a:effectRef idx="0">
+            <a:schemeClr val="accent1"/>
+          </a:effectRef>
+          <a:fontRef idx="minor">
+            <a:schemeClr val="tx1"/>
+          </a:fontRef>
+        </p:style>
+      </p:cxnSp>
+      <p:sp>
+        <p:nvSpPr>
+          <p:cNvPr id="175" name="TextBox 174">
+            <a:extLst>
+              <a:ext uri="{FF2B5EF4-FFF2-40B4-BE49-F238E27FC236}">
+                <a16:creationId xmlns:a16="http://schemas.microsoft.com/office/drawing/2014/main" id="{EE07BEB0-CB56-46AA-B980-57B393177F5B}"/>
+              </a:ext>
+            </a:extLst>
+          </p:cNvPr>
+          <p:cNvSpPr txBox="1"/>
+          <p:nvPr/>
+        </p:nvSpPr>
+        <p:spPr>
+          <a:xfrm>
+            <a:off x="16531657" y="24105640"/>
+            <a:ext cx="559474" cy="400110"/>
+          </a:xfrm>
+          <a:prstGeom prst="rect">
+            <a:avLst/>
+          </a:prstGeom>
+          <a:noFill/>
+        </p:spPr>
+        <p:txBody>
+          <a:bodyPr wrap="square" rtlCol="0">
+            <a:spAutoFit/>
+          </a:bodyPr>
+          <a:lstStyle/>
+          <a:p>
+            <a:r>
+              <a:rPr lang="en-US" sz="400" dirty="0" err="1"/>
+              <a:t>treeLocationStoreSource</a:t>
+            </a:r>
+            <a:endParaRPr lang="en-US" sz="400" dirty="0"/>
+          </a:p>
+          <a:p>
+            <a:r>
+              <a:rPr lang="en-US" sz="400" dirty="0"/>
+              <a:t>+get</a:t>
+            </a:r>
+          </a:p>
+          <a:p>
+            <a:r>
+              <a:rPr lang="en-US" sz="400" dirty="0"/>
+              <a:t>+set</a:t>
+            </a:r>
+          </a:p>
+          <a:p>
+            <a:r>
+              <a:rPr lang="en-US" sz="400" dirty="0"/>
+              <a:t>+</a:t>
+            </a:r>
+            <a:r>
+              <a:rPr lang="en-US" sz="400" dirty="0" err="1"/>
+              <a:t>onUpdate</a:t>
+            </a:r>
+            <a:endParaRPr lang="en-US" sz="400" dirty="0"/>
+          </a:p>
+        </p:txBody>
+      </p:sp>
+      <p:grpSp>
+        <p:nvGrpSpPr>
+          <p:cNvPr id="176" name="Group 175">
+            <a:extLst>
+              <a:ext uri="{FF2B5EF4-FFF2-40B4-BE49-F238E27FC236}">
+                <a16:creationId xmlns:a16="http://schemas.microsoft.com/office/drawing/2014/main" id="{A19E04D0-6858-4905-AA8F-A4EA5FB6B003}"/>
+              </a:ext>
+            </a:extLst>
+          </p:cNvPr>
+          <p:cNvGrpSpPr/>
+          <p:nvPr/>
+        </p:nvGrpSpPr>
+        <p:grpSpPr>
+          <a:xfrm>
+            <a:off x="15122364" y="24192077"/>
+            <a:ext cx="445475" cy="215444"/>
+            <a:chOff x="15109956" y="23755534"/>
+            <a:chExt cx="445475" cy="215444"/>
+          </a:xfrm>
+        </p:grpSpPr>
+        <p:sp>
+          <p:nvSpPr>
+            <p:cNvPr id="177" name="TextBox 176">
+              <a:extLst>
+                <a:ext uri="{FF2B5EF4-FFF2-40B4-BE49-F238E27FC236}">
+                  <a16:creationId xmlns:a16="http://schemas.microsoft.com/office/drawing/2014/main" id="{6837AC29-D38B-468C-8C6F-F99138161DBF}"/>
+                </a:ext>
+              </a:extLst>
+            </p:cNvPr>
+            <p:cNvSpPr txBox="1"/>
+            <p:nvPr/>
+          </p:nvSpPr>
+          <p:spPr>
+            <a:xfrm>
+              <a:off x="15109956" y="23755534"/>
+              <a:ext cx="445475" cy="215444"/>
+            </a:xfrm>
+            <a:prstGeom prst="rect">
+              <a:avLst/>
+            </a:prstGeom>
+            <a:noFill/>
+          </p:spPr>
+          <p:txBody>
+            <a:bodyPr wrap="square" rtlCol="0">
+              <a:spAutoFit/>
+            </a:bodyPr>
+            <a:lstStyle/>
+            <a:p>
+              <a:r>
+                <a:rPr lang="en-US" sz="400" dirty="0" err="1"/>
+                <a:t>treeLocationLoader</a:t>
+              </a:r>
+              <a:endParaRPr lang="en-US" sz="400" dirty="0"/>
+            </a:p>
+          </p:txBody>
+        </p:sp>
+        <p:sp>
+          <p:nvSpPr>
+            <p:cNvPr id="178" name="Diamond 177">
+              <a:extLst>
+                <a:ext uri="{FF2B5EF4-FFF2-40B4-BE49-F238E27FC236}">
+                  <a16:creationId xmlns:a16="http://schemas.microsoft.com/office/drawing/2014/main" id="{37C247BF-EC30-43E8-BF15-957DFBCD0457}"/>
+                </a:ext>
+              </a:extLst>
+            </p:cNvPr>
+            <p:cNvSpPr/>
+            <p:nvPr/>
+          </p:nvSpPr>
+          <p:spPr>
+            <a:xfrm>
+              <a:off x="15439488" y="23795197"/>
+              <a:ext cx="89877" cy="75310"/>
+            </a:xfrm>
+            <a:prstGeom prst="diamond">
+              <a:avLst/>
+            </a:prstGeom>
+            <a:noFill/>
+          </p:spPr>
+          <p:style>
+            <a:lnRef idx="2">
+              <a:schemeClr val="accent1">
+                <a:shade val="50000"/>
+              </a:schemeClr>
+            </a:lnRef>
+            <a:fillRef idx="1">
+              <a:schemeClr val="accent1"/>
+            </a:fillRef>
+            <a:effectRef idx="0">
+              <a:schemeClr val="accent1"/>
+            </a:effectRef>
+            <a:fontRef idx="minor">
+              <a:schemeClr val="lt1"/>
+            </a:fontRef>
+          </p:style>
+          <p:txBody>
+            <a:bodyPr rtlCol="0" anchor="ctr"/>
+            <a:lstStyle/>
+            <a:p>
+              <a:pPr algn="ctr"/>
+              <a:endParaRPr lang="en-US"/>
+            </a:p>
+          </p:txBody>
+        </p:sp>
+      </p:grpSp>
+      <p:cxnSp>
+        <p:nvCxnSpPr>
+          <p:cNvPr id="179" name="Straight Arrow Connector 178">
+            <a:extLst>
+              <a:ext uri="{FF2B5EF4-FFF2-40B4-BE49-F238E27FC236}">
+                <a16:creationId xmlns:a16="http://schemas.microsoft.com/office/drawing/2014/main" id="{84EE0A14-CD9B-44E6-AA5A-72C392EFB176}"/>
+              </a:ext>
+            </a:extLst>
+          </p:cNvPr>
+          <p:cNvCxnSpPr>
+            <a:stCxn id="178" idx="3"/>
+            <a:endCxn id="175" idx="1"/>
+          </p:cNvCxnSpPr>
+          <p:nvPr/>
+        </p:nvCxnSpPr>
+        <p:spPr>
+          <a:xfrm>
+            <a:off x="15541773" y="24269395"/>
+            <a:ext cx="989884" cy="36300"/>
+          </a:xfrm>
+          <a:prstGeom prst="straightConnector1">
+            <a:avLst/>
+          </a:prstGeom>
+          <a:ln>
+            <a:solidFill>
+              <a:srgbClr val="92D050"/>
+            </a:solidFill>
+            <a:tailEnd type="triangle"/>
+          </a:ln>
+        </p:spPr>
+        <p:style>
+          <a:lnRef idx="1">
+            <a:schemeClr val="accent1"/>
+          </a:lnRef>
+          <a:fillRef idx="0">
+            <a:schemeClr val="accent1"/>
+          </a:fillRef>
+          <a:effectRef idx="0">
+            <a:schemeClr val="accent1"/>
+          </a:effectRef>
+          <a:fontRef idx="minor">
+            <a:schemeClr val="tx1"/>
+          </a:fontRef>
+        </p:style>
+      </p:cxnSp>
+      <p:sp>
+        <p:nvSpPr>
+          <p:cNvPr id="180" name="TextBox 179">
+            <a:extLst>
+              <a:ext uri="{FF2B5EF4-FFF2-40B4-BE49-F238E27FC236}">
+                <a16:creationId xmlns:a16="http://schemas.microsoft.com/office/drawing/2014/main" id="{B472FBD4-B109-4148-B518-78E13B2673C9}"/>
+              </a:ext>
+            </a:extLst>
+          </p:cNvPr>
+          <p:cNvSpPr txBox="1"/>
+          <p:nvPr/>
+        </p:nvSpPr>
+        <p:spPr>
+          <a:xfrm>
+            <a:off x="16531657" y="24507082"/>
+            <a:ext cx="559474" cy="400110"/>
+          </a:xfrm>
+          <a:prstGeom prst="rect">
+            <a:avLst/>
+          </a:prstGeom>
+          <a:noFill/>
+        </p:spPr>
+        <p:txBody>
+          <a:bodyPr wrap="square" rtlCol="0">
+            <a:spAutoFit/>
+          </a:bodyPr>
+          <a:lstStyle/>
+          <a:p>
+            <a:r>
+              <a:rPr lang="en-US" sz="400" dirty="0" err="1"/>
+              <a:t>treeUserStoreSource</a:t>
+            </a:r>
+            <a:endParaRPr lang="en-US" sz="400" dirty="0"/>
+          </a:p>
+          <a:p>
+            <a:r>
+              <a:rPr lang="en-US" sz="400" dirty="0"/>
+              <a:t>+get</a:t>
+            </a:r>
+          </a:p>
+          <a:p>
+            <a:r>
+              <a:rPr lang="en-US" sz="400" dirty="0"/>
+              <a:t>+set</a:t>
+            </a:r>
+          </a:p>
+          <a:p>
+            <a:r>
+              <a:rPr lang="en-US" sz="400" dirty="0"/>
+              <a:t>+</a:t>
+            </a:r>
+            <a:r>
+              <a:rPr lang="en-US" sz="400" dirty="0" err="1"/>
+              <a:t>onUpdate</a:t>
+            </a:r>
+            <a:endParaRPr lang="en-US" sz="400" dirty="0"/>
+          </a:p>
+        </p:txBody>
+      </p:sp>
+      <p:grpSp>
+        <p:nvGrpSpPr>
+          <p:cNvPr id="181" name="Group 180">
+            <a:extLst>
+              <a:ext uri="{FF2B5EF4-FFF2-40B4-BE49-F238E27FC236}">
+                <a16:creationId xmlns:a16="http://schemas.microsoft.com/office/drawing/2014/main" id="{4D3FB1C9-3F6B-4494-BB39-8A05C29537AF}"/>
+              </a:ext>
+            </a:extLst>
+          </p:cNvPr>
+          <p:cNvGrpSpPr/>
+          <p:nvPr/>
+        </p:nvGrpSpPr>
+        <p:grpSpPr>
+          <a:xfrm>
+            <a:off x="15122364" y="24593519"/>
+            <a:ext cx="445475" cy="215444"/>
+            <a:chOff x="15109956" y="23755534"/>
+            <a:chExt cx="445475" cy="215444"/>
+          </a:xfrm>
+        </p:grpSpPr>
+        <p:sp>
+          <p:nvSpPr>
+            <p:cNvPr id="183" name="TextBox 182">
+              <a:extLst>
+                <a:ext uri="{FF2B5EF4-FFF2-40B4-BE49-F238E27FC236}">
+                  <a16:creationId xmlns:a16="http://schemas.microsoft.com/office/drawing/2014/main" id="{BA66F4E2-0564-4C4D-B166-646F25AAAE23}"/>
+                </a:ext>
+              </a:extLst>
+            </p:cNvPr>
+            <p:cNvSpPr txBox="1"/>
+            <p:nvPr/>
+          </p:nvSpPr>
+          <p:spPr>
+            <a:xfrm>
+              <a:off x="15109956" y="23755534"/>
+              <a:ext cx="445475" cy="215444"/>
+            </a:xfrm>
+            <a:prstGeom prst="rect">
+              <a:avLst/>
+            </a:prstGeom>
+            <a:noFill/>
+          </p:spPr>
+          <p:txBody>
+            <a:bodyPr wrap="square" rtlCol="0">
+              <a:spAutoFit/>
+            </a:bodyPr>
+            <a:lstStyle/>
+            <a:p>
+              <a:r>
+                <a:rPr lang="en-US" sz="400" dirty="0" err="1"/>
+                <a:t>treeUserLoader</a:t>
+              </a:r>
+              <a:endParaRPr lang="en-US" sz="400" dirty="0"/>
+            </a:p>
+          </p:txBody>
+        </p:sp>
+        <p:sp>
+          <p:nvSpPr>
+            <p:cNvPr id="184" name="Diamond 183">
+              <a:extLst>
+                <a:ext uri="{FF2B5EF4-FFF2-40B4-BE49-F238E27FC236}">
+                  <a16:creationId xmlns:a16="http://schemas.microsoft.com/office/drawing/2014/main" id="{471C62E2-86E3-49D6-A64E-1DE793C36A6B}"/>
+                </a:ext>
+              </a:extLst>
+            </p:cNvPr>
+            <p:cNvSpPr/>
+            <p:nvPr/>
+          </p:nvSpPr>
+          <p:spPr>
+            <a:xfrm>
+              <a:off x="15439488" y="23795197"/>
+              <a:ext cx="89877" cy="75310"/>
+            </a:xfrm>
+            <a:prstGeom prst="diamond">
+              <a:avLst/>
+            </a:prstGeom>
+            <a:noFill/>
+          </p:spPr>
+          <p:style>
+            <a:lnRef idx="2">
+              <a:schemeClr val="accent1">
+                <a:shade val="50000"/>
+              </a:schemeClr>
+            </a:lnRef>
+            <a:fillRef idx="1">
+              <a:schemeClr val="accent1"/>
+            </a:fillRef>
+            <a:effectRef idx="0">
+              <a:schemeClr val="accent1"/>
+            </a:effectRef>
+            <a:fontRef idx="minor">
+              <a:schemeClr val="lt1"/>
+            </a:fontRef>
+          </p:style>
+          <p:txBody>
+            <a:bodyPr rtlCol="0" anchor="ctr"/>
+            <a:lstStyle/>
+            <a:p>
+              <a:pPr algn="ctr"/>
+              <a:endParaRPr lang="en-US"/>
+            </a:p>
+          </p:txBody>
+        </p:sp>
+      </p:grpSp>
+      <p:cxnSp>
+        <p:nvCxnSpPr>
+          <p:cNvPr id="187" name="Straight Arrow Connector 186">
+            <a:extLst>
+              <a:ext uri="{FF2B5EF4-FFF2-40B4-BE49-F238E27FC236}">
+                <a16:creationId xmlns:a16="http://schemas.microsoft.com/office/drawing/2014/main" id="{8E156FA5-CEC4-4B85-BD4A-5A054F63C03F}"/>
+              </a:ext>
+            </a:extLst>
+          </p:cNvPr>
+          <p:cNvCxnSpPr>
+            <a:stCxn id="184" idx="3"/>
+            <a:endCxn id="180" idx="1"/>
+          </p:cNvCxnSpPr>
+          <p:nvPr/>
+        </p:nvCxnSpPr>
+        <p:spPr>
+          <a:xfrm>
+            <a:off x="15541773" y="24670837"/>
+            <a:ext cx="989884" cy="36300"/>
+          </a:xfrm>
+          <a:prstGeom prst="straightConnector1">
+            <a:avLst/>
+          </a:prstGeom>
+          <a:ln>
+            <a:solidFill>
+              <a:srgbClr val="92D050"/>
+            </a:solidFill>
+            <a:tailEnd type="triangle"/>
+          </a:ln>
+        </p:spPr>
+        <p:style>
+          <a:lnRef idx="1">
+            <a:schemeClr val="accent1"/>
+          </a:lnRef>
+          <a:fillRef idx="0">
+            <a:schemeClr val="accent1"/>
+          </a:fillRef>
+          <a:effectRef idx="0">
+            <a:schemeClr val="accent1"/>
+          </a:effectRef>
+          <a:fontRef idx="minor">
+            <a:schemeClr val="tx1"/>
+          </a:fontRef>
+        </p:style>
+      </p:cxnSp>
+      <p:sp>
+        <p:nvSpPr>
+          <p:cNvPr id="188" name="TextBox 187">
+            <a:extLst>
+              <a:ext uri="{FF2B5EF4-FFF2-40B4-BE49-F238E27FC236}">
+                <a16:creationId xmlns:a16="http://schemas.microsoft.com/office/drawing/2014/main" id="{45425462-5BCA-454D-A140-D0EABF7488BB}"/>
+              </a:ext>
+            </a:extLst>
+          </p:cNvPr>
+          <p:cNvSpPr txBox="1"/>
+          <p:nvPr/>
+        </p:nvSpPr>
+        <p:spPr>
+          <a:xfrm>
+            <a:off x="16534284" y="24887613"/>
+            <a:ext cx="559474" cy="400110"/>
+          </a:xfrm>
+          <a:prstGeom prst="rect">
+            <a:avLst/>
+          </a:prstGeom>
+          <a:noFill/>
+        </p:spPr>
+        <p:txBody>
+          <a:bodyPr wrap="square" rtlCol="0">
+            <a:spAutoFit/>
+          </a:bodyPr>
+          <a:lstStyle/>
+          <a:p>
+            <a:r>
+              <a:rPr lang="en-US" sz="400" dirty="0" err="1"/>
+              <a:t>contentStoreSource</a:t>
+            </a:r>
+            <a:endParaRPr lang="en-US" sz="400" dirty="0"/>
+          </a:p>
+          <a:p>
+            <a:r>
+              <a:rPr lang="en-US" sz="400" dirty="0"/>
+              <a:t>+get</a:t>
+            </a:r>
+          </a:p>
+          <a:p>
+            <a:r>
+              <a:rPr lang="en-US" sz="400" dirty="0"/>
+              <a:t>+set</a:t>
+            </a:r>
+          </a:p>
+          <a:p>
+            <a:r>
+              <a:rPr lang="en-US" sz="400" dirty="0"/>
+              <a:t>+</a:t>
+            </a:r>
+            <a:r>
+              <a:rPr lang="en-US" sz="400" dirty="0" err="1"/>
+              <a:t>onUpdate</a:t>
+            </a:r>
+            <a:endParaRPr lang="en-US" sz="400" dirty="0"/>
+          </a:p>
+        </p:txBody>
+      </p:sp>
+      <p:grpSp>
+        <p:nvGrpSpPr>
+          <p:cNvPr id="192" name="Group 191">
+            <a:extLst>
+              <a:ext uri="{FF2B5EF4-FFF2-40B4-BE49-F238E27FC236}">
+                <a16:creationId xmlns:a16="http://schemas.microsoft.com/office/drawing/2014/main" id="{C0A91313-A22B-45F8-AB7A-AD295C653EC9}"/>
+              </a:ext>
+            </a:extLst>
+          </p:cNvPr>
+          <p:cNvGrpSpPr/>
+          <p:nvPr/>
+        </p:nvGrpSpPr>
+        <p:grpSpPr>
+          <a:xfrm>
+            <a:off x="15124991" y="24974050"/>
+            <a:ext cx="445475" cy="215444"/>
+            <a:chOff x="15109956" y="23755534"/>
+            <a:chExt cx="445475" cy="215444"/>
+          </a:xfrm>
+        </p:grpSpPr>
+        <p:sp>
+          <p:nvSpPr>
+            <p:cNvPr id="193" name="TextBox 192">
+              <a:extLst>
+                <a:ext uri="{FF2B5EF4-FFF2-40B4-BE49-F238E27FC236}">
+                  <a16:creationId xmlns:a16="http://schemas.microsoft.com/office/drawing/2014/main" id="{1D8C55FA-B211-48F5-AC9B-B7E8CA93A7A2}"/>
+                </a:ext>
+              </a:extLst>
+            </p:cNvPr>
+            <p:cNvSpPr txBox="1"/>
+            <p:nvPr/>
+          </p:nvSpPr>
+          <p:spPr>
+            <a:xfrm>
+              <a:off x="15109956" y="23755534"/>
+              <a:ext cx="445475" cy="215444"/>
+            </a:xfrm>
+            <a:prstGeom prst="rect">
+              <a:avLst/>
+            </a:prstGeom>
+            <a:noFill/>
+          </p:spPr>
+          <p:txBody>
+            <a:bodyPr wrap="square" rtlCol="0">
+              <a:spAutoFit/>
+            </a:bodyPr>
+            <a:lstStyle/>
+            <a:p>
+              <a:r>
+                <a:rPr lang="en-US" sz="400" dirty="0" err="1"/>
+                <a:t>contentLoader</a:t>
+              </a:r>
+              <a:endParaRPr lang="en-US" sz="400" dirty="0"/>
+            </a:p>
+          </p:txBody>
+        </p:sp>
+        <p:sp>
+          <p:nvSpPr>
+            <p:cNvPr id="194" name="Diamond 193">
+              <a:extLst>
+                <a:ext uri="{FF2B5EF4-FFF2-40B4-BE49-F238E27FC236}">
+                  <a16:creationId xmlns:a16="http://schemas.microsoft.com/office/drawing/2014/main" id="{72932DCA-59FE-4FF3-89FA-7365EF56E8F4}"/>
+                </a:ext>
+              </a:extLst>
+            </p:cNvPr>
+            <p:cNvSpPr/>
+            <p:nvPr/>
+          </p:nvSpPr>
+          <p:spPr>
+            <a:xfrm>
+              <a:off x="15439488" y="23795197"/>
+              <a:ext cx="89877" cy="75310"/>
+            </a:xfrm>
+            <a:prstGeom prst="diamond">
+              <a:avLst/>
+            </a:prstGeom>
+            <a:noFill/>
+          </p:spPr>
+          <p:style>
+            <a:lnRef idx="2">
+              <a:schemeClr val="accent1">
+                <a:shade val="50000"/>
+              </a:schemeClr>
+            </a:lnRef>
+            <a:fillRef idx="1">
+              <a:schemeClr val="accent1"/>
+            </a:fillRef>
+            <a:effectRef idx="0">
+              <a:schemeClr val="accent1"/>
+            </a:effectRef>
+            <a:fontRef idx="minor">
+              <a:schemeClr val="lt1"/>
+            </a:fontRef>
+          </p:style>
+          <p:txBody>
+            <a:bodyPr rtlCol="0" anchor="ctr"/>
+            <a:lstStyle/>
+            <a:p>
+              <a:pPr algn="ctr"/>
+              <a:endParaRPr lang="en-US"/>
+            </a:p>
+          </p:txBody>
+        </p:sp>
+      </p:grpSp>
+      <p:cxnSp>
+        <p:nvCxnSpPr>
+          <p:cNvPr id="195" name="Straight Arrow Connector 194">
+            <a:extLst>
+              <a:ext uri="{FF2B5EF4-FFF2-40B4-BE49-F238E27FC236}">
+                <a16:creationId xmlns:a16="http://schemas.microsoft.com/office/drawing/2014/main" id="{D1D6C0AE-0AE8-4A25-B659-2F792880CC60}"/>
+              </a:ext>
+            </a:extLst>
+          </p:cNvPr>
+          <p:cNvCxnSpPr>
+            <a:stCxn id="194" idx="3"/>
+            <a:endCxn id="188" idx="1"/>
+          </p:cNvCxnSpPr>
+          <p:nvPr/>
+        </p:nvCxnSpPr>
+        <p:spPr>
+          <a:xfrm>
+            <a:off x="15544400" y="25051368"/>
+            <a:ext cx="989884" cy="36300"/>
+          </a:xfrm>
+          <a:prstGeom prst="straightConnector1">
+            <a:avLst/>
+          </a:prstGeom>
+          <a:ln>
+            <a:solidFill>
+              <a:srgbClr val="92D050"/>
+            </a:solidFill>
+            <a:tailEnd type="triangle"/>
+          </a:ln>
+        </p:spPr>
+        <p:style>
+          <a:lnRef idx="1">
+            <a:schemeClr val="accent1"/>
+          </a:lnRef>
+          <a:fillRef idx="0">
+            <a:schemeClr val="accent1"/>
+          </a:fillRef>
+          <a:effectRef idx="0">
+            <a:schemeClr val="accent1"/>
+          </a:effectRef>
+          <a:fontRef idx="minor">
+            <a:schemeClr val="tx1"/>
+          </a:fontRef>
+        </p:style>
+      </p:cxnSp>
+      <p:sp>
+        <p:nvSpPr>
+          <p:cNvPr id="196" name="TextBox 195">
+            <a:extLst>
+              <a:ext uri="{FF2B5EF4-FFF2-40B4-BE49-F238E27FC236}">
+                <a16:creationId xmlns:a16="http://schemas.microsoft.com/office/drawing/2014/main" id="{A7787E65-3C50-4693-92FD-9047823F7F99}"/>
+              </a:ext>
+            </a:extLst>
+          </p:cNvPr>
+          <p:cNvSpPr txBox="1"/>
+          <p:nvPr/>
+        </p:nvSpPr>
+        <p:spPr>
+          <a:xfrm>
+            <a:off x="16531657" y="25239314"/>
+            <a:ext cx="559474" cy="400110"/>
+          </a:xfrm>
+          <a:prstGeom prst="rect">
+            <a:avLst/>
+          </a:prstGeom>
+          <a:noFill/>
+        </p:spPr>
+        <p:txBody>
+          <a:bodyPr wrap="square" rtlCol="0">
+            <a:spAutoFit/>
+          </a:bodyPr>
+          <a:lstStyle/>
+          <a:p>
+            <a:r>
+              <a:rPr lang="en-US" sz="400" dirty="0" err="1"/>
+              <a:t>contentUserStoreSource</a:t>
+            </a:r>
+            <a:endParaRPr lang="en-US" sz="400" dirty="0"/>
+          </a:p>
+          <a:p>
+            <a:r>
+              <a:rPr lang="en-US" sz="400" dirty="0"/>
+              <a:t>+get</a:t>
+            </a:r>
+          </a:p>
+          <a:p>
+            <a:r>
+              <a:rPr lang="en-US" sz="400" dirty="0"/>
+              <a:t>+set</a:t>
+            </a:r>
+          </a:p>
+          <a:p>
+            <a:r>
+              <a:rPr lang="en-US" sz="400" dirty="0"/>
+              <a:t>+</a:t>
+            </a:r>
+            <a:r>
+              <a:rPr lang="en-US" sz="400" dirty="0" err="1"/>
+              <a:t>onUpdate</a:t>
+            </a:r>
+            <a:endParaRPr lang="en-US" sz="400" dirty="0"/>
+          </a:p>
+        </p:txBody>
+      </p:sp>
+      <p:grpSp>
+        <p:nvGrpSpPr>
+          <p:cNvPr id="198" name="Group 197">
+            <a:extLst>
+              <a:ext uri="{FF2B5EF4-FFF2-40B4-BE49-F238E27FC236}">
+                <a16:creationId xmlns:a16="http://schemas.microsoft.com/office/drawing/2014/main" id="{F3DF39D0-F6D1-4599-9F23-E304EEF0852D}"/>
+              </a:ext>
+            </a:extLst>
+          </p:cNvPr>
+          <p:cNvGrpSpPr/>
+          <p:nvPr/>
+        </p:nvGrpSpPr>
+        <p:grpSpPr>
+          <a:xfrm>
+            <a:off x="15122364" y="25325751"/>
+            <a:ext cx="445475" cy="215444"/>
+            <a:chOff x="15109956" y="23755534"/>
+            <a:chExt cx="445475" cy="215444"/>
+          </a:xfrm>
+        </p:grpSpPr>
+        <p:sp>
+          <p:nvSpPr>
+            <p:cNvPr id="199" name="TextBox 198">
+              <a:extLst>
+                <a:ext uri="{FF2B5EF4-FFF2-40B4-BE49-F238E27FC236}">
+                  <a16:creationId xmlns:a16="http://schemas.microsoft.com/office/drawing/2014/main" id="{43824724-46E6-4E3B-BA97-1F3270B36C6B}"/>
+                </a:ext>
+              </a:extLst>
+            </p:cNvPr>
+            <p:cNvSpPr txBox="1"/>
+            <p:nvPr/>
+          </p:nvSpPr>
+          <p:spPr>
+            <a:xfrm>
+              <a:off x="15109956" y="23755534"/>
+              <a:ext cx="445475" cy="215444"/>
+            </a:xfrm>
+            <a:prstGeom prst="rect">
+              <a:avLst/>
+            </a:prstGeom>
+            <a:noFill/>
+          </p:spPr>
+          <p:txBody>
+            <a:bodyPr wrap="square" rtlCol="0">
+              <a:spAutoFit/>
+            </a:bodyPr>
+            <a:lstStyle/>
+            <a:p>
+              <a:r>
+                <a:rPr lang="en-US" sz="400" dirty="0" err="1"/>
+                <a:t>contentUserLoader</a:t>
+              </a:r>
+              <a:endParaRPr lang="en-US" sz="400" dirty="0"/>
+            </a:p>
+          </p:txBody>
+        </p:sp>
+        <p:sp>
+          <p:nvSpPr>
+            <p:cNvPr id="200" name="Diamond 199">
+              <a:extLst>
+                <a:ext uri="{FF2B5EF4-FFF2-40B4-BE49-F238E27FC236}">
+                  <a16:creationId xmlns:a16="http://schemas.microsoft.com/office/drawing/2014/main" id="{DA098A43-649C-4F30-B9DC-5F70597AC0C2}"/>
+                </a:ext>
+              </a:extLst>
+            </p:cNvPr>
+            <p:cNvSpPr/>
+            <p:nvPr/>
+          </p:nvSpPr>
+          <p:spPr>
+            <a:xfrm>
+              <a:off x="15439488" y="23795197"/>
+              <a:ext cx="89877" cy="75310"/>
+            </a:xfrm>
+            <a:prstGeom prst="diamond">
+              <a:avLst/>
+            </a:prstGeom>
+            <a:noFill/>
+          </p:spPr>
+          <p:style>
+            <a:lnRef idx="2">
+              <a:schemeClr val="accent1">
+                <a:shade val="50000"/>
+              </a:schemeClr>
+            </a:lnRef>
+            <a:fillRef idx="1">
+              <a:schemeClr val="accent1"/>
+            </a:fillRef>
+            <a:effectRef idx="0">
+              <a:schemeClr val="accent1"/>
+            </a:effectRef>
+            <a:fontRef idx="minor">
+              <a:schemeClr val="lt1"/>
+            </a:fontRef>
+          </p:style>
+          <p:txBody>
+            <a:bodyPr rtlCol="0" anchor="ctr"/>
+            <a:lstStyle/>
+            <a:p>
+              <a:pPr algn="ctr"/>
+              <a:endParaRPr lang="en-US"/>
+            </a:p>
+          </p:txBody>
+        </p:sp>
+      </p:grpSp>
+      <p:cxnSp>
+        <p:nvCxnSpPr>
+          <p:cNvPr id="201" name="Straight Arrow Connector 200">
+            <a:extLst>
+              <a:ext uri="{FF2B5EF4-FFF2-40B4-BE49-F238E27FC236}">
+                <a16:creationId xmlns:a16="http://schemas.microsoft.com/office/drawing/2014/main" id="{D8E45B57-CF3D-4CA0-9EB8-82479B2041DA}"/>
+              </a:ext>
+            </a:extLst>
+          </p:cNvPr>
+          <p:cNvCxnSpPr>
+            <a:stCxn id="200" idx="3"/>
+            <a:endCxn id="196" idx="1"/>
+          </p:cNvCxnSpPr>
+          <p:nvPr/>
+        </p:nvCxnSpPr>
+        <p:spPr>
+          <a:xfrm>
+            <a:off x="15541773" y="25403069"/>
+            <a:ext cx="989884" cy="36300"/>
+          </a:xfrm>
+          <a:prstGeom prst="straightConnector1">
+            <a:avLst/>
+          </a:prstGeom>
+          <a:ln>
+            <a:solidFill>
+              <a:srgbClr val="92D050"/>
+            </a:solidFill>
+            <a:tailEnd type="triangle"/>
+          </a:ln>
+        </p:spPr>
+        <p:style>
+          <a:lnRef idx="1">
+            <a:schemeClr val="accent1"/>
+          </a:lnRef>
+          <a:fillRef idx="0">
+            <a:schemeClr val="accent1"/>
+          </a:fillRef>
+          <a:effectRef idx="0">
+            <a:schemeClr val="accent1"/>
+          </a:effectRef>
+          <a:fontRef idx="minor">
+            <a:schemeClr val="tx1"/>
+          </a:fontRef>
+        </p:style>
+      </p:cxnSp>
+      <p:cxnSp>
+        <p:nvCxnSpPr>
+          <p:cNvPr id="202" name="Straight Arrow Connector 201">
+            <a:extLst>
+              <a:ext uri="{FF2B5EF4-FFF2-40B4-BE49-F238E27FC236}">
+                <a16:creationId xmlns:a16="http://schemas.microsoft.com/office/drawing/2014/main" id="{804C5D53-35F7-4A68-8D5F-E50E87FC6214}"/>
+              </a:ext>
+            </a:extLst>
+          </p:cNvPr>
+          <p:cNvCxnSpPr>
+            <a:cxnSpLocks/>
+            <a:stCxn id="175" idx="0"/>
+            <a:endCxn id="162" idx="2"/>
+          </p:cNvCxnSpPr>
+          <p:nvPr/>
+        </p:nvCxnSpPr>
+        <p:spPr>
+          <a:xfrm flipV="1">
+            <a:off x="16811394" y="20994970"/>
+            <a:ext cx="1180759" cy="3110670"/>
+          </a:xfrm>
+          <a:prstGeom prst="straightConnector1">
+            <a:avLst/>
+          </a:prstGeom>
+          <a:ln>
+            <a:solidFill>
+              <a:srgbClr val="92D050"/>
+            </a:solidFill>
+            <a:prstDash val="sysDash"/>
+            <a:tailEnd type="triangle"/>
+          </a:ln>
+        </p:spPr>
+        <p:style>
+          <a:lnRef idx="1">
+            <a:schemeClr val="accent1"/>
+          </a:lnRef>
+          <a:fillRef idx="0">
+            <a:schemeClr val="accent1"/>
+          </a:fillRef>
+          <a:effectRef idx="0">
+            <a:schemeClr val="accent1"/>
+          </a:effectRef>
+          <a:fontRef idx="minor">
+            <a:schemeClr val="tx1"/>
+          </a:fontRef>
+        </p:style>
+      </p:cxnSp>
+      <p:cxnSp>
+        <p:nvCxnSpPr>
+          <p:cNvPr id="203" name="Straight Arrow Connector 202">
+            <a:extLst>
+              <a:ext uri="{FF2B5EF4-FFF2-40B4-BE49-F238E27FC236}">
+                <a16:creationId xmlns:a16="http://schemas.microsoft.com/office/drawing/2014/main" id="{FBB2AD50-D3D0-4013-9BBF-E0213889474E}"/>
+              </a:ext>
+            </a:extLst>
+          </p:cNvPr>
+          <p:cNvCxnSpPr>
+            <a:cxnSpLocks/>
+            <a:stCxn id="175" idx="2"/>
+            <a:endCxn id="162" idx="2"/>
+          </p:cNvCxnSpPr>
+          <p:nvPr/>
+        </p:nvCxnSpPr>
+        <p:spPr>
+          <a:xfrm flipV="1">
+            <a:off x="16811394" y="20994970"/>
+            <a:ext cx="1180759" cy="3510780"/>
+          </a:xfrm>
+          <a:prstGeom prst="straightConnector1">
+            <a:avLst/>
+          </a:prstGeom>
+          <a:ln>
+            <a:solidFill>
+              <a:srgbClr val="92D050"/>
+            </a:solidFill>
+            <a:prstDash val="sysDash"/>
+            <a:tailEnd type="triangle"/>
+          </a:ln>
+        </p:spPr>
+        <p:style>
+          <a:lnRef idx="1">
+            <a:schemeClr val="accent1"/>
+          </a:lnRef>
+          <a:fillRef idx="0">
+            <a:schemeClr val="accent1"/>
+          </a:fillRef>
+          <a:effectRef idx="0">
+            <a:schemeClr val="accent1"/>
+          </a:effectRef>
+          <a:fontRef idx="minor">
+            <a:schemeClr val="tx1"/>
+          </a:fontRef>
+        </p:style>
+      </p:cxnSp>
+      <p:cxnSp>
+        <p:nvCxnSpPr>
+          <p:cNvPr id="204" name="Straight Arrow Connector 203">
+            <a:extLst>
+              <a:ext uri="{FF2B5EF4-FFF2-40B4-BE49-F238E27FC236}">
+                <a16:creationId xmlns:a16="http://schemas.microsoft.com/office/drawing/2014/main" id="{9893CBA4-68AB-4080-ABD7-61F2CEF1D633}"/>
+              </a:ext>
+            </a:extLst>
+          </p:cNvPr>
+          <p:cNvCxnSpPr>
+            <a:cxnSpLocks/>
+            <a:stCxn id="180" idx="2"/>
+            <a:endCxn id="162" idx="2"/>
+          </p:cNvCxnSpPr>
+          <p:nvPr/>
+        </p:nvCxnSpPr>
+        <p:spPr>
+          <a:xfrm flipV="1">
+            <a:off x="16811394" y="20994970"/>
+            <a:ext cx="1180759" cy="3912222"/>
+          </a:xfrm>
+          <a:prstGeom prst="straightConnector1">
+            <a:avLst/>
+          </a:prstGeom>
+          <a:ln>
+            <a:solidFill>
+              <a:srgbClr val="92D050"/>
+            </a:solidFill>
+            <a:prstDash val="sysDash"/>
+            <a:tailEnd type="triangle"/>
+          </a:ln>
+        </p:spPr>
+        <p:style>
+          <a:lnRef idx="1">
+            <a:schemeClr val="accent1"/>
+          </a:lnRef>
+          <a:fillRef idx="0">
+            <a:schemeClr val="accent1"/>
+          </a:fillRef>
+          <a:effectRef idx="0">
+            <a:schemeClr val="accent1"/>
+          </a:effectRef>
+          <a:fontRef idx="minor">
+            <a:schemeClr val="tx1"/>
+          </a:fontRef>
+        </p:style>
+      </p:cxnSp>
+      <p:cxnSp>
+        <p:nvCxnSpPr>
+          <p:cNvPr id="208" name="Straight Arrow Connector 207">
+            <a:extLst>
+              <a:ext uri="{FF2B5EF4-FFF2-40B4-BE49-F238E27FC236}">
+                <a16:creationId xmlns:a16="http://schemas.microsoft.com/office/drawing/2014/main" id="{9E7E2F23-F339-48CC-866F-74855F972A33}"/>
+              </a:ext>
+            </a:extLst>
+          </p:cNvPr>
+          <p:cNvCxnSpPr>
+            <a:cxnSpLocks/>
+            <a:stCxn id="196" idx="0"/>
+            <a:endCxn id="162" idx="2"/>
+          </p:cNvCxnSpPr>
+          <p:nvPr/>
+        </p:nvCxnSpPr>
+        <p:spPr>
+          <a:xfrm flipV="1">
+            <a:off x="16811394" y="20994970"/>
+            <a:ext cx="1180759" cy="4244344"/>
+          </a:xfrm>
+          <a:prstGeom prst="straightConnector1">
+            <a:avLst/>
+          </a:prstGeom>
+          <a:ln>
+            <a:solidFill>
+              <a:srgbClr val="92D050"/>
+            </a:solidFill>
+            <a:prstDash val="sysDash"/>
+            <a:tailEnd type="triangle"/>
+          </a:ln>
+        </p:spPr>
+        <p:style>
+          <a:lnRef idx="1">
+            <a:schemeClr val="accent1"/>
+          </a:lnRef>
+          <a:fillRef idx="0">
+            <a:schemeClr val="accent1"/>
+          </a:fillRef>
+          <a:effectRef idx="0">
+            <a:schemeClr val="accent1"/>
+          </a:effectRef>
+          <a:fontRef idx="minor">
+            <a:schemeClr val="tx1"/>
+          </a:fontRef>
+        </p:style>
+      </p:cxnSp>
+      <p:cxnSp>
+        <p:nvCxnSpPr>
+          <p:cNvPr id="209" name="Straight Arrow Connector 208">
+            <a:extLst>
+              <a:ext uri="{FF2B5EF4-FFF2-40B4-BE49-F238E27FC236}">
+                <a16:creationId xmlns:a16="http://schemas.microsoft.com/office/drawing/2014/main" id="{30717162-9F92-4FA4-B14F-E3EB3DB2971E}"/>
+              </a:ext>
+            </a:extLst>
+          </p:cNvPr>
+          <p:cNvCxnSpPr>
+            <a:cxnSpLocks/>
+            <a:stCxn id="12" idx="1"/>
+            <a:endCxn id="7" idx="3"/>
+          </p:cNvCxnSpPr>
+          <p:nvPr/>
+        </p:nvCxnSpPr>
+        <p:spPr>
+          <a:xfrm flipH="1" flipV="1">
+            <a:off x="17091131" y="23839936"/>
+            <a:ext cx="2144754" cy="250894"/>
+          </a:xfrm>
+          <a:prstGeom prst="straightConnector1">
+            <a:avLst/>
+          </a:prstGeom>
+          <a:ln w="28575">
+            <a:solidFill>
+              <a:srgbClr val="92D050"/>
+            </a:solidFill>
+            <a:tailEnd type="triangle"/>
+          </a:ln>
+        </p:spPr>
+        <p:style>
+          <a:lnRef idx="1">
+            <a:schemeClr val="accent1"/>
+          </a:lnRef>
+          <a:fillRef idx="0">
+            <a:schemeClr val="accent1"/>
+          </a:fillRef>
+          <a:effectRef idx="0">
+            <a:schemeClr val="accent1"/>
+          </a:effectRef>
+          <a:fontRef idx="minor">
+            <a:schemeClr val="tx1"/>
+          </a:fontRef>
+        </p:style>
+      </p:cxnSp>
+      <p:sp>
+        <p:nvSpPr>
+          <p:cNvPr id="270" name="TextBox 269">
+            <a:extLst>
+              <a:ext uri="{FF2B5EF4-FFF2-40B4-BE49-F238E27FC236}">
+                <a16:creationId xmlns:a16="http://schemas.microsoft.com/office/drawing/2014/main" id="{D32D0AE4-FF6E-445F-AE36-0296BD20F534}"/>
+              </a:ext>
+            </a:extLst>
+          </p:cNvPr>
+          <p:cNvSpPr txBox="1"/>
+          <p:nvPr/>
+        </p:nvSpPr>
+        <p:spPr>
+          <a:xfrm>
+            <a:off x="17290575" y="24401949"/>
+            <a:ext cx="876850" cy="276999"/>
+          </a:xfrm>
+          <a:prstGeom prst="rect">
+            <a:avLst/>
+          </a:prstGeom>
+          <a:noFill/>
+        </p:spPr>
+        <p:txBody>
+          <a:bodyPr wrap="square" rtlCol="0">
+            <a:spAutoFit/>
+          </a:bodyPr>
+          <a:lstStyle/>
+          <a:p>
+            <a:r>
+              <a:rPr lang="en-US" sz="1200" dirty="0">
+                <a:solidFill>
+                  <a:srgbClr val="00B0F0"/>
+                </a:solidFill>
+              </a:rPr>
+              <a:t>Creations</a:t>
+            </a:r>
+          </a:p>
+        </p:txBody>
+      </p:sp>
+      <p:cxnSp>
+        <p:nvCxnSpPr>
+          <p:cNvPr id="271" name="Straight Arrow Connector 270">
+            <a:extLst>
+              <a:ext uri="{FF2B5EF4-FFF2-40B4-BE49-F238E27FC236}">
+                <a16:creationId xmlns:a16="http://schemas.microsoft.com/office/drawing/2014/main" id="{DDD5D98D-1103-48D7-BED2-F066CDB9B690}"/>
+              </a:ext>
+            </a:extLst>
+          </p:cNvPr>
+          <p:cNvCxnSpPr>
+            <a:cxnSpLocks/>
+          </p:cNvCxnSpPr>
+          <p:nvPr/>
+        </p:nvCxnSpPr>
+        <p:spPr>
+          <a:xfrm flipV="1">
+            <a:off x="19213479" y="19752819"/>
+            <a:ext cx="14800" cy="940609"/>
+          </a:xfrm>
+          <a:prstGeom prst="straightConnector1">
+            <a:avLst/>
+          </a:prstGeom>
+          <a:ln>
+            <a:solidFill>
+              <a:srgbClr val="00B050"/>
+            </a:solidFill>
+            <a:prstDash val="sysDash"/>
+            <a:tailEnd type="triangle"/>
+          </a:ln>
+        </p:spPr>
+        <p:style>
+          <a:lnRef idx="1">
+            <a:schemeClr val="accent1"/>
+          </a:lnRef>
+          <a:fillRef idx="0">
+            <a:schemeClr val="accent1"/>
+          </a:fillRef>
+          <a:effectRef idx="0">
+            <a:schemeClr val="accent1"/>
+          </a:effectRef>
+          <a:fontRef idx="minor">
+            <a:schemeClr val="tx1"/>
+          </a:fontRef>
+        </p:style>
+      </p:cxnSp>
     </p:spTree>
     <p:extLst>
       <p:ext uri="{BB962C8B-B14F-4D97-AF65-F5344CB8AC3E}">

</xml_diff>

<commit_message>
Make it so that StoreSource publishes .val() and not the entire object
</commit_message>
<xml_diff>
--- a/docs/architecture.pptx
+++ b/docs/architecture.pptx
@@ -262,7 +262,7 @@
           <a:p>
             <a:fld id="{0A05F3B5-6F50-4323-80C0-955EB0110BAC}" type="datetimeFigureOut">
               <a:rPr lang="en-US" smtClean="0"/>
-              <a:t>12/12/2017</a:t>
+              <a:t>1/10/2018</a:t>
             </a:fld>
             <a:endParaRPr lang="en-US"/>
           </a:p>
@@ -432,7 +432,7 @@
           <a:p>
             <a:fld id="{0A05F3B5-6F50-4323-80C0-955EB0110BAC}" type="datetimeFigureOut">
               <a:rPr lang="en-US" smtClean="0"/>
-              <a:t>12/12/2017</a:t>
+              <a:t>1/10/2018</a:t>
             </a:fld>
             <a:endParaRPr lang="en-US"/>
           </a:p>
@@ -612,7 +612,7 @@
           <a:p>
             <a:fld id="{0A05F3B5-6F50-4323-80C0-955EB0110BAC}" type="datetimeFigureOut">
               <a:rPr lang="en-US" smtClean="0"/>
-              <a:t>12/12/2017</a:t>
+              <a:t>1/10/2018</a:t>
             </a:fld>
             <a:endParaRPr lang="en-US"/>
           </a:p>
@@ -782,7 +782,7 @@
           <a:p>
             <a:fld id="{0A05F3B5-6F50-4323-80C0-955EB0110BAC}" type="datetimeFigureOut">
               <a:rPr lang="en-US" smtClean="0"/>
-              <a:t>12/12/2017</a:t>
+              <a:t>1/10/2018</a:t>
             </a:fld>
             <a:endParaRPr lang="en-US"/>
           </a:p>
@@ -1026,7 +1026,7 @@
           <a:p>
             <a:fld id="{0A05F3B5-6F50-4323-80C0-955EB0110BAC}" type="datetimeFigureOut">
               <a:rPr lang="en-US" smtClean="0"/>
-              <a:t>12/12/2017</a:t>
+              <a:t>1/10/2018</a:t>
             </a:fld>
             <a:endParaRPr lang="en-US"/>
           </a:p>
@@ -1258,7 +1258,7 @@
           <a:p>
             <a:fld id="{0A05F3B5-6F50-4323-80C0-955EB0110BAC}" type="datetimeFigureOut">
               <a:rPr lang="en-US" smtClean="0"/>
-              <a:t>12/12/2017</a:t>
+              <a:t>1/10/2018</a:t>
             </a:fld>
             <a:endParaRPr lang="en-US"/>
           </a:p>
@@ -1625,7 +1625,7 @@
           <a:p>
             <a:fld id="{0A05F3B5-6F50-4323-80C0-955EB0110BAC}" type="datetimeFigureOut">
               <a:rPr lang="en-US" smtClean="0"/>
-              <a:t>12/12/2017</a:t>
+              <a:t>1/10/2018</a:t>
             </a:fld>
             <a:endParaRPr lang="en-US"/>
           </a:p>
@@ -1743,7 +1743,7 @@
           <a:p>
             <a:fld id="{0A05F3B5-6F50-4323-80C0-955EB0110BAC}" type="datetimeFigureOut">
               <a:rPr lang="en-US" smtClean="0"/>
-              <a:t>12/12/2017</a:t>
+              <a:t>1/10/2018</a:t>
             </a:fld>
             <a:endParaRPr lang="en-US"/>
           </a:p>
@@ -1838,7 +1838,7 @@
           <a:p>
             <a:fld id="{0A05F3B5-6F50-4323-80C0-955EB0110BAC}" type="datetimeFigureOut">
               <a:rPr lang="en-US" smtClean="0"/>
-              <a:t>12/12/2017</a:t>
+              <a:t>1/10/2018</a:t>
             </a:fld>
             <a:endParaRPr lang="en-US"/>
           </a:p>
@@ -2115,7 +2115,7 @@
           <a:p>
             <a:fld id="{0A05F3B5-6F50-4323-80C0-955EB0110BAC}" type="datetimeFigureOut">
               <a:rPr lang="en-US" smtClean="0"/>
-              <a:t>12/12/2017</a:t>
+              <a:t>1/10/2018</a:t>
             </a:fld>
             <a:endParaRPr lang="en-US"/>
           </a:p>
@@ -2372,7 +2372,7 @@
           <a:p>
             <a:fld id="{0A05F3B5-6F50-4323-80C0-955EB0110BAC}" type="datetimeFigureOut">
               <a:rPr lang="en-US" smtClean="0"/>
-              <a:t>12/12/2017</a:t>
+              <a:t>1/10/2018</a:t>
             </a:fld>
             <a:endParaRPr lang="en-US"/>
           </a:p>
@@ -2585,7 +2585,7 @@
           <a:p>
             <a:fld id="{0A05F3B5-6F50-4323-80C0-955EB0110BAC}" type="datetimeFigureOut">
               <a:rPr lang="en-US" smtClean="0"/>
-              <a:t>12/12/2017</a:t>
+              <a:t>1/10/2018</a:t>
             </a:fld>
             <a:endParaRPr lang="en-US"/>
           </a:p>
@@ -15564,7 +15564,7 @@
             <a:r>
               <a:rPr lang="en-US" sz="1200" dirty="0">
                 <a:solidFill>
-                  <a:srgbClr val="00B0F0"/>
+                  <a:schemeClr val="accent6"/>
                 </a:solidFill>
               </a:rPr>
               <a:t>Creations</a:t>

</xml_diff>

<commit_message>
Reflect appContainer and integration tests to include contentIdSigmaIdMap
</commit_message>
<xml_diff>
--- a/docs/architecture.pptx
+++ b/docs/architecture.pptx
@@ -15956,6 +15956,42 @@
           </a:fontRef>
         </p:style>
       </p:cxnSp>
+      <p:sp>
+        <p:nvSpPr>
+          <p:cNvPr id="21" name="TextBox 20">
+            <a:extLst>
+              <a:ext uri="{FF2B5EF4-FFF2-40B4-BE49-F238E27FC236}">
+                <a16:creationId xmlns:a16="http://schemas.microsoft.com/office/drawing/2014/main" id="{7A32B25D-0E85-4D6B-9E74-32CCB94CB3E1}"/>
+              </a:ext>
+            </a:extLst>
+          </p:cNvPr>
+          <p:cNvSpPr txBox="1"/>
+          <p:nvPr/>
+        </p:nvSpPr>
+        <p:spPr>
+          <a:xfrm>
+            <a:off x="18750265" y="21611167"/>
+            <a:ext cx="769881" cy="153888"/>
+          </a:xfrm>
+          <a:prstGeom prst="rect">
+            <a:avLst/>
+          </a:prstGeom>
+          <a:noFill/>
+        </p:spPr>
+        <p:txBody>
+          <a:bodyPr wrap="square" rtlCol="0">
+            <a:spAutoFit/>
+          </a:bodyPr>
+          <a:lstStyle/>
+          <a:p>
+            <a:r>
+              <a:rPr lang="en-US" sz="400" dirty="0" err="1"/>
+              <a:t>contentIdSigmaIdMap</a:t>
+            </a:r>
+            <a:endParaRPr lang="en-US" sz="400" dirty="0"/>
+          </a:p>
+        </p:txBody>
+      </p:sp>
     </p:spTree>
     <p:extLst>
       <p:ext uri="{BB962C8B-B14F-4D97-AF65-F5344CB8AC3E}">

</xml_diff>

<commit_message>
Debug to find out that there are two different sigma instances
</commit_message>
<xml_diff>
--- a/docs/architecture.pptx
+++ b/docs/architecture.pptx
@@ -15970,8 +15970,8 @@
         </p:nvSpPr>
         <p:spPr>
           <a:xfrm>
-            <a:off x="18750265" y="21611167"/>
-            <a:ext cx="769881" cy="153888"/>
+            <a:off x="18750265" y="21449979"/>
+            <a:ext cx="769881" cy="338554"/>
           </a:xfrm>
           <a:prstGeom prst="rect">
             <a:avLst/>
@@ -15989,6 +15989,131 @@
               <a:t>contentIdSigmaIdMap</a:t>
             </a:r>
             <a:endParaRPr lang="en-US" sz="400" dirty="0"/>
+          </a:p>
+          <a:p>
+            <a:r>
+              <a:rPr lang="en-US" sz="400" dirty="0"/>
+              <a:t>  + set(</a:t>
+            </a:r>
+            <a:r>
+              <a:rPr lang="en-US" sz="400" dirty="0" err="1"/>
+              <a:t>contentId</a:t>
+            </a:r>
+            <a:r>
+              <a:rPr lang="en-US" sz="400" dirty="0"/>
+              <a:t>, </a:t>
+            </a:r>
+            <a:r>
+              <a:rPr lang="en-US" sz="400" dirty="0" err="1"/>
+              <a:t>sigmaId</a:t>
+            </a:r>
+            <a:r>
+              <a:rPr lang="en-US" sz="400" dirty="0"/>
+              <a:t>)</a:t>
+            </a:r>
+          </a:p>
+          <a:p>
+            <a:r>
+              <a:rPr lang="en-US" sz="400" dirty="0"/>
+              <a:t>  + get(</a:t>
+            </a:r>
+            <a:r>
+              <a:rPr lang="en-US" sz="400" dirty="0" err="1"/>
+              <a:t>contentId</a:t>
+            </a:r>
+            <a:r>
+              <a:rPr lang="en-US" sz="400" dirty="0"/>
+              <a:t>) : </a:t>
+            </a:r>
+            <a:r>
+              <a:rPr lang="en-US" sz="400" dirty="0" err="1"/>
+              <a:t>sigmaIds</a:t>
+            </a:r>
+            <a:r>
+              <a:rPr lang="en-US" sz="400" dirty="0"/>
+              <a:t>[]</a:t>
+            </a:r>
+          </a:p>
+        </p:txBody>
+      </p:sp>
+      <p:cxnSp>
+        <p:nvCxnSpPr>
+          <p:cNvPr id="215" name="Straight Arrow Connector 214">
+            <a:extLst>
+              <a:ext uri="{FF2B5EF4-FFF2-40B4-BE49-F238E27FC236}">
+                <a16:creationId xmlns:a16="http://schemas.microsoft.com/office/drawing/2014/main" id="{F15F62B8-002A-4207-AAE6-B479E4C6748D}"/>
+              </a:ext>
+            </a:extLst>
+          </p:cNvPr>
+          <p:cNvCxnSpPr>
+            <a:cxnSpLocks/>
+            <a:stCxn id="18" idx="0"/>
+            <a:endCxn id="21" idx="2"/>
+          </p:cNvCxnSpPr>
+          <p:nvPr/>
+        </p:nvCxnSpPr>
+        <p:spPr>
+          <a:xfrm flipV="1">
+            <a:off x="18176421" y="21788533"/>
+            <a:ext cx="958785" cy="134216"/>
+          </a:xfrm>
+          <a:prstGeom prst="straightConnector1">
+            <a:avLst/>
+          </a:prstGeom>
+          <a:ln>
+            <a:solidFill>
+              <a:srgbClr val="92D050"/>
+            </a:solidFill>
+            <a:tailEnd type="triangle"/>
+          </a:ln>
+        </p:spPr>
+        <p:style>
+          <a:lnRef idx="1">
+            <a:schemeClr val="accent1"/>
+          </a:lnRef>
+          <a:fillRef idx="0">
+            <a:schemeClr val="accent1"/>
+          </a:fillRef>
+          <a:effectRef idx="0">
+            <a:schemeClr val="accent1"/>
+          </a:effectRef>
+          <a:fontRef idx="minor">
+            <a:schemeClr val="tx1"/>
+          </a:fontRef>
+        </p:style>
+      </p:cxnSp>
+      <p:sp>
+        <p:nvSpPr>
+          <p:cNvPr id="228" name="TextBox 227">
+            <a:extLst>
+              <a:ext uri="{FF2B5EF4-FFF2-40B4-BE49-F238E27FC236}">
+                <a16:creationId xmlns:a16="http://schemas.microsoft.com/office/drawing/2014/main" id="{24217846-EEBD-44AF-9B74-177AF252E5A8}"/>
+              </a:ext>
+            </a:extLst>
+          </p:cNvPr>
+          <p:cNvSpPr txBox="1"/>
+          <p:nvPr/>
+        </p:nvSpPr>
+        <p:spPr>
+          <a:xfrm>
+            <a:off x="27826544" y="24341328"/>
+            <a:ext cx="886519" cy="369332"/>
+          </a:xfrm>
+          <a:prstGeom prst="rect">
+            <a:avLst/>
+          </a:prstGeom>
+          <a:noFill/>
+        </p:spPr>
+        <p:txBody>
+          <a:bodyPr wrap="square" rtlCol="0">
+            <a:spAutoFit/>
+          </a:bodyPr>
+          <a:lstStyle/>
+          <a:p>
+            <a:r>
+              <a:rPr lang="en-US" dirty="0"/>
+              <a:t>user</a:t>
+            </a:r>
           </a:p>
         </p:txBody>
       </p:sp>

</xml_diff>

<commit_message>
Modify TooltipsConfig a bit
</commit_message>
<xml_diff>
--- a/docs/architecture.pptx
+++ b/docs/architecture.pptx
@@ -117,7 +117,7 @@
 
 <file path=ppt/commentAuthors.xml><?xml version="1.0" encoding="utf-8"?>
 <p:cmAuthorLst xmlns:a="http://schemas.openxmlformats.org/drawingml/2006/main" xmlns:r="http://schemas.openxmlformats.org/officeDocument/2006/relationships" xmlns:p="http://schemas.openxmlformats.org/presentationml/2006/main">
-  <p:cmAuthor id="1" name="John Simerlink" initials="JS" lastIdx="1" clrIdx="0">
+  <p:cmAuthor id="1" name="John Simerlink" initials="JS" lastIdx="4" clrIdx="0">
     <p:extLst>
       <p:ext uri="{19B8F6BF-5375-455C-9EA6-DF929625EA0E}">
         <p15:presenceInfo xmlns:p15="http://schemas.microsoft.com/office/powerpoint/2012/main" userId="bb2883f3ca9420d0" providerId="Windows Live"/>
@@ -129,6 +129,42 @@
 
 <file path=ppt/revisionInfo.xml><?xml version="1.0" encoding="utf-8"?>
 <p1510:revInfo xmlns:a="http://schemas.openxmlformats.org/drawingml/2006/main" xmlns:r="http://schemas.openxmlformats.org/officeDocument/2006/relationships" xmlns:p1510="http://schemas.microsoft.com/office/powerpoint/2015/10/main"/>
+</file>
+
+<file path=ppt/comments/comment1.xml><?xml version="1.0" encoding="utf-8"?>
+<p:cmLst xmlns:a="http://schemas.openxmlformats.org/drawingml/2006/main" xmlns:r="http://schemas.openxmlformats.org/officeDocument/2006/relationships" xmlns:p="http://schemas.openxmlformats.org/presentationml/2006/main">
+  <p:cm authorId="1" dt="2018-01-17T12:22:15.072" idx="2">
+    <p:pos x="12983" y="10857"/>
+    <p:text>This is so that we can pass userId as a prop to a mutation in BranchesStore, which will then combine userId with contentId to get contentUserId. What we were trying to do before was just get the contentUserId from the sigmaNode.contentUserData.id. The problem is, is if a user had never had an interation with that content id before, sigmaNode.contentUserData would be undefined and thus we couldn't get a contentUserData out of it</p:text>
+    <p:extLst>
+      <p:ext uri="{C676402C-5697-4E1C-873F-D02D1690AC5C}">
+        <p15:threadingInfo xmlns:p15="http://schemas.microsoft.com/office/powerpoint/2012/main" timeZoneBias="300"/>
+      </p:ext>
+    </p:extLst>
+  </p:cm>
+  <p:cm authorId="1" dt="2018-01-17T12:25:21.537" idx="3">
+    <p:pos x="12983" y="10953"/>
+    <p:text>We could 1) actually just pass the contentUserId as a prop to the BranchesStore ADD_CONTENT_INTERACTION Mutation. And the way we would get contentUserId in the tree.ts component is by passing it in in tooltipOpener. TooltipOpener would compute the contentUserId because a) it has userId as a property (that it gets updated from Vuex) and b) the tooltipOpener.openTooltipMethod(node: ISigmaNode) called in SigmaEventListener will access the contentId property on sigmaNode and combine it with userId to get ContentUserId. []We will have to have a check though that the tooltipOpener fails if there is no contentId.</p:text>
+    <p:extLst>
+      <p:ext uri="{C676402C-5697-4E1C-873F-D02D1690AC5C}">
+        <p15:threadingInfo xmlns:p15="http://schemas.microsoft.com/office/powerpoint/2012/main" timeZoneBias="300">
+          <p15:parentCm authorId="1" idx="2"/>
+        </p15:threadingInfo>
+      </p:ext>
+    </p:extLst>
+  </p:cm>
+  <p:cm authorId="1" dt="2018-01-17T12:31:26.672" idx="4">
+    <p:pos x="12983" y="11049"/>
+    <p:text>[] So we are going to have to modify TooltipOpener to include the config inside of the class directly? so that we can interpolate the userId property on tooltipOpener into the created template</p:text>
+    <p:extLst>
+      <p:ext uri="{C676402C-5697-4E1C-873F-D02D1690AC5C}">
+        <p15:threadingInfo xmlns:p15="http://schemas.microsoft.com/office/powerpoint/2012/main" timeZoneBias="300">
+          <p15:parentCm authorId="1" idx="2"/>
+        </p15:threadingInfo>
+      </p:ext>
+    </p:extLst>
+  </p:cm>
+</p:cmLst>
 </file>
 
 <file path=ppt/slideLayouts/slideLayout1.xml><?xml version="1.0" encoding="utf-8"?>
@@ -262,7 +298,7 @@
           <a:p>
             <a:fld id="{0A05F3B5-6F50-4323-80C0-955EB0110BAC}" type="datetimeFigureOut">
               <a:rPr lang="en-US" smtClean="0"/>
-              <a:t>1/10/2018</a:t>
+              <a:t>1/12/2018</a:t>
             </a:fld>
             <a:endParaRPr lang="en-US"/>
           </a:p>
@@ -432,7 +468,7 @@
           <a:p>
             <a:fld id="{0A05F3B5-6F50-4323-80C0-955EB0110BAC}" type="datetimeFigureOut">
               <a:rPr lang="en-US" smtClean="0"/>
-              <a:t>1/10/2018</a:t>
+              <a:t>1/12/2018</a:t>
             </a:fld>
             <a:endParaRPr lang="en-US"/>
           </a:p>
@@ -612,7 +648,7 @@
           <a:p>
             <a:fld id="{0A05F3B5-6F50-4323-80C0-955EB0110BAC}" type="datetimeFigureOut">
               <a:rPr lang="en-US" smtClean="0"/>
-              <a:t>1/10/2018</a:t>
+              <a:t>1/12/2018</a:t>
             </a:fld>
             <a:endParaRPr lang="en-US"/>
           </a:p>
@@ -782,7 +818,7 @@
           <a:p>
             <a:fld id="{0A05F3B5-6F50-4323-80C0-955EB0110BAC}" type="datetimeFigureOut">
               <a:rPr lang="en-US" smtClean="0"/>
-              <a:t>1/10/2018</a:t>
+              <a:t>1/12/2018</a:t>
             </a:fld>
             <a:endParaRPr lang="en-US"/>
           </a:p>
@@ -1026,7 +1062,7 @@
           <a:p>
             <a:fld id="{0A05F3B5-6F50-4323-80C0-955EB0110BAC}" type="datetimeFigureOut">
               <a:rPr lang="en-US" smtClean="0"/>
-              <a:t>1/10/2018</a:t>
+              <a:t>1/12/2018</a:t>
             </a:fld>
             <a:endParaRPr lang="en-US"/>
           </a:p>
@@ -1258,7 +1294,7 @@
           <a:p>
             <a:fld id="{0A05F3B5-6F50-4323-80C0-955EB0110BAC}" type="datetimeFigureOut">
               <a:rPr lang="en-US" smtClean="0"/>
-              <a:t>1/10/2018</a:t>
+              <a:t>1/12/2018</a:t>
             </a:fld>
             <a:endParaRPr lang="en-US"/>
           </a:p>
@@ -1625,7 +1661,7 @@
           <a:p>
             <a:fld id="{0A05F3B5-6F50-4323-80C0-955EB0110BAC}" type="datetimeFigureOut">
               <a:rPr lang="en-US" smtClean="0"/>
-              <a:t>1/10/2018</a:t>
+              <a:t>1/12/2018</a:t>
             </a:fld>
             <a:endParaRPr lang="en-US"/>
           </a:p>
@@ -1743,7 +1779,7 @@
           <a:p>
             <a:fld id="{0A05F3B5-6F50-4323-80C0-955EB0110BAC}" type="datetimeFigureOut">
               <a:rPr lang="en-US" smtClean="0"/>
-              <a:t>1/10/2018</a:t>
+              <a:t>1/12/2018</a:t>
             </a:fld>
             <a:endParaRPr lang="en-US"/>
           </a:p>
@@ -1838,7 +1874,7 @@
           <a:p>
             <a:fld id="{0A05F3B5-6F50-4323-80C0-955EB0110BAC}" type="datetimeFigureOut">
               <a:rPr lang="en-US" smtClean="0"/>
-              <a:t>1/10/2018</a:t>
+              <a:t>1/12/2018</a:t>
             </a:fld>
             <a:endParaRPr lang="en-US"/>
           </a:p>
@@ -2115,7 +2151,7 @@
           <a:p>
             <a:fld id="{0A05F3B5-6F50-4323-80C0-955EB0110BAC}" type="datetimeFigureOut">
               <a:rPr lang="en-US" smtClean="0"/>
-              <a:t>1/10/2018</a:t>
+              <a:t>1/12/2018</a:t>
             </a:fld>
             <a:endParaRPr lang="en-US"/>
           </a:p>
@@ -2372,7 +2408,7 @@
           <a:p>
             <a:fld id="{0A05F3B5-6F50-4323-80C0-955EB0110BAC}" type="datetimeFigureOut">
               <a:rPr lang="en-US" smtClean="0"/>
-              <a:t>1/10/2018</a:t>
+              <a:t>1/12/2018</a:t>
             </a:fld>
             <a:endParaRPr lang="en-US"/>
           </a:p>
@@ -2585,7 +2621,7 @@
           <a:p>
             <a:fld id="{0A05F3B5-6F50-4323-80C0-955EB0110BAC}" type="datetimeFigureOut">
               <a:rPr lang="en-US" smtClean="0"/>
-              <a:t>1/10/2018</a:t>
+              <a:t>1/12/2018</a:t>
             </a:fld>
             <a:endParaRPr lang="en-US"/>
           </a:p>
@@ -6763,10 +6799,10 @@
       </p:sp>
       <p:sp>
         <p:nvSpPr>
-          <p:cNvPr id="2" name="TextBox 1">
-            <a:extLst>
-              <a:ext uri="{FF2B5EF4-FFF2-40B4-BE49-F238E27FC236}">
-                <a16:creationId xmlns:a16="http://schemas.microsoft.com/office/drawing/2014/main" id="{2E0597A3-41BE-4D11-A315-1705EA007309}"/>
+          <p:cNvPr id="3" name="TextBox 2">
+            <a:extLst>
+              <a:ext uri="{FF2B5EF4-FFF2-40B4-BE49-F238E27FC236}">
+                <a16:creationId xmlns:a16="http://schemas.microsoft.com/office/drawing/2014/main" id="{4450358A-3F67-4420-916D-B297C97D5A69}"/>
               </a:ext>
             </a:extLst>
           </p:cNvPr>
@@ -6775,8 +6811,8 @@
         </p:nvSpPr>
         <p:spPr>
           <a:xfrm>
-            <a:off x="20095502" y="17329830"/>
-            <a:ext cx="1615210" cy="584775"/>
+            <a:off x="21903520" y="18433549"/>
+            <a:ext cx="4615065" cy="276999"/>
           </a:xfrm>
           <a:prstGeom prst="rect">
             <a:avLst/>
@@ -6790,74 +6826,6 @@
           <a:lstStyle/>
           <a:p>
             <a:r>
-              <a:rPr lang="en-US" sz="1200" dirty="0"/>
-              <a:t>UI/</a:t>
-            </a:r>
-            <a:r>
-              <a:rPr lang="en-US" sz="1200" dirty="0" err="1"/>
-              <a:t>Vue</a:t>
-            </a:r>
-            <a:r>
-              <a:rPr lang="en-US" sz="1200" dirty="0"/>
-              <a:t> components</a:t>
-            </a:r>
-          </a:p>
-          <a:p>
-            <a:r>
-              <a:rPr lang="en-US" sz="400" dirty="0"/>
-              <a:t>-have no knowledge of their objects</a:t>
-            </a:r>
-          </a:p>
-          <a:p>
-            <a:r>
-              <a:rPr lang="en-US" sz="400" dirty="0"/>
-              <a:t>-should not call any databases or ORMs to retrieve data</a:t>
-            </a:r>
-          </a:p>
-          <a:p>
-            <a:pPr defTabSz="114300"/>
-            <a:r>
-              <a:rPr lang="en-US" sz="400" dirty="0"/>
-              <a:t>	-should get all of its data from the JSON/ JS object from the sigma Nodes</a:t>
-            </a:r>
-          </a:p>
-          <a:p>
-            <a:r>
-              <a:rPr lang="en-US" sz="400" dirty="0"/>
-              <a:t>-only call mutations on store</a:t>
-            </a:r>
-          </a:p>
-        </p:txBody>
-      </p:sp>
-      <p:sp>
-        <p:nvSpPr>
-          <p:cNvPr id="3" name="TextBox 2">
-            <a:extLst>
-              <a:ext uri="{FF2B5EF4-FFF2-40B4-BE49-F238E27FC236}">
-                <a16:creationId xmlns:a16="http://schemas.microsoft.com/office/drawing/2014/main" id="{4450358A-3F67-4420-916D-B297C97D5A69}"/>
-              </a:ext>
-            </a:extLst>
-          </p:cNvPr>
-          <p:cNvSpPr txBox="1"/>
-          <p:nvPr/>
-        </p:nvSpPr>
-        <p:spPr>
-          <a:xfrm>
-            <a:off x="21903520" y="18433549"/>
-            <a:ext cx="4615065" cy="276999"/>
-          </a:xfrm>
-          <a:prstGeom prst="rect">
-            <a:avLst/>
-          </a:prstGeom>
-          <a:noFill/>
-        </p:spPr>
-        <p:txBody>
-          <a:bodyPr wrap="square" rtlCol="0">
-            <a:spAutoFit/>
-          </a:bodyPr>
-          <a:lstStyle/>
-          <a:p>
-            <a:r>
               <a:rPr lang="en-US" sz="400" dirty="0"/>
               <a:t>trigger store mutations (DATA_MUTATIONS)</a:t>
             </a:r>
@@ -6901,14 +6869,14 @@
           <p:cNvCxnSpPr>
             <a:cxnSpLocks/>
             <a:stCxn id="2" idx="2"/>
-            <a:endCxn id="37" idx="0"/>
+            <a:endCxn id="278" idx="0"/>
           </p:cNvCxnSpPr>
           <p:nvPr/>
         </p:nvCxnSpPr>
         <p:spPr>
           <a:xfrm>
-            <a:off x="20903107" y="17914605"/>
-            <a:ext cx="2044372" cy="3374502"/>
+            <a:off x="22113539" y="17474165"/>
+            <a:ext cx="269618" cy="3466298"/>
           </a:xfrm>
           <a:prstGeom prst="straightConnector1">
             <a:avLst/>
@@ -6966,7 +6934,7 @@
             <a:pPr algn="ctr"/>
             <a:r>
               <a:rPr lang="en-US" sz="800" dirty="0"/>
-              <a:t>STORE</a:t>
+              <a:t>GLOBAL_DATA_STORE</a:t>
             </a:r>
           </a:p>
           <a:p>
@@ -7536,64 +7504,6 @@
           </a:fontRef>
         </p:style>
       </p:cxnSp>
-      <p:sp>
-        <p:nvSpPr>
-          <p:cNvPr id="37" name="TextBox 36">
-            <a:extLst>
-              <a:ext uri="{FF2B5EF4-FFF2-40B4-BE49-F238E27FC236}">
-                <a16:creationId xmlns:a16="http://schemas.microsoft.com/office/drawing/2014/main" id="{5EFBCD58-F401-4730-A48F-C5D33E14D7F9}"/>
-              </a:ext>
-            </a:extLst>
-          </p:cNvPr>
-          <p:cNvSpPr txBox="1"/>
-          <p:nvPr/>
-        </p:nvSpPr>
-        <p:spPr>
-          <a:xfrm>
-            <a:off x="21571165" y="21289107"/>
-            <a:ext cx="2752628" cy="215444"/>
-          </a:xfrm>
-          <a:prstGeom prst="rect">
-            <a:avLst/>
-          </a:prstGeom>
-          <a:noFill/>
-        </p:spPr>
-        <p:txBody>
-          <a:bodyPr wrap="square" rtlCol="0">
-            <a:spAutoFit/>
-          </a:bodyPr>
-          <a:lstStyle/>
-          <a:p>
-            <a:r>
-              <a:rPr lang="en-US" sz="400" dirty="0" err="1"/>
-              <a:t>Store.addMutation</a:t>
-            </a:r>
-            <a:r>
-              <a:rPr lang="en-US" sz="400" dirty="0"/>
-              <a:t>({</a:t>
-            </a:r>
-            <a:r>
-              <a:rPr lang="en-US" sz="400" dirty="0" err="1"/>
-              <a:t>objectType</a:t>
-            </a:r>
-            <a:r>
-              <a:rPr lang="en-US" sz="400" dirty="0"/>
-              <a:t>: trees, </a:t>
-            </a:r>
-            <a:r>
-              <a:rPr lang="en-US" sz="400" dirty="0" err="1"/>
-              <a:t>objectId</a:t>
-            </a:r>
-            <a:r>
-              <a:rPr lang="en-US" sz="400" dirty="0"/>
-              <a:t>: efa234, property: children, mutation})</a:t>
-            </a:r>
-          </a:p>
-          <a:p>
-            <a:endParaRPr lang="en-US" sz="400" dirty="0"/>
-          </a:p>
-        </p:txBody>
-      </p:sp>
       <p:cxnSp>
         <p:nvCxnSpPr>
           <p:cNvPr id="40" name="Straight Arrow Connector 39">
@@ -9472,96 +9382,6 @@
           </a:p>
         </p:txBody>
       </p:sp>
-      <p:sp>
-        <p:nvSpPr>
-          <p:cNvPr id="274" name="TextBox 273">
-            <a:extLst>
-              <a:ext uri="{FF2B5EF4-FFF2-40B4-BE49-F238E27FC236}">
-                <a16:creationId xmlns:a16="http://schemas.microsoft.com/office/drawing/2014/main" id="{AC73E328-E5E1-4F8F-ABDB-E94D6DE9980F}"/>
-              </a:ext>
-            </a:extLst>
-          </p:cNvPr>
-          <p:cNvSpPr txBox="1"/>
-          <p:nvPr/>
-        </p:nvSpPr>
-        <p:spPr>
-          <a:xfrm>
-            <a:off x="19506927" y="18999553"/>
-            <a:ext cx="1134636" cy="646331"/>
-          </a:xfrm>
-          <a:prstGeom prst="rect">
-            <a:avLst/>
-          </a:prstGeom>
-          <a:noFill/>
-        </p:spPr>
-        <p:txBody>
-          <a:bodyPr wrap="square" rtlCol="0">
-            <a:spAutoFit/>
-          </a:bodyPr>
-          <a:lstStyle/>
-          <a:p>
-            <a:r>
-              <a:rPr lang="en-US" sz="400" dirty="0" err="1"/>
-              <a:t>SigmaListener</a:t>
-            </a:r>
-            <a:endParaRPr lang="en-US" sz="400" dirty="0"/>
-          </a:p>
-          <a:p>
-            <a:r>
-              <a:rPr lang="en-US" sz="400" dirty="0"/>
-              <a:t>-listens to sigma Events and converts them to 1) store mutations, 2) open </a:t>
-            </a:r>
-            <a:r>
-              <a:rPr lang="en-US" sz="400" dirty="0" err="1"/>
-              <a:t>Vue</a:t>
-            </a:r>
-            <a:r>
-              <a:rPr lang="en-US" sz="400" dirty="0"/>
-              <a:t> templates or 3) UI mutations (such as </a:t>
-            </a:r>
-            <a:r>
-              <a:rPr lang="en-US" sz="400" dirty="0" err="1"/>
-              <a:t>saveHistory</a:t>
-            </a:r>
-            <a:r>
-              <a:rPr lang="en-US" sz="400" dirty="0"/>
-              <a:t>)</a:t>
-            </a:r>
-          </a:p>
-          <a:p>
-            <a:r>
-              <a:rPr lang="en-US" sz="400" dirty="0"/>
-              <a:t>-reference to store, and reference to </a:t>
-            </a:r>
-            <a:r>
-              <a:rPr lang="en-US" sz="400" dirty="0" err="1"/>
-              <a:t>sigmaInstance</a:t>
-            </a:r>
-            <a:endParaRPr lang="en-US" sz="400" dirty="0"/>
-          </a:p>
-          <a:p>
-            <a:endParaRPr lang="en-US" sz="400" dirty="0"/>
-          </a:p>
-          <a:p>
-            <a:r>
-              <a:rPr lang="en-US" sz="400" dirty="0" err="1"/>
-              <a:t>SIGMA_INSTANCE.on</a:t>
-            </a:r>
-            <a:r>
-              <a:rPr lang="en-US" sz="400" dirty="0"/>
-              <a:t>(</a:t>
-            </a:r>
-            <a:r>
-              <a:rPr lang="en-US" sz="400" dirty="0" err="1"/>
-              <a:t>SIGMA_EVENTS.tree_location_move</a:t>
-            </a:r>
-            <a:r>
-              <a:rPr lang="en-US" sz="400" dirty="0"/>
-              <a:t>, ….)</a:t>
-            </a:r>
-          </a:p>
-        </p:txBody>
-      </p:sp>
       <p:cxnSp>
         <p:nvCxnSpPr>
           <p:cNvPr id="283" name="Straight Arrow Connector 282">
@@ -9574,14 +9394,14 @@
           <p:cNvCxnSpPr>
             <a:cxnSpLocks/>
             <a:stCxn id="274" idx="2"/>
-            <a:endCxn id="37" idx="0"/>
+            <a:endCxn id="278" idx="0"/>
           </p:cNvCxnSpPr>
           <p:nvPr/>
         </p:nvCxnSpPr>
         <p:spPr>
           <a:xfrm>
             <a:off x="20074245" y="19645884"/>
-            <a:ext cx="2873234" cy="1643223"/>
+            <a:ext cx="2308912" cy="1294579"/>
           </a:xfrm>
           <a:prstGeom prst="straightConnector1">
             <a:avLst/>
@@ -9671,7 +9491,7 @@
         </p:nvSpPr>
         <p:spPr>
           <a:xfrm>
-            <a:off x="19922595" y="20010805"/>
+            <a:off x="23072155" y="21609465"/>
             <a:ext cx="804552" cy="523220"/>
           </a:xfrm>
           <a:prstGeom prst="rect">
@@ -9689,7 +9509,7 @@
           <a:p>
             <a:r>
               <a:rPr lang="en-US" sz="400" dirty="0" err="1"/>
-              <a:t>Store.addMutation</a:t>
+              <a:t>globalDataStore.addMutation</a:t>
             </a:r>
             <a:r>
               <a:rPr lang="en-US" sz="400" dirty="0"/>
@@ -12203,15 +12023,15 @@
           </p:cNvPr>
           <p:cNvCxnSpPr>
             <a:cxnSpLocks/>
-            <a:stCxn id="274" idx="0"/>
+            <a:stCxn id="266" idx="0"/>
             <a:endCxn id="2" idx="2"/>
           </p:cNvCxnSpPr>
           <p:nvPr/>
         </p:nvCxnSpPr>
         <p:spPr>
           <a:xfrm flipV="1">
-            <a:off x="20074245" y="17914605"/>
-            <a:ext cx="828862" cy="1084948"/>
+            <a:off x="21333306" y="17474165"/>
+            <a:ext cx="780233" cy="1767351"/>
           </a:xfrm>
           <a:prstGeom prst="straightConnector1">
             <a:avLst/>
@@ -12252,8 +12072,8 @@
         </p:nvSpPr>
         <p:spPr>
           <a:xfrm>
-            <a:off x="19847880" y="18531012"/>
-            <a:ext cx="1232345" cy="215444"/>
+            <a:off x="20824303" y="18889541"/>
+            <a:ext cx="1232345" cy="153888"/>
           </a:xfrm>
           <a:prstGeom prst="rect">
             <a:avLst/>
@@ -12267,15 +12087,15 @@
           <a:lstStyle/>
           <a:p>
             <a:r>
-              <a:rPr lang="en-US" sz="800" dirty="0"/>
-              <a:t>2 Open </a:t>
-            </a:r>
-            <a:r>
-              <a:rPr lang="en-US" sz="800" dirty="0" err="1"/>
+              <a:rPr lang="en-US" sz="400" dirty="0"/>
+              <a:t>Create and Open </a:t>
+            </a:r>
+            <a:r>
+              <a:rPr lang="en-US" sz="400" dirty="0" err="1"/>
               <a:t>Vue</a:t>
             </a:r>
             <a:r>
-              <a:rPr lang="en-US" sz="800" dirty="0"/>
+              <a:rPr lang="en-US" sz="400" dirty="0"/>
               <a:t> Templates</a:t>
             </a:r>
           </a:p>
@@ -12467,52 +12287,6 @@
           </a:p>
         </p:txBody>
       </p:sp>
-      <p:cxnSp>
-        <p:nvCxnSpPr>
-          <p:cNvPr id="129" name="Straight Arrow Connector 128">
-            <a:extLst>
-              <a:ext uri="{FF2B5EF4-FFF2-40B4-BE49-F238E27FC236}">
-                <a16:creationId xmlns:a16="http://schemas.microsoft.com/office/drawing/2014/main" id="{EF5B787E-C97D-45DB-9363-5A954A8F0F56}"/>
-              </a:ext>
-            </a:extLst>
-          </p:cNvPr>
-          <p:cNvCxnSpPr>
-            <a:cxnSpLocks/>
-            <a:stCxn id="37" idx="2"/>
-            <a:endCxn id="11" idx="0"/>
-          </p:cNvCxnSpPr>
-          <p:nvPr/>
-        </p:nvCxnSpPr>
-        <p:spPr>
-          <a:xfrm>
-            <a:off x="22947479" y="21504551"/>
-            <a:ext cx="0" cy="962656"/>
-          </a:xfrm>
-          <a:prstGeom prst="straightConnector1">
-            <a:avLst/>
-          </a:prstGeom>
-          <a:ln w="76200">
-            <a:solidFill>
-              <a:schemeClr val="accent4"/>
-            </a:solidFill>
-            <a:tailEnd type="triangle"/>
-          </a:ln>
-        </p:spPr>
-        <p:style>
-          <a:lnRef idx="1">
-            <a:schemeClr val="accent1"/>
-          </a:lnRef>
-          <a:fillRef idx="0">
-            <a:schemeClr val="accent1"/>
-          </a:fillRef>
-          <a:effectRef idx="0">
-            <a:schemeClr val="accent1"/>
-          </a:effectRef>
-          <a:fontRef idx="minor">
-            <a:schemeClr val="tx1"/>
-          </a:fontRef>
-        </p:style>
-      </p:cxnSp>
       <p:grpSp>
         <p:nvGrpSpPr>
           <p:cNvPr id="248" name="Group 247">
@@ -13196,14 +12970,14 @@
           <p:cNvCxnSpPr>
             <a:cxnSpLocks/>
             <a:stCxn id="7" idx="0"/>
-            <a:endCxn id="18" idx="2"/>
+            <a:endCxn id="226" idx="2"/>
           </p:cNvCxnSpPr>
           <p:nvPr/>
         </p:nvCxnSpPr>
         <p:spPr>
-          <a:xfrm flipV="1">
-            <a:off x="16811394" y="22076637"/>
-            <a:ext cx="1365027" cy="1594022"/>
+          <a:xfrm flipH="1" flipV="1">
+            <a:off x="16306602" y="22327224"/>
+            <a:ext cx="504792" cy="1343435"/>
           </a:xfrm>
           <a:prstGeom prst="straightConnector1">
             <a:avLst/>
@@ -13661,42 +13435,6 @@
           </p:txBody>
         </p:sp>
       </p:grpSp>
-      <p:sp>
-        <p:nvSpPr>
-          <p:cNvPr id="162" name="TextBox 161">
-            <a:extLst>
-              <a:ext uri="{FF2B5EF4-FFF2-40B4-BE49-F238E27FC236}">
-                <a16:creationId xmlns:a16="http://schemas.microsoft.com/office/drawing/2014/main" id="{C5453BFB-426C-41F1-A3BF-028AE67B1AA7}"/>
-              </a:ext>
-            </a:extLst>
-          </p:cNvPr>
-          <p:cNvSpPr txBox="1"/>
-          <p:nvPr/>
-        </p:nvSpPr>
-        <p:spPr>
-          <a:xfrm>
-            <a:off x="17851956" y="21557214"/>
-            <a:ext cx="641775" cy="153888"/>
-          </a:xfrm>
-          <a:prstGeom prst="rect">
-            <a:avLst/>
-          </a:prstGeom>
-          <a:noFill/>
-        </p:spPr>
-        <p:txBody>
-          <a:bodyPr wrap="square" rtlCol="0">
-            <a:spAutoFit/>
-          </a:bodyPr>
-          <a:lstStyle/>
-          <a:p>
-            <a:r>
-              <a:rPr lang="en-US" sz="400" dirty="0" err="1"/>
-              <a:t>sigmaNodeCreator</a:t>
-            </a:r>
-            <a:endParaRPr lang="en-US" sz="400" dirty="0"/>
-          </a:p>
-        </p:txBody>
-      </p:sp>
       <p:cxnSp>
         <p:nvCxnSpPr>
           <p:cNvPr id="35" name="Straight Arrow Connector 34">
@@ -13708,15 +13446,15 @@
           </p:cNvPr>
           <p:cNvCxnSpPr>
             <a:cxnSpLocks/>
-            <a:stCxn id="273" idx="0"/>
+            <a:stCxn id="166" idx="4"/>
             <a:endCxn id="245" idx="2"/>
           </p:cNvCxnSpPr>
           <p:nvPr/>
         </p:nvCxnSpPr>
         <p:spPr>
           <a:xfrm flipV="1">
-            <a:off x="18079493" y="20414417"/>
-            <a:ext cx="101804" cy="365172"/>
+            <a:off x="18105479" y="20414417"/>
+            <a:ext cx="75818" cy="299934"/>
           </a:xfrm>
           <a:prstGeom prst="straightConnector1">
             <a:avLst/>
@@ -15311,14 +15049,14 @@
           <p:cNvCxnSpPr>
             <a:cxnSpLocks/>
             <a:stCxn id="175" idx="0"/>
-            <a:endCxn id="18" idx="2"/>
+            <a:endCxn id="226" idx="2"/>
           </p:cNvCxnSpPr>
           <p:nvPr/>
         </p:nvCxnSpPr>
         <p:spPr>
-          <a:xfrm flipV="1">
-            <a:off x="16811394" y="22076637"/>
-            <a:ext cx="1365027" cy="2029003"/>
+          <a:xfrm flipH="1" flipV="1">
+            <a:off x="16306602" y="22327224"/>
+            <a:ext cx="504792" cy="1778416"/>
           </a:xfrm>
           <a:prstGeom prst="straightConnector1">
             <a:avLst/>
@@ -15358,14 +15096,14 @@
           <p:cNvCxnSpPr>
             <a:cxnSpLocks/>
             <a:stCxn id="175" idx="2"/>
-            <a:endCxn id="18" idx="2"/>
+            <a:endCxn id="226" idx="2"/>
           </p:cNvCxnSpPr>
           <p:nvPr/>
         </p:nvCxnSpPr>
         <p:spPr>
-          <a:xfrm flipV="1">
-            <a:off x="16811394" y="22076637"/>
-            <a:ext cx="1365027" cy="2429113"/>
+          <a:xfrm flipH="1" flipV="1">
+            <a:off x="16306602" y="22327224"/>
+            <a:ext cx="504792" cy="2178526"/>
           </a:xfrm>
           <a:prstGeom prst="straightConnector1">
             <a:avLst/>
@@ -15405,14 +15143,14 @@
           <p:cNvCxnSpPr>
             <a:cxnSpLocks/>
             <a:stCxn id="180" idx="2"/>
-            <a:endCxn id="18" idx="2"/>
+            <a:endCxn id="226" idx="2"/>
           </p:cNvCxnSpPr>
           <p:nvPr/>
         </p:nvCxnSpPr>
         <p:spPr>
-          <a:xfrm flipV="1">
-            <a:off x="16811394" y="22076637"/>
-            <a:ext cx="1365027" cy="2830555"/>
+          <a:xfrm flipH="1" flipV="1">
+            <a:off x="16306602" y="22327224"/>
+            <a:ext cx="504792" cy="2579968"/>
           </a:xfrm>
           <a:prstGeom prst="straightConnector1">
             <a:avLst/>
@@ -15452,14 +15190,14 @@
           <p:cNvCxnSpPr>
             <a:cxnSpLocks/>
             <a:stCxn id="196" idx="0"/>
-            <a:endCxn id="18" idx="2"/>
+            <a:endCxn id="226" idx="2"/>
           </p:cNvCxnSpPr>
           <p:nvPr/>
         </p:nvCxnSpPr>
         <p:spPr>
-          <a:xfrm flipV="1">
-            <a:off x="16811394" y="22076637"/>
-            <a:ext cx="1365027" cy="3162677"/>
+          <a:xfrm flipH="1" flipV="1">
+            <a:off x="16306602" y="22327224"/>
+            <a:ext cx="504792" cy="2912090"/>
           </a:xfrm>
           <a:prstGeom prst="straightConnector1">
             <a:avLst/>
@@ -15631,8 +15369,8 @@
         </p:nvSpPr>
         <p:spPr>
           <a:xfrm>
-            <a:off x="17793450" y="21922749"/>
-            <a:ext cx="765942" cy="153888"/>
+            <a:off x="17787735" y="21918158"/>
+            <a:ext cx="1075961" cy="338554"/>
           </a:xfrm>
           <a:prstGeom prst="rect">
             <a:avLst/>
@@ -15647,8 +15385,35 @@
           <a:p>
             <a:r>
               <a:rPr lang="en-US" sz="400" dirty="0" err="1"/>
-              <a:t>StoreSourceUpdateListener</a:t>
-            </a:r>
+              <a:t>StoreSourceUpdateListenerCore</a:t>
+            </a:r>
+            <a:endParaRPr lang="en-US" sz="400" dirty="0"/>
+          </a:p>
+          <a:p>
+            <a:r>
+              <a:rPr lang="en-US" sz="400" dirty="0"/>
+              <a:t>+</a:t>
+            </a:r>
+            <a:r>
+              <a:rPr lang="en-US" sz="400" dirty="0" err="1"/>
+              <a:t>receiveUpdate</a:t>
+            </a:r>
+            <a:endParaRPr lang="en-US" sz="400" dirty="0"/>
+          </a:p>
+          <a:p>
+            <a:pPr defTabSz="114300"/>
+            <a:r>
+              <a:rPr lang="en-US" sz="400" dirty="0"/>
+              <a:t>	creates the </a:t>
+            </a:r>
+            <a:r>
+              <a:rPr lang="en-US" sz="400" dirty="0" err="1"/>
+              <a:t>sigmaNodes</a:t>
+            </a:r>
+            <a:endParaRPr lang="en-US" sz="400" dirty="0"/>
+          </a:p>
+          <a:p>
+            <a:pPr defTabSz="114300"/>
             <a:endParaRPr lang="en-US" sz="400" dirty="0"/>
           </a:p>
         </p:txBody>
@@ -15665,14 +15430,14 @@
           <p:cNvCxnSpPr>
             <a:cxnSpLocks/>
             <a:stCxn id="18" idx="0"/>
-            <a:endCxn id="162" idx="2"/>
+            <a:endCxn id="166" idx="4"/>
           </p:cNvCxnSpPr>
           <p:nvPr/>
         </p:nvCxnSpPr>
         <p:spPr>
           <a:xfrm flipH="1" flipV="1">
-            <a:off x="18172844" y="21711102"/>
-            <a:ext cx="3577" cy="211647"/>
+            <a:off x="18105479" y="20714351"/>
+            <a:ext cx="220237" cy="1203807"/>
           </a:xfrm>
           <a:prstGeom prst="straightConnector1">
             <a:avLst/>
@@ -15747,10 +15512,10 @@
       </p:cxnSp>
       <p:sp>
         <p:nvSpPr>
-          <p:cNvPr id="273" name="TextBox 272">
-            <a:extLst>
-              <a:ext uri="{FF2B5EF4-FFF2-40B4-BE49-F238E27FC236}">
-                <a16:creationId xmlns:a16="http://schemas.microsoft.com/office/drawing/2014/main" id="{53E1610E-0887-49B1-A936-EDE9E49A136F}"/>
+          <p:cNvPr id="61" name="TextBox 60">
+            <a:extLst>
+              <a:ext uri="{FF2B5EF4-FFF2-40B4-BE49-F238E27FC236}">
+                <a16:creationId xmlns:a16="http://schemas.microsoft.com/office/drawing/2014/main" id="{F1987E75-2953-49D6-BAFD-6CC2E0F5F2CD}"/>
               </a:ext>
             </a:extLst>
           </p:cNvPr>
@@ -15759,8 +15524,8 @@
         </p:nvSpPr>
         <p:spPr>
           <a:xfrm>
-            <a:off x="17733108" y="20779589"/>
-            <a:ext cx="692770" cy="153888"/>
+            <a:off x="16294418" y="21495711"/>
+            <a:ext cx="1268385" cy="461665"/>
           </a:xfrm>
           <a:prstGeom prst="rect">
             <a:avLst/>
@@ -15774,19 +15539,112 @@
           <a:lstStyle/>
           <a:p>
             <a:r>
-              <a:rPr lang="en-US" sz="400" dirty="0" err="1"/>
-              <a:t>sigmaNodeCreatorCore</a:t>
-            </a:r>
-            <a:endParaRPr lang="en-US" sz="400" dirty="0"/>
+              <a:rPr lang="en-US" sz="400" dirty="0"/>
+              <a:t>Data </a:t>
+            </a:r>
+            <a:r>
+              <a:rPr lang="en-US" sz="400" dirty="0" err="1"/>
+              <a:t>Update_UI_UPDATE</a:t>
+            </a:r>
+            <a:r>
+              <a:rPr lang="en-US" sz="400" dirty="0"/>
+              <a:t> BRIDGE</a:t>
+            </a:r>
+          </a:p>
+          <a:p>
+            <a:r>
+              <a:rPr lang="en-US" sz="400" dirty="0"/>
+              <a:t>- Subscribes to store updates</a:t>
+            </a:r>
+          </a:p>
+          <a:p>
+            <a:r>
+              <a:rPr lang="en-US" sz="400" dirty="0"/>
+              <a:t>parses update</a:t>
+            </a:r>
+          </a:p>
+          <a:p>
+            <a:r>
+              <a:rPr lang="en-US" sz="400" dirty="0"/>
+              <a:t>- has reference to a </a:t>
+            </a:r>
+            <a:r>
+              <a:rPr lang="en-US" sz="400" dirty="0" err="1"/>
+              <a:t>sigma_handler</a:t>
+            </a:r>
+            <a:r>
+              <a:rPr lang="en-US" sz="400" dirty="0"/>
+              <a:t> and other UIS</a:t>
+            </a:r>
+          </a:p>
+          <a:p>
+            <a:r>
+              <a:rPr lang="en-US" sz="400" dirty="0"/>
+              <a:t>- calls the correct method w/ correct </a:t>
+            </a:r>
+            <a:r>
+              <a:rPr lang="en-US" sz="400" dirty="0" err="1"/>
+              <a:t>params</a:t>
+            </a:r>
+            <a:r>
+              <a:rPr lang="en-US" sz="400" dirty="0"/>
+              <a:t> on SIGMA_HANDLER + other UIs</a:t>
+            </a:r>
           </a:p>
         </p:txBody>
       </p:sp>
+      <p:cxnSp>
+        <p:nvCxnSpPr>
+          <p:cNvPr id="322" name="Straight Arrow Connector 321">
+            <a:extLst>
+              <a:ext uri="{FF2B5EF4-FFF2-40B4-BE49-F238E27FC236}">
+                <a16:creationId xmlns:a16="http://schemas.microsoft.com/office/drawing/2014/main" id="{C1D0D427-7CCF-4F61-9497-D7511491D7B0}"/>
+              </a:ext>
+            </a:extLst>
+          </p:cNvPr>
+          <p:cNvCxnSpPr>
+            <a:cxnSpLocks/>
+            <a:stCxn id="18" idx="0"/>
+            <a:endCxn id="27" idx="2"/>
+          </p:cNvCxnSpPr>
+          <p:nvPr/>
+        </p:nvCxnSpPr>
+        <p:spPr>
+          <a:xfrm flipH="1" flipV="1">
+            <a:off x="16709140" y="20204204"/>
+            <a:ext cx="1616576" cy="1713954"/>
+          </a:xfrm>
+          <a:prstGeom prst="straightConnector1">
+            <a:avLst/>
+          </a:prstGeom>
+          <a:ln>
+            <a:solidFill>
+              <a:srgbClr val="00B0F0"/>
+            </a:solidFill>
+            <a:tailEnd type="triangle"/>
+          </a:ln>
+        </p:spPr>
+        <p:style>
+          <a:lnRef idx="1">
+            <a:schemeClr val="accent1"/>
+          </a:lnRef>
+          <a:fillRef idx="0">
+            <a:schemeClr val="accent1"/>
+          </a:fillRef>
+          <a:effectRef idx="0">
+            <a:schemeClr val="accent1"/>
+          </a:effectRef>
+          <a:fontRef idx="minor">
+            <a:schemeClr val="tx1"/>
+          </a:fontRef>
+        </p:style>
+      </p:cxnSp>
       <p:sp>
         <p:nvSpPr>
-          <p:cNvPr id="61" name="TextBox 60">
-            <a:extLst>
-              <a:ext uri="{FF2B5EF4-FFF2-40B4-BE49-F238E27FC236}">
-                <a16:creationId xmlns:a16="http://schemas.microsoft.com/office/drawing/2014/main" id="{F1987E75-2953-49D6-BAFD-6CC2E0F5F2CD}"/>
+          <p:cNvPr id="21" name="TextBox 20">
+            <a:extLst>
+              <a:ext uri="{FF2B5EF4-FFF2-40B4-BE49-F238E27FC236}">
+                <a16:creationId xmlns:a16="http://schemas.microsoft.com/office/drawing/2014/main" id="{7A32B25D-0E85-4D6B-9E74-32CCB94CB3E1}"/>
               </a:ext>
             </a:extLst>
           </p:cNvPr>
@@ -15795,8 +15653,8 @@
         </p:nvSpPr>
         <p:spPr>
           <a:xfrm>
-            <a:off x="16294418" y="21495711"/>
-            <a:ext cx="1268385" cy="461665"/>
+            <a:off x="18750265" y="21449979"/>
+            <a:ext cx="769881" cy="338554"/>
           </a:xfrm>
           <a:prstGeom prst="rect">
             <a:avLst/>
@@ -15810,80 +15668,77 @@
           <a:lstStyle/>
           <a:p>
             <a:r>
-              <a:rPr lang="en-US" sz="400" dirty="0"/>
-              <a:t>Data </a:t>
-            </a:r>
-            <a:r>
-              <a:rPr lang="en-US" sz="400" dirty="0" err="1"/>
-              <a:t>Update_UI_UPDATE</a:t>
-            </a:r>
-            <a:r>
-              <a:rPr lang="en-US" sz="400" dirty="0"/>
-              <a:t> BRIDGE</a:t>
-            </a:r>
-          </a:p>
-          <a:p>
-            <a:r>
-              <a:rPr lang="en-US" sz="400" dirty="0"/>
-              <a:t>- Subscribes to store updates</a:t>
-            </a:r>
-          </a:p>
-          <a:p>
-            <a:r>
-              <a:rPr lang="en-US" sz="400" dirty="0"/>
-              <a:t>parses update</a:t>
-            </a:r>
-          </a:p>
-          <a:p>
-            <a:r>
-              <a:rPr lang="en-US" sz="400" dirty="0"/>
-              <a:t>- has reference to a </a:t>
-            </a:r>
-            <a:r>
-              <a:rPr lang="en-US" sz="400" dirty="0" err="1"/>
-              <a:t>sigma_handler</a:t>
-            </a:r>
-            <a:r>
-              <a:rPr lang="en-US" sz="400" dirty="0"/>
-              <a:t> and other UIS</a:t>
-            </a:r>
-          </a:p>
-          <a:p>
-            <a:r>
-              <a:rPr lang="en-US" sz="400" dirty="0"/>
-              <a:t>- calls the correct method w/ correct </a:t>
-            </a:r>
-            <a:r>
-              <a:rPr lang="en-US" sz="400" dirty="0" err="1"/>
-              <a:t>params</a:t>
-            </a:r>
-            <a:r>
-              <a:rPr lang="en-US" sz="400" dirty="0"/>
-              <a:t> on SIGMA_HANDLER + other UIs</a:t>
+              <a:rPr lang="en-US" sz="400" dirty="0" err="1"/>
+              <a:t>contentIdSigmaIdMap</a:t>
+            </a:r>
+            <a:endParaRPr lang="en-US" sz="400" dirty="0"/>
+          </a:p>
+          <a:p>
+            <a:r>
+              <a:rPr lang="en-US" sz="400" dirty="0"/>
+              <a:t>  + set(</a:t>
+            </a:r>
+            <a:r>
+              <a:rPr lang="en-US" sz="400" dirty="0" err="1"/>
+              <a:t>contentId</a:t>
+            </a:r>
+            <a:r>
+              <a:rPr lang="en-US" sz="400" dirty="0"/>
+              <a:t>, </a:t>
+            </a:r>
+            <a:r>
+              <a:rPr lang="en-US" sz="400" dirty="0" err="1"/>
+              <a:t>sigmaId</a:t>
+            </a:r>
+            <a:r>
+              <a:rPr lang="en-US" sz="400" dirty="0"/>
+              <a:t>)</a:t>
+            </a:r>
+          </a:p>
+          <a:p>
+            <a:r>
+              <a:rPr lang="en-US" sz="400" dirty="0"/>
+              <a:t>  + get(</a:t>
+            </a:r>
+            <a:r>
+              <a:rPr lang="en-US" sz="400" dirty="0" err="1"/>
+              <a:t>contentId</a:t>
+            </a:r>
+            <a:r>
+              <a:rPr lang="en-US" sz="400" dirty="0"/>
+              <a:t>) : </a:t>
+            </a:r>
+            <a:r>
+              <a:rPr lang="en-US" sz="400" dirty="0" err="1"/>
+              <a:t>sigmaIds</a:t>
+            </a:r>
+            <a:r>
+              <a:rPr lang="en-US" sz="400" dirty="0"/>
+              <a:t>[]</a:t>
             </a:r>
           </a:p>
         </p:txBody>
       </p:sp>
       <p:cxnSp>
         <p:nvCxnSpPr>
-          <p:cNvPr id="296" name="Straight Arrow Connector 295">
-            <a:extLst>
-              <a:ext uri="{FF2B5EF4-FFF2-40B4-BE49-F238E27FC236}">
-                <a16:creationId xmlns:a16="http://schemas.microsoft.com/office/drawing/2014/main" id="{EE2C6E1B-1E41-4F55-B793-2222A1D428C0}"/>
+          <p:cNvPr id="215" name="Straight Arrow Connector 214">
+            <a:extLst>
+              <a:ext uri="{FF2B5EF4-FFF2-40B4-BE49-F238E27FC236}">
+                <a16:creationId xmlns:a16="http://schemas.microsoft.com/office/drawing/2014/main" id="{F15F62B8-002A-4207-AAE6-B479E4C6748D}"/>
               </a:ext>
             </a:extLst>
           </p:cNvPr>
           <p:cNvCxnSpPr>
             <a:cxnSpLocks/>
-            <a:stCxn id="162" idx="0"/>
-            <a:endCxn id="273" idx="2"/>
+            <a:stCxn id="18" idx="0"/>
+            <a:endCxn id="21" idx="2"/>
           </p:cNvCxnSpPr>
           <p:nvPr/>
         </p:nvCxnSpPr>
         <p:spPr>
-          <a:xfrm flipH="1" flipV="1">
-            <a:off x="18079493" y="20933477"/>
-            <a:ext cx="93351" cy="623737"/>
+          <a:xfrm flipV="1">
+            <a:off x="18325716" y="21788533"/>
+            <a:ext cx="809490" cy="129625"/>
           </a:xfrm>
           <a:prstGeom prst="straightConnector1">
             <a:avLst/>
@@ -15910,33 +15765,90 @@
           </a:fontRef>
         </p:style>
       </p:cxnSp>
+      <p:sp>
+        <p:nvSpPr>
+          <p:cNvPr id="228" name="TextBox 227">
+            <a:extLst>
+              <a:ext uri="{FF2B5EF4-FFF2-40B4-BE49-F238E27FC236}">
+                <a16:creationId xmlns:a16="http://schemas.microsoft.com/office/drawing/2014/main" id="{24217846-EEBD-44AF-9B74-177AF252E5A8}"/>
+              </a:ext>
+            </a:extLst>
+          </p:cNvPr>
+          <p:cNvSpPr txBox="1"/>
+          <p:nvPr/>
+        </p:nvSpPr>
+        <p:spPr>
+          <a:xfrm>
+            <a:off x="27826544" y="24341328"/>
+            <a:ext cx="1621912" cy="923330"/>
+          </a:xfrm>
+          <a:prstGeom prst="rect">
+            <a:avLst/>
+          </a:prstGeom>
+          <a:noFill/>
+        </p:spPr>
+        <p:txBody>
+          <a:bodyPr wrap="square" rtlCol="0">
+            <a:spAutoFit/>
+          </a:bodyPr>
+          <a:lstStyle/>
+          <a:p>
+            <a:r>
+              <a:rPr lang="en-US" dirty="0"/>
+              <a:t>User</a:t>
+            </a:r>
+          </a:p>
+          <a:p>
+            <a:pPr marL="285750" indent="-285750">
+              <a:buFont typeface="Arial" panose="020B0604020202020204" pitchFamily="34" charset="0"/>
+              <a:buChar char="•"/>
+            </a:pPr>
+            <a:r>
+              <a:rPr lang="en-US" dirty="0"/>
+              <a:t>+</a:t>
+            </a:r>
+            <a:r>
+              <a:rPr lang="en-US" dirty="0" err="1"/>
+              <a:t>setCamera</a:t>
+            </a:r>
+            <a:endParaRPr lang="en-US" dirty="0"/>
+          </a:p>
+          <a:p>
+            <a:pPr marL="285750" indent="-285750">
+              <a:buFont typeface="Arial" panose="020B0604020202020204" pitchFamily="34" charset="0"/>
+              <a:buChar char="•"/>
+            </a:pPr>
+            <a:endParaRPr lang="en-US" dirty="0"/>
+          </a:p>
+        </p:txBody>
+      </p:sp>
       <p:cxnSp>
         <p:nvCxnSpPr>
-          <p:cNvPr id="322" name="Straight Arrow Connector 321">
-            <a:extLst>
-              <a:ext uri="{FF2B5EF4-FFF2-40B4-BE49-F238E27FC236}">
-                <a16:creationId xmlns:a16="http://schemas.microsoft.com/office/drawing/2014/main" id="{C1D0D427-7CCF-4F61-9497-D7511491D7B0}"/>
+          <p:cNvPr id="216" name="Straight Arrow Connector 215">
+            <a:extLst>
+              <a:ext uri="{FF2B5EF4-FFF2-40B4-BE49-F238E27FC236}">
+                <a16:creationId xmlns:a16="http://schemas.microsoft.com/office/drawing/2014/main" id="{1668B7EE-5650-466F-8F75-B12FB1607703}"/>
               </a:ext>
             </a:extLst>
           </p:cNvPr>
           <p:cNvCxnSpPr>
             <a:cxnSpLocks/>
-            <a:stCxn id="18" idx="0"/>
-            <a:endCxn id="27" idx="2"/>
+            <a:stCxn id="65" idx="3"/>
+            <a:endCxn id="228" idx="1"/>
           </p:cNvCxnSpPr>
           <p:nvPr/>
         </p:nvCxnSpPr>
         <p:spPr>
-          <a:xfrm flipH="1" flipV="1">
-            <a:off x="16709140" y="20204204"/>
-            <a:ext cx="1467281" cy="1718545"/>
+          <a:xfrm>
+            <a:off x="18229506" y="17330914"/>
+            <a:ext cx="9597038" cy="7472079"/>
           </a:xfrm>
           <a:prstGeom prst="straightConnector1">
             <a:avLst/>
           </a:prstGeom>
           <a:ln>
             <a:solidFill>
-              <a:srgbClr val="00B0F0"/>
+              <a:srgbClr val="FFC000"/>
             </a:solidFill>
             <a:tailEnd type="triangle"/>
           </a:ln>
@@ -15956,106 +15868,135 @@
           </a:fontRef>
         </p:style>
       </p:cxnSp>
-      <p:sp>
-        <p:nvSpPr>
-          <p:cNvPr id="21" name="TextBox 20">
-            <a:extLst>
-              <a:ext uri="{FF2B5EF4-FFF2-40B4-BE49-F238E27FC236}">
-                <a16:creationId xmlns:a16="http://schemas.microsoft.com/office/drawing/2014/main" id="{7A32B25D-0E85-4D6B-9E74-32CCB94CB3E1}"/>
-              </a:ext>
-            </a:extLst>
-          </p:cNvPr>
-          <p:cNvSpPr txBox="1"/>
-          <p:nvPr/>
-        </p:nvSpPr>
-        <p:spPr>
+      <p:grpSp>
+        <p:nvGrpSpPr>
+          <p:cNvPr id="230" name="Group 229">
+            <a:extLst>
+              <a:ext uri="{FF2B5EF4-FFF2-40B4-BE49-F238E27FC236}">
+                <a16:creationId xmlns:a16="http://schemas.microsoft.com/office/drawing/2014/main" id="{E86621C2-A0CF-40F5-8960-59EA0C447176}"/>
+              </a:ext>
+            </a:extLst>
+          </p:cNvPr>
+          <p:cNvGrpSpPr/>
+          <p:nvPr/>
+        </p:nvGrpSpPr>
+        <p:grpSpPr>
           <a:xfrm>
-            <a:off x="18750265" y="21449979"/>
-            <a:ext cx="769881" cy="338554"/>
-          </a:xfrm>
-          <a:prstGeom prst="rect">
-            <a:avLst/>
-          </a:prstGeom>
-          <a:noFill/>
-        </p:spPr>
-        <p:txBody>
-          <a:bodyPr wrap="square" rtlCol="0">
-            <a:spAutoFit/>
-          </a:bodyPr>
-          <a:lstStyle/>
-          <a:p>
-            <a:r>
-              <a:rPr lang="en-US" sz="400" dirty="0" err="1"/>
-              <a:t>contentIdSigmaIdMap</a:t>
-            </a:r>
-            <a:endParaRPr lang="en-US" sz="400" dirty="0"/>
-          </a:p>
-          <a:p>
-            <a:r>
-              <a:rPr lang="en-US" sz="400" dirty="0"/>
-              <a:t>  + set(</a:t>
-            </a:r>
-            <a:r>
-              <a:rPr lang="en-US" sz="400" dirty="0" err="1"/>
-              <a:t>contentId</a:t>
-            </a:r>
-            <a:r>
-              <a:rPr lang="en-US" sz="400" dirty="0"/>
-              <a:t>, </a:t>
-            </a:r>
-            <a:r>
-              <a:rPr lang="en-US" sz="400" dirty="0" err="1"/>
-              <a:t>sigmaId</a:t>
-            </a:r>
-            <a:r>
-              <a:rPr lang="en-US" sz="400" dirty="0"/>
-              <a:t>)</a:t>
-            </a:r>
-          </a:p>
-          <a:p>
-            <a:r>
-              <a:rPr lang="en-US" sz="400" dirty="0"/>
-              <a:t>  + get(</a:t>
-            </a:r>
-            <a:r>
-              <a:rPr lang="en-US" sz="400" dirty="0" err="1"/>
-              <a:t>contentId</a:t>
-            </a:r>
-            <a:r>
-              <a:rPr lang="en-US" sz="400" dirty="0"/>
-              <a:t>) : </a:t>
-            </a:r>
-            <a:r>
-              <a:rPr lang="en-US" sz="400" dirty="0" err="1"/>
-              <a:t>sigmaIds</a:t>
-            </a:r>
-            <a:r>
-              <a:rPr lang="en-US" sz="400" dirty="0"/>
-              <a:t>[]</a:t>
-            </a:r>
-          </a:p>
-        </p:txBody>
-      </p:sp>
+            <a:off x="15871240" y="22173336"/>
+            <a:ext cx="1029976" cy="153888"/>
+            <a:chOff x="16810510" y="22465788"/>
+            <a:chExt cx="1029976" cy="153888"/>
+          </a:xfrm>
+        </p:grpSpPr>
+        <p:sp>
+          <p:nvSpPr>
+            <p:cNvPr id="226" name="TextBox 225">
+              <a:extLst>
+                <a:ext uri="{FF2B5EF4-FFF2-40B4-BE49-F238E27FC236}">
+                  <a16:creationId xmlns:a16="http://schemas.microsoft.com/office/drawing/2014/main" id="{191142CE-7490-42C5-A617-F864F4DD8E2D}"/>
+                </a:ext>
+              </a:extLst>
+            </p:cNvPr>
+            <p:cNvSpPr txBox="1"/>
+            <p:nvPr/>
+          </p:nvSpPr>
+          <p:spPr>
+            <a:xfrm>
+              <a:off x="16810510" y="22465788"/>
+              <a:ext cx="870723" cy="153888"/>
+            </a:xfrm>
+            <a:prstGeom prst="rect">
+              <a:avLst/>
+            </a:prstGeom>
+            <a:noFill/>
+            <a:ln>
+              <a:solidFill>
+                <a:schemeClr val="tx1"/>
+              </a:solidFill>
+            </a:ln>
+          </p:spPr>
+          <p:txBody>
+            <a:bodyPr wrap="square" rtlCol="0">
+              <a:spAutoFit/>
+            </a:bodyPr>
+            <a:lstStyle/>
+            <a:p>
+              <a:r>
+                <a:rPr lang="en-US" sz="400" dirty="0" err="1"/>
+                <a:t>StoreSourceUpdateListener</a:t>
+              </a:r>
+              <a:endParaRPr lang="en-US" sz="400" dirty="0"/>
+            </a:p>
+          </p:txBody>
+        </p:sp>
+        <p:sp>
+          <p:nvSpPr>
+            <p:cNvPr id="229" name="Diamond 228">
+              <a:extLst>
+                <a:ext uri="{FF2B5EF4-FFF2-40B4-BE49-F238E27FC236}">
+                  <a16:creationId xmlns:a16="http://schemas.microsoft.com/office/drawing/2014/main" id="{47BFE4FD-F7A7-4899-B38B-3A5357296338}"/>
+                </a:ext>
+              </a:extLst>
+            </p:cNvPr>
+            <p:cNvSpPr/>
+            <p:nvPr/>
+          </p:nvSpPr>
+          <p:spPr>
+            <a:xfrm>
+              <a:off x="17681233" y="22507524"/>
+              <a:ext cx="159253" cy="96254"/>
+            </a:xfrm>
+            <a:prstGeom prst="diamond">
+              <a:avLst/>
+            </a:prstGeom>
+            <a:noFill/>
+          </p:spPr>
+          <p:style>
+            <a:lnRef idx="2">
+              <a:schemeClr val="accent1">
+                <a:shade val="50000"/>
+              </a:schemeClr>
+            </a:lnRef>
+            <a:fillRef idx="1">
+              <a:schemeClr val="accent1"/>
+            </a:fillRef>
+            <a:effectRef idx="0">
+              <a:schemeClr val="accent1"/>
+            </a:effectRef>
+            <a:fontRef idx="minor">
+              <a:schemeClr val="lt1"/>
+            </a:fontRef>
+          </p:style>
+          <p:txBody>
+            <a:bodyPr rtlCol="0" anchor="ctr"/>
+            <a:lstStyle/>
+            <a:p>
+              <a:pPr algn="ctr"/>
+              <a:endParaRPr lang="en-US"/>
+            </a:p>
+          </p:txBody>
+        </p:sp>
+      </p:grpSp>
       <p:cxnSp>
         <p:nvCxnSpPr>
-          <p:cNvPr id="215" name="Straight Arrow Connector 214">
-            <a:extLst>
-              <a:ext uri="{FF2B5EF4-FFF2-40B4-BE49-F238E27FC236}">
-                <a16:creationId xmlns:a16="http://schemas.microsoft.com/office/drawing/2014/main" id="{F15F62B8-002A-4207-AAE6-B479E4C6748D}"/>
+          <p:cNvPr id="256" name="Straight Arrow Connector 255">
+            <a:extLst>
+              <a:ext uri="{FF2B5EF4-FFF2-40B4-BE49-F238E27FC236}">
+                <a16:creationId xmlns:a16="http://schemas.microsoft.com/office/drawing/2014/main" id="{AAF84341-D0AD-422D-83E1-E92F1FF34D37}"/>
               </a:ext>
             </a:extLst>
           </p:cNvPr>
           <p:cNvCxnSpPr>
             <a:cxnSpLocks/>
-            <a:stCxn id="18" idx="0"/>
-            <a:endCxn id="21" idx="2"/>
+            <a:stCxn id="229" idx="3"/>
+            <a:endCxn id="18" idx="1"/>
           </p:cNvCxnSpPr>
           <p:nvPr/>
         </p:nvCxnSpPr>
         <p:spPr>
           <a:xfrm flipV="1">
-            <a:off x="18176421" y="21788533"/>
-            <a:ext cx="958785" cy="134216"/>
+            <a:off x="16901216" y="22087435"/>
+            <a:ext cx="886519" cy="175764"/>
           </a:xfrm>
           <a:prstGeom prst="straightConnector1">
             <a:avLst/>
@@ -16082,12 +16023,221 @@
           </a:fontRef>
         </p:style>
       </p:cxnSp>
+      <p:grpSp>
+        <p:nvGrpSpPr>
+          <p:cNvPr id="269" name="Group 268">
+            <a:extLst>
+              <a:ext uri="{FF2B5EF4-FFF2-40B4-BE49-F238E27FC236}">
+                <a16:creationId xmlns:a16="http://schemas.microsoft.com/office/drawing/2014/main" id="{951F95A8-1AA0-4E64-BABE-881E7CA4F171}"/>
+              </a:ext>
+            </a:extLst>
+          </p:cNvPr>
+          <p:cNvGrpSpPr/>
+          <p:nvPr/>
+        </p:nvGrpSpPr>
+        <p:grpSpPr>
+          <a:xfrm>
+            <a:off x="19506927" y="18999553"/>
+            <a:ext cx="1355145" cy="646331"/>
+            <a:chOff x="19506927" y="18999553"/>
+            <a:chExt cx="1355145" cy="646331"/>
+          </a:xfrm>
+        </p:grpSpPr>
+        <p:sp>
+          <p:nvSpPr>
+            <p:cNvPr id="274" name="TextBox 273">
+              <a:extLst>
+                <a:ext uri="{FF2B5EF4-FFF2-40B4-BE49-F238E27FC236}">
+                  <a16:creationId xmlns:a16="http://schemas.microsoft.com/office/drawing/2014/main" id="{AC73E328-E5E1-4F8F-ABDB-E94D6DE9980F}"/>
+                </a:ext>
+              </a:extLst>
+            </p:cNvPr>
+            <p:cNvSpPr txBox="1"/>
+            <p:nvPr/>
+          </p:nvSpPr>
+          <p:spPr>
+            <a:xfrm>
+              <a:off x="19506927" y="18999553"/>
+              <a:ext cx="1134636" cy="646331"/>
+            </a:xfrm>
+            <a:prstGeom prst="rect">
+              <a:avLst/>
+            </a:prstGeom>
+            <a:noFill/>
+          </p:spPr>
+          <p:txBody>
+            <a:bodyPr wrap="square" rtlCol="0">
+              <a:spAutoFit/>
+            </a:bodyPr>
+            <a:lstStyle/>
+            <a:p>
+              <a:r>
+                <a:rPr lang="en-US" sz="400" dirty="0" err="1"/>
+                <a:t>SigmaEventListener</a:t>
+              </a:r>
+              <a:endParaRPr lang="en-US" sz="400" dirty="0"/>
+            </a:p>
+            <a:p>
+              <a:r>
+                <a:rPr lang="en-US" sz="400" dirty="0"/>
+                <a:t>-listens to sigma Events and converts them to 1) store mutations, 2) open </a:t>
+              </a:r>
+              <a:r>
+                <a:rPr lang="en-US" sz="400" dirty="0" err="1"/>
+                <a:t>Vue</a:t>
+              </a:r>
+              <a:r>
+                <a:rPr lang="en-US" sz="400" dirty="0"/>
+                <a:t> templates or 3) UI mutations (such as </a:t>
+              </a:r>
+              <a:r>
+                <a:rPr lang="en-US" sz="400" dirty="0" err="1"/>
+                <a:t>saveHistory</a:t>
+              </a:r>
+              <a:r>
+                <a:rPr lang="en-US" sz="400" dirty="0"/>
+                <a:t>)</a:t>
+              </a:r>
+            </a:p>
+            <a:p>
+              <a:r>
+                <a:rPr lang="en-US" sz="400" dirty="0"/>
+                <a:t>-reference to store, and reference to </a:t>
+              </a:r>
+              <a:r>
+                <a:rPr lang="en-US" sz="400" dirty="0" err="1"/>
+                <a:t>sigmaInstance</a:t>
+              </a:r>
+              <a:endParaRPr lang="en-US" sz="400" dirty="0"/>
+            </a:p>
+            <a:p>
+              <a:endParaRPr lang="en-US" sz="400" dirty="0"/>
+            </a:p>
+            <a:p>
+              <a:r>
+                <a:rPr lang="en-US" sz="400" dirty="0" err="1"/>
+                <a:t>SIGMA_INSTANCE.on</a:t>
+              </a:r>
+              <a:r>
+                <a:rPr lang="en-US" sz="400" dirty="0"/>
+                <a:t>(</a:t>
+              </a:r>
+              <a:r>
+                <a:rPr lang="en-US" sz="400" dirty="0" err="1"/>
+                <a:t>SIGMA_EVENTS.tree_location_move</a:t>
+              </a:r>
+              <a:r>
+                <a:rPr lang="en-US" sz="400" dirty="0"/>
+                <a:t>, ….)</a:t>
+              </a:r>
+            </a:p>
+          </p:txBody>
+        </p:sp>
+        <p:sp>
+          <p:nvSpPr>
+            <p:cNvPr id="268" name="Diamond 267">
+              <a:extLst>
+                <a:ext uri="{FF2B5EF4-FFF2-40B4-BE49-F238E27FC236}">
+                  <a16:creationId xmlns:a16="http://schemas.microsoft.com/office/drawing/2014/main" id="{B70091B7-40BF-433D-8E86-0946334BE310}"/>
+                </a:ext>
+              </a:extLst>
+            </p:cNvPr>
+            <p:cNvSpPr/>
+            <p:nvPr/>
+          </p:nvSpPr>
+          <p:spPr>
+            <a:xfrm>
+              <a:off x="20559835" y="19212244"/>
+              <a:ext cx="302237" cy="195397"/>
+            </a:xfrm>
+            <a:prstGeom prst="diamond">
+              <a:avLst/>
+            </a:prstGeom>
+            <a:noFill/>
+            <a:ln>
+              <a:solidFill>
+                <a:srgbClr val="FFC000"/>
+              </a:solidFill>
+            </a:ln>
+          </p:spPr>
+          <p:style>
+            <a:lnRef idx="2">
+              <a:schemeClr val="accent1">
+                <a:shade val="50000"/>
+              </a:schemeClr>
+            </a:lnRef>
+            <a:fillRef idx="1">
+              <a:schemeClr val="accent1"/>
+            </a:fillRef>
+            <a:effectRef idx="0">
+              <a:schemeClr val="accent1"/>
+            </a:effectRef>
+            <a:fontRef idx="minor">
+              <a:schemeClr val="lt1"/>
+            </a:fontRef>
+          </p:style>
+          <p:txBody>
+            <a:bodyPr rtlCol="0" anchor="ctr"/>
+            <a:lstStyle/>
+            <a:p>
+              <a:pPr algn="ctr"/>
+              <a:endParaRPr lang="en-US"/>
+            </a:p>
+          </p:txBody>
+        </p:sp>
+      </p:grpSp>
+      <p:cxnSp>
+        <p:nvCxnSpPr>
+          <p:cNvPr id="272" name="Straight Arrow Connector 271">
+            <a:extLst>
+              <a:ext uri="{FF2B5EF4-FFF2-40B4-BE49-F238E27FC236}">
+                <a16:creationId xmlns:a16="http://schemas.microsoft.com/office/drawing/2014/main" id="{2C7E4960-497D-4042-9774-F4B5DE9336FF}"/>
+              </a:ext>
+            </a:extLst>
+          </p:cNvPr>
+          <p:cNvCxnSpPr>
+            <a:cxnSpLocks/>
+            <a:stCxn id="268" idx="3"/>
+            <a:endCxn id="266" idx="1"/>
+          </p:cNvCxnSpPr>
+          <p:nvPr/>
+        </p:nvCxnSpPr>
+        <p:spPr>
+          <a:xfrm>
+            <a:off x="20862072" y="19309943"/>
+            <a:ext cx="204741" cy="70073"/>
+          </a:xfrm>
+          <a:prstGeom prst="straightConnector1">
+            <a:avLst/>
+          </a:prstGeom>
+          <a:ln>
+            <a:solidFill>
+              <a:srgbClr val="FFC000"/>
+            </a:solidFill>
+            <a:tailEnd type="triangle"/>
+          </a:ln>
+        </p:spPr>
+        <p:style>
+          <a:lnRef idx="1">
+            <a:schemeClr val="accent1"/>
+          </a:lnRef>
+          <a:fillRef idx="0">
+            <a:schemeClr val="accent1"/>
+          </a:fillRef>
+          <a:effectRef idx="0">
+            <a:schemeClr val="accent1"/>
+          </a:effectRef>
+          <a:fontRef idx="minor">
+            <a:schemeClr val="tx1"/>
+          </a:fontRef>
+        </p:style>
+      </p:cxnSp>
       <p:sp>
         <p:nvSpPr>
-          <p:cNvPr id="228" name="TextBox 227">
-            <a:extLst>
-              <a:ext uri="{FF2B5EF4-FFF2-40B4-BE49-F238E27FC236}">
-                <a16:creationId xmlns:a16="http://schemas.microsoft.com/office/drawing/2014/main" id="{24217846-EEBD-44AF-9B74-177AF252E5A8}"/>
+          <p:cNvPr id="278" name="TextBox 277">
+            <a:extLst>
+              <a:ext uri="{FF2B5EF4-FFF2-40B4-BE49-F238E27FC236}">
+                <a16:creationId xmlns:a16="http://schemas.microsoft.com/office/drawing/2014/main" id="{EBB85A28-7046-454A-98BA-7A5039E4457B}"/>
               </a:ext>
             </a:extLst>
           </p:cNvPr>
@@ -16096,8 +16246,8 @@
         </p:nvSpPr>
         <p:spPr>
           <a:xfrm>
-            <a:off x="27826544" y="24341328"/>
-            <a:ext cx="886519" cy="369332"/>
+            <a:off x="21789015" y="20940463"/>
+            <a:ext cx="1188283" cy="430887"/>
           </a:xfrm>
           <a:prstGeom prst="rect">
             <a:avLst/>
@@ -16111,8 +16261,546 @@
           <a:lstStyle/>
           <a:p>
             <a:r>
-              <a:rPr lang="en-US" dirty="0"/>
-              <a:t>user</a:t>
+              <a:rPr lang="en-US" sz="1000" dirty="0"/>
+              <a:t>BRANCHES_STORE</a:t>
+            </a:r>
+          </a:p>
+          <a:p>
+            <a:r>
+              <a:rPr lang="en-US" sz="400" dirty="0"/>
+              <a:t>+MOVE_TREE</a:t>
+            </a:r>
+          </a:p>
+          <a:p>
+            <a:r>
+              <a:rPr lang="en-US" sz="400" dirty="0"/>
+              <a:t>+ADD_CONTENT_INTERACTION</a:t>
+            </a:r>
+          </a:p>
+          <a:p>
+            <a:r>
+              <a:rPr lang="en-US" sz="400" dirty="0"/>
+              <a:t>+CHANGE_USER_ID</a:t>
+            </a:r>
+          </a:p>
+        </p:txBody>
+      </p:sp>
+      <p:cxnSp>
+        <p:nvCxnSpPr>
+          <p:cNvPr id="285" name="Straight Arrow Connector 284">
+            <a:extLst>
+              <a:ext uri="{FF2B5EF4-FFF2-40B4-BE49-F238E27FC236}">
+                <a16:creationId xmlns:a16="http://schemas.microsoft.com/office/drawing/2014/main" id="{9E087EEA-A284-4155-9D2C-1339B5882C71}"/>
+              </a:ext>
+            </a:extLst>
+          </p:cNvPr>
+          <p:cNvCxnSpPr>
+            <a:cxnSpLocks/>
+            <a:stCxn id="278" idx="2"/>
+          </p:cNvCxnSpPr>
+          <p:nvPr/>
+        </p:nvCxnSpPr>
+        <p:spPr>
+          <a:xfrm>
+            <a:off x="22383157" y="21371350"/>
+            <a:ext cx="716722" cy="1248257"/>
+          </a:xfrm>
+          <a:prstGeom prst="straightConnector1">
+            <a:avLst/>
+          </a:prstGeom>
+          <a:ln w="76200">
+            <a:solidFill>
+              <a:schemeClr val="accent4"/>
+            </a:solidFill>
+            <a:tailEnd type="triangle"/>
+          </a:ln>
+        </p:spPr>
+        <p:style>
+          <a:lnRef idx="1">
+            <a:schemeClr val="accent1"/>
+          </a:lnRef>
+          <a:fillRef idx="0">
+            <a:schemeClr val="accent1"/>
+          </a:fillRef>
+          <a:effectRef idx="0">
+            <a:schemeClr val="accent1"/>
+          </a:effectRef>
+          <a:fontRef idx="minor">
+            <a:schemeClr val="tx1"/>
+          </a:fontRef>
+        </p:style>
+      </p:cxnSp>
+      <p:sp>
+        <p:nvSpPr>
+          <p:cNvPr id="288" name="TextBox 287">
+            <a:extLst>
+              <a:ext uri="{FF2B5EF4-FFF2-40B4-BE49-F238E27FC236}">
+                <a16:creationId xmlns:a16="http://schemas.microsoft.com/office/drawing/2014/main" id="{86B45A23-3ED5-4F2F-9635-F023DB59192A}"/>
+              </a:ext>
+            </a:extLst>
+          </p:cNvPr>
+          <p:cNvSpPr txBox="1"/>
+          <p:nvPr/>
+        </p:nvSpPr>
+        <p:spPr>
+          <a:xfrm>
+            <a:off x="22921144" y="20658718"/>
+            <a:ext cx="804552" cy="276999"/>
+          </a:xfrm>
+          <a:prstGeom prst="rect">
+            <a:avLst/>
+          </a:prstGeom>
+          <a:solidFill>
+            <a:srgbClr val="F0DADA"/>
+          </a:solidFill>
+        </p:spPr>
+        <p:txBody>
+          <a:bodyPr wrap="square" rtlCol="0">
+            <a:spAutoFit/>
+          </a:bodyPr>
+          <a:lstStyle/>
+          <a:p>
+            <a:r>
+              <a:rPr lang="en-US" sz="400" dirty="0" err="1"/>
+              <a:t>branchesStore.commit</a:t>
+            </a:r>
+            <a:r>
+              <a:rPr lang="en-US" sz="400" dirty="0"/>
+              <a:t>(MUTATION_NAMES.MOVE_TREE, {</a:t>
+            </a:r>
+            <a:r>
+              <a:rPr lang="en-US" sz="400" dirty="0" err="1"/>
+              <a:t>treeId</a:t>
+            </a:r>
+            <a:r>
+              <a:rPr lang="en-US" sz="400" dirty="0"/>
+              <a:t>, </a:t>
+            </a:r>
+            <a:r>
+              <a:rPr lang="en-US" sz="400" dirty="0" err="1"/>
+              <a:t>newX</a:t>
+            </a:r>
+            <a:r>
+              <a:rPr lang="en-US" sz="400" dirty="0"/>
+              <a:t>, </a:t>
+            </a:r>
+            <a:r>
+              <a:rPr lang="en-US" sz="400" dirty="0" err="1"/>
+              <a:t>newY</a:t>
+            </a:r>
+            <a:r>
+              <a:rPr lang="en-US" sz="400" dirty="0"/>
+              <a:t>})</a:t>
+            </a:r>
+          </a:p>
+        </p:txBody>
+      </p:sp>
+      <p:grpSp>
+        <p:nvGrpSpPr>
+          <p:cNvPr id="76" name="Group 75">
+            <a:extLst>
+              <a:ext uri="{FF2B5EF4-FFF2-40B4-BE49-F238E27FC236}">
+                <a16:creationId xmlns:a16="http://schemas.microsoft.com/office/drawing/2014/main" id="{D5889233-439A-433F-88B5-CB8162C7392A}"/>
+              </a:ext>
+            </a:extLst>
+          </p:cNvPr>
+          <p:cNvGrpSpPr/>
+          <p:nvPr/>
+        </p:nvGrpSpPr>
+        <p:grpSpPr>
+          <a:xfrm>
+            <a:off x="21066813" y="19240406"/>
+            <a:ext cx="549471" cy="278109"/>
+            <a:chOff x="21066813" y="19240406"/>
+            <a:chExt cx="549471" cy="278109"/>
+          </a:xfrm>
+        </p:grpSpPr>
+        <p:sp>
+          <p:nvSpPr>
+            <p:cNvPr id="266" name="TextBox 265">
+              <a:extLst>
+                <a:ext uri="{FF2B5EF4-FFF2-40B4-BE49-F238E27FC236}">
+                  <a16:creationId xmlns:a16="http://schemas.microsoft.com/office/drawing/2014/main" id="{3D058477-CD89-483C-ABC8-43E0F42D0AD1}"/>
+                </a:ext>
+              </a:extLst>
+            </p:cNvPr>
+            <p:cNvSpPr txBox="1"/>
+            <p:nvPr/>
+          </p:nvSpPr>
+          <p:spPr>
+            <a:xfrm>
+              <a:off x="21066813" y="19241516"/>
+              <a:ext cx="532985" cy="276999"/>
+            </a:xfrm>
+            <a:prstGeom prst="rect">
+              <a:avLst/>
+            </a:prstGeom>
+            <a:noFill/>
+          </p:spPr>
+          <p:txBody>
+            <a:bodyPr wrap="square" rtlCol="0">
+              <a:spAutoFit/>
+            </a:bodyPr>
+            <a:lstStyle/>
+            <a:p>
+              <a:r>
+                <a:rPr lang="en-US" sz="400" dirty="0" err="1"/>
+                <a:t>tooltipOpener</a:t>
+              </a:r>
+              <a:endParaRPr lang="en-US" sz="400" dirty="0"/>
+            </a:p>
+            <a:p>
+              <a:r>
+                <a:rPr lang="en-US" sz="400" dirty="0">
+                  <a:sym typeface="Wingdings" panose="05000000000000000000" pitchFamily="2" charset="2"/>
+                </a:rPr>
+                <a:t></a:t>
+              </a:r>
+              <a:r>
+                <a:rPr lang="en-US" sz="400" dirty="0" err="1">
+                  <a:sym typeface="Wingdings" panose="05000000000000000000" pitchFamily="2" charset="2"/>
+                </a:rPr>
+                <a:t>userId</a:t>
+              </a:r>
+              <a:r>
+                <a:rPr lang="en-US" sz="400" dirty="0">
+                  <a:sym typeface="Wingdings" panose="05000000000000000000" pitchFamily="2" charset="2"/>
+                </a:rPr>
+                <a:t> from store</a:t>
+              </a:r>
+              <a:endParaRPr lang="en-US" sz="400" dirty="0"/>
+            </a:p>
+          </p:txBody>
+        </p:sp>
+        <p:sp>
+          <p:nvSpPr>
+            <p:cNvPr id="73" name="Diamond 72">
+              <a:extLst>
+                <a:ext uri="{FF2B5EF4-FFF2-40B4-BE49-F238E27FC236}">
+                  <a16:creationId xmlns:a16="http://schemas.microsoft.com/office/drawing/2014/main" id="{2ED642BE-D843-4229-94CD-C596203E193E}"/>
+                </a:ext>
+              </a:extLst>
+            </p:cNvPr>
+            <p:cNvSpPr/>
+            <p:nvPr/>
+          </p:nvSpPr>
+          <p:spPr>
+            <a:xfrm>
+              <a:off x="21474908" y="19240406"/>
+              <a:ext cx="141376" cy="137936"/>
+            </a:xfrm>
+            <a:prstGeom prst="diamond">
+              <a:avLst/>
+            </a:prstGeom>
+            <a:noFill/>
+            <a:ln>
+              <a:solidFill>
+                <a:srgbClr val="FFC000"/>
+              </a:solidFill>
+            </a:ln>
+          </p:spPr>
+          <p:style>
+            <a:lnRef idx="2">
+              <a:schemeClr val="accent1">
+                <a:shade val="50000"/>
+              </a:schemeClr>
+            </a:lnRef>
+            <a:fillRef idx="1">
+              <a:schemeClr val="accent1"/>
+            </a:fillRef>
+            <a:effectRef idx="0">
+              <a:schemeClr val="accent1"/>
+            </a:effectRef>
+            <a:fontRef idx="minor">
+              <a:schemeClr val="lt1"/>
+            </a:fontRef>
+          </p:style>
+          <p:txBody>
+            <a:bodyPr rtlCol="0" anchor="ctr"/>
+            <a:lstStyle/>
+            <a:p>
+              <a:pPr algn="ctr"/>
+              <a:endParaRPr lang="en-US"/>
+            </a:p>
+          </p:txBody>
+        </p:sp>
+      </p:grpSp>
+      <p:cxnSp>
+        <p:nvCxnSpPr>
+          <p:cNvPr id="292" name="Straight Arrow Connector 291">
+            <a:extLst>
+              <a:ext uri="{FF2B5EF4-FFF2-40B4-BE49-F238E27FC236}">
+                <a16:creationId xmlns:a16="http://schemas.microsoft.com/office/drawing/2014/main" id="{F162B2C5-65BF-4871-A872-70A37079C286}"/>
+              </a:ext>
+            </a:extLst>
+          </p:cNvPr>
+          <p:cNvCxnSpPr>
+            <a:cxnSpLocks/>
+            <a:stCxn id="73" idx="3"/>
+            <a:endCxn id="278" idx="0"/>
+          </p:cNvCxnSpPr>
+          <p:nvPr/>
+        </p:nvCxnSpPr>
+        <p:spPr>
+          <a:xfrm>
+            <a:off x="21616284" y="19309374"/>
+            <a:ext cx="766873" cy="1631089"/>
+          </a:xfrm>
+          <a:prstGeom prst="straightConnector1">
+            <a:avLst/>
+          </a:prstGeom>
+          <a:ln>
+            <a:solidFill>
+              <a:srgbClr val="FFC000"/>
+            </a:solidFill>
+            <a:tailEnd type="triangle"/>
+          </a:ln>
+        </p:spPr>
+        <p:style>
+          <a:lnRef idx="1">
+            <a:schemeClr val="accent1"/>
+          </a:lnRef>
+          <a:fillRef idx="0">
+            <a:schemeClr val="accent1"/>
+          </a:fillRef>
+          <a:effectRef idx="0">
+            <a:schemeClr val="accent1"/>
+          </a:effectRef>
+          <a:fontRef idx="minor">
+            <a:schemeClr val="tx1"/>
+          </a:fontRef>
+        </p:style>
+      </p:cxnSp>
+      <p:grpSp>
+        <p:nvGrpSpPr>
+          <p:cNvPr id="82" name="Group 81">
+            <a:extLst>
+              <a:ext uri="{FF2B5EF4-FFF2-40B4-BE49-F238E27FC236}">
+                <a16:creationId xmlns:a16="http://schemas.microsoft.com/office/drawing/2014/main" id="{6D0C4FD9-B8DA-46B3-A005-397E71B6A2BD}"/>
+              </a:ext>
+            </a:extLst>
+          </p:cNvPr>
+          <p:cNvGrpSpPr/>
+          <p:nvPr/>
+        </p:nvGrpSpPr>
+        <p:grpSpPr>
+          <a:xfrm>
+            <a:off x="21202650" y="16889390"/>
+            <a:ext cx="1718494" cy="584775"/>
+            <a:chOff x="21202650" y="16889390"/>
+            <a:chExt cx="1718494" cy="584775"/>
+          </a:xfrm>
+        </p:grpSpPr>
+        <p:sp>
+          <p:nvSpPr>
+            <p:cNvPr id="2" name="TextBox 1">
+              <a:extLst>
+                <a:ext uri="{FF2B5EF4-FFF2-40B4-BE49-F238E27FC236}">
+                  <a16:creationId xmlns:a16="http://schemas.microsoft.com/office/drawing/2014/main" id="{2E0597A3-41BE-4D11-A315-1705EA007309}"/>
+                </a:ext>
+              </a:extLst>
+            </p:cNvPr>
+            <p:cNvSpPr txBox="1"/>
+            <p:nvPr/>
+          </p:nvSpPr>
+          <p:spPr>
+            <a:xfrm>
+              <a:off x="21305934" y="16889390"/>
+              <a:ext cx="1615210" cy="584775"/>
+            </a:xfrm>
+            <a:prstGeom prst="rect">
+              <a:avLst/>
+            </a:prstGeom>
+            <a:noFill/>
+          </p:spPr>
+          <p:txBody>
+            <a:bodyPr wrap="square" rtlCol="0">
+              <a:spAutoFit/>
+            </a:bodyPr>
+            <a:lstStyle/>
+            <a:p>
+              <a:r>
+                <a:rPr lang="en-US" sz="1200" dirty="0"/>
+                <a:t>UI/</a:t>
+              </a:r>
+              <a:r>
+                <a:rPr lang="en-US" sz="1200" dirty="0" err="1"/>
+                <a:t>Vue</a:t>
+              </a:r>
+              <a:r>
+                <a:rPr lang="en-US" sz="1200" dirty="0"/>
+                <a:t> components</a:t>
+              </a:r>
+            </a:p>
+            <a:p>
+              <a:r>
+                <a:rPr lang="en-US" sz="400" dirty="0"/>
+                <a:t>-have no knowledge of their objects</a:t>
+              </a:r>
+            </a:p>
+            <a:p>
+              <a:r>
+                <a:rPr lang="en-US" sz="400" dirty="0"/>
+                <a:t>-should not call any databases or ORMs to retrieve data</a:t>
+              </a:r>
+            </a:p>
+            <a:p>
+              <a:pPr defTabSz="114300"/>
+              <a:r>
+                <a:rPr lang="en-US" sz="400" dirty="0"/>
+                <a:t>	-should get all of its data from the JSON/ JS object from the sigma Nodes</a:t>
+              </a:r>
+            </a:p>
+            <a:p>
+              <a:r>
+                <a:rPr lang="en-US" sz="400" dirty="0"/>
+                <a:t>-only call mutations on store</a:t>
+              </a:r>
+            </a:p>
+          </p:txBody>
+        </p:sp>
+        <p:sp>
+          <p:nvSpPr>
+            <p:cNvPr id="81" name="Diamond 80">
+              <a:extLst>
+                <a:ext uri="{FF2B5EF4-FFF2-40B4-BE49-F238E27FC236}">
+                  <a16:creationId xmlns:a16="http://schemas.microsoft.com/office/drawing/2014/main" id="{DD741A2E-9E9F-4F74-9AE6-3DCA70DA033F}"/>
+                </a:ext>
+              </a:extLst>
+            </p:cNvPr>
+            <p:cNvSpPr/>
+            <p:nvPr/>
+          </p:nvSpPr>
+          <p:spPr>
+            <a:xfrm>
+              <a:off x="21202650" y="17114439"/>
+              <a:ext cx="174815" cy="169277"/>
+            </a:xfrm>
+            <a:prstGeom prst="diamond">
+              <a:avLst/>
+            </a:prstGeom>
+            <a:noFill/>
+            <a:ln>
+              <a:solidFill>
+                <a:srgbClr val="FFC000"/>
+              </a:solidFill>
+            </a:ln>
+          </p:spPr>
+          <p:style>
+            <a:lnRef idx="2">
+              <a:schemeClr val="accent1">
+                <a:shade val="50000"/>
+              </a:schemeClr>
+            </a:lnRef>
+            <a:fillRef idx="1">
+              <a:schemeClr val="accent1"/>
+            </a:fillRef>
+            <a:effectRef idx="0">
+              <a:schemeClr val="accent1"/>
+            </a:effectRef>
+            <a:fontRef idx="minor">
+              <a:schemeClr val="lt1"/>
+            </a:fontRef>
+          </p:style>
+          <p:txBody>
+            <a:bodyPr rtlCol="0" anchor="ctr"/>
+            <a:lstStyle/>
+            <a:p>
+              <a:pPr algn="ctr"/>
+              <a:endParaRPr lang="en-US"/>
+            </a:p>
+          </p:txBody>
+        </p:sp>
+      </p:grpSp>
+      <p:cxnSp>
+        <p:nvCxnSpPr>
+          <p:cNvPr id="84" name="Straight Arrow Connector 83">
+            <a:extLst>
+              <a:ext uri="{FF2B5EF4-FFF2-40B4-BE49-F238E27FC236}">
+                <a16:creationId xmlns:a16="http://schemas.microsoft.com/office/drawing/2014/main" id="{85ACF759-276B-450C-BA95-E6B730607823}"/>
+              </a:ext>
+            </a:extLst>
+          </p:cNvPr>
+          <p:cNvCxnSpPr>
+            <a:stCxn id="81" idx="1"/>
+          </p:cNvCxnSpPr>
+          <p:nvPr/>
+        </p:nvCxnSpPr>
+        <p:spPr>
+          <a:xfrm flipH="1">
+            <a:off x="20805321" y="17199078"/>
+            <a:ext cx="397329" cy="3072"/>
+          </a:xfrm>
+          <a:prstGeom prst="straightConnector1">
+            <a:avLst/>
+          </a:prstGeom>
+          <a:ln>
+            <a:solidFill>
+              <a:srgbClr val="FFC000"/>
+            </a:solidFill>
+            <a:tailEnd type="triangle"/>
+          </a:ln>
+        </p:spPr>
+        <p:style>
+          <a:lnRef idx="1">
+            <a:schemeClr val="accent1"/>
+          </a:lnRef>
+          <a:fillRef idx="0">
+            <a:schemeClr val="accent1"/>
+          </a:fillRef>
+          <a:effectRef idx="0">
+            <a:schemeClr val="accent1"/>
+          </a:effectRef>
+          <a:fontRef idx="minor">
+            <a:schemeClr val="tx1"/>
+          </a:fontRef>
+        </p:style>
+      </p:cxnSp>
+      <p:sp>
+        <p:nvSpPr>
+          <p:cNvPr id="85" name="TextBox 84">
+            <a:extLst>
+              <a:ext uri="{FF2B5EF4-FFF2-40B4-BE49-F238E27FC236}">
+                <a16:creationId xmlns:a16="http://schemas.microsoft.com/office/drawing/2014/main" id="{19F50B26-186D-4FA7-9098-D3D57DB5ECBC}"/>
+              </a:ext>
+            </a:extLst>
+          </p:cNvPr>
+          <p:cNvSpPr txBox="1"/>
+          <p:nvPr/>
+        </p:nvSpPr>
+        <p:spPr>
+          <a:xfrm>
+            <a:off x="19995776" y="17131167"/>
+            <a:ext cx="828527" cy="276999"/>
+          </a:xfrm>
+          <a:prstGeom prst="rect">
+            <a:avLst/>
+          </a:prstGeom>
+          <a:noFill/>
+        </p:spPr>
+        <p:txBody>
+          <a:bodyPr wrap="square" rtlCol="0">
+            <a:spAutoFit/>
+          </a:bodyPr>
+          <a:lstStyle/>
+          <a:p>
+            <a:r>
+              <a:rPr lang="en-US" sz="400" dirty="0"/>
+              <a:t>Tree Component</a:t>
+            </a:r>
+          </a:p>
+          <a:p>
+            <a:r>
+              <a:rPr lang="en-US" sz="400" dirty="0"/>
+              <a:t> &gt; needs </a:t>
+            </a:r>
+            <a:r>
+              <a:rPr lang="en-US" sz="400" dirty="0" err="1"/>
+              <a:t>userId</a:t>
+            </a:r>
+            <a:r>
+              <a:rPr lang="en-US" sz="400" dirty="0"/>
+              <a:t> as a prop directly</a:t>
             </a:r>
           </a:p>
         </p:txBody>

</xml_diff>

<commit_message>
Add addItem method on contentUserStore
</commit_message>
<xml_diff>
--- a/docs/architecture.pptx
+++ b/docs/architecture.pptx
@@ -6,9 +6,8 @@
   </p:sldMasterIdLst>
   <p:sldIdLst>
     <p:sldId id="256" r:id="rId2"/>
-    <p:sldId id="259" r:id="rId3"/>
-    <p:sldId id="258" r:id="rId4"/>
-    <p:sldId id="257" r:id="rId5"/>
+    <p:sldId id="258" r:id="rId3"/>
+    <p:sldId id="259" r:id="rId4"/>
   </p:sldIdLst>
   <p:sldSz cx="51206400" cy="51206400"/>
   <p:notesSz cx="6858000" cy="9144000"/>
@@ -5392,86 +5391,6 @@
           <a:chExt cx="0" cy="0"/>
         </a:xfrm>
       </p:grpSpPr>
-      <p:sp>
-        <p:nvSpPr>
-          <p:cNvPr id="2" name="Title 1">
-            <a:extLst>
-              <a:ext uri="{FF2B5EF4-FFF2-40B4-BE49-F238E27FC236}">
-                <a16:creationId xmlns:a16="http://schemas.microsoft.com/office/drawing/2014/main" id="{C3C78CE3-64B4-4FE2-A104-2D91ED6136F0}"/>
-              </a:ext>
-            </a:extLst>
-          </p:cNvPr>
-          <p:cNvSpPr>
-            <a:spLocks noGrp="1"/>
-          </p:cNvSpPr>
-          <p:nvPr>
-            <p:ph type="title"/>
-          </p:nvPr>
-        </p:nvSpPr>
-        <p:spPr/>
-        <p:txBody>
-          <a:bodyPr/>
-          <a:lstStyle/>
-          <a:p>
-            <a:endParaRPr lang="en-US"/>
-          </a:p>
-        </p:txBody>
-      </p:sp>
-      <p:sp>
-        <p:nvSpPr>
-          <p:cNvPr id="3" name="Content Placeholder 2">
-            <a:extLst>
-              <a:ext uri="{FF2B5EF4-FFF2-40B4-BE49-F238E27FC236}">
-                <a16:creationId xmlns:a16="http://schemas.microsoft.com/office/drawing/2014/main" id="{D8740FB9-1276-4E68-A390-991A10158EC7}"/>
-              </a:ext>
-            </a:extLst>
-          </p:cNvPr>
-          <p:cNvSpPr>
-            <a:spLocks noGrp="1"/>
-          </p:cNvSpPr>
-          <p:nvPr>
-            <p:ph idx="1"/>
-          </p:nvPr>
-        </p:nvSpPr>
-        <p:spPr/>
-        <p:txBody>
-          <a:bodyPr/>
-          <a:lstStyle/>
-          <a:p>
-            <a:endParaRPr lang="en-US"/>
-          </a:p>
-        </p:txBody>
-      </p:sp>
-    </p:spTree>
-    <p:extLst>
-      <p:ext uri="{BB962C8B-B14F-4D97-AF65-F5344CB8AC3E}">
-        <p14:creationId xmlns:p14="http://schemas.microsoft.com/office/powerpoint/2010/main" val="570421381"/>
-      </p:ext>
-    </p:extLst>
-  </p:cSld>
-  <p:clrMapOvr>
-    <a:masterClrMapping/>
-  </p:clrMapOvr>
-</p:sld>
-</file>
-
-<file path=ppt/slides/slide3.xml><?xml version="1.0" encoding="utf-8"?>
-<p:sld xmlns:a="http://schemas.openxmlformats.org/drawingml/2006/main" xmlns:r="http://schemas.openxmlformats.org/officeDocument/2006/relationships" xmlns:p="http://schemas.openxmlformats.org/presentationml/2006/main">
-  <p:cSld>
-    <p:spTree>
-      <p:nvGrpSpPr>
-        <p:cNvPr id="1" name=""/>
-        <p:cNvGrpSpPr/>
-        <p:nvPr/>
-      </p:nvGrpSpPr>
-      <p:grpSpPr>
-        <a:xfrm>
-          <a:off x="0" y="0"/>
-          <a:ext cx="0" cy="0"/>
-          <a:chOff x="0" y="0"/>
-          <a:chExt cx="0" cy="0"/>
-        </a:xfrm>
-      </p:grpSpPr>
       <p:cxnSp>
         <p:nvCxnSpPr>
           <p:cNvPr id="213" name="Straight Arrow Connector 212">
@@ -16818,7 +16737,7 @@
 </p:sld>
 </file>
 
-<file path=ppt/slides/slide4.xml><?xml version="1.0" encoding="utf-8"?>
+<file path=ppt/slides/slide3.xml><?xml version="1.0" encoding="utf-8"?>
 <p:sld xmlns:a="http://schemas.openxmlformats.org/drawingml/2006/main" xmlns:r="http://schemas.openxmlformats.org/officeDocument/2006/relationships" xmlns:p="http://schemas.openxmlformats.org/presentationml/2006/main">
   <p:cSld>
     <p:spTree>
@@ -16835,10 +16754,1166 @@
           <a:chExt cx="0" cy="0"/>
         </a:xfrm>
       </p:grpSpPr>
+      <p:sp>
+        <p:nvSpPr>
+          <p:cNvPr id="4" name="TextBox 3">
+            <a:extLst>
+              <a:ext uri="{FF2B5EF4-FFF2-40B4-BE49-F238E27FC236}">
+                <a16:creationId xmlns:a16="http://schemas.microsoft.com/office/drawing/2014/main" id="{ECC25D55-6800-4E83-B5A0-72EB0AC14603}"/>
+              </a:ext>
+            </a:extLst>
+          </p:cNvPr>
+          <p:cNvSpPr txBox="1"/>
+          <p:nvPr/>
+        </p:nvSpPr>
+        <p:spPr>
+          <a:xfrm>
+            <a:off x="16973550" y="21799550"/>
+            <a:ext cx="585580" cy="153888"/>
+          </a:xfrm>
+          <a:prstGeom prst="rect">
+            <a:avLst/>
+          </a:prstGeom>
+          <a:noFill/>
+          <a:ln>
+            <a:solidFill>
+              <a:schemeClr val="tx1"/>
+            </a:solidFill>
+          </a:ln>
+        </p:spPr>
+        <p:txBody>
+          <a:bodyPr wrap="square" rtlCol="0">
+            <a:spAutoFit/>
+          </a:bodyPr>
+          <a:lstStyle/>
+          <a:p>
+            <a:r>
+              <a:rPr lang="en-US" sz="400" dirty="0" err="1"/>
+              <a:t>SubscribableCore</a:t>
+            </a:r>
+            <a:endParaRPr lang="en-US" sz="400" dirty="0"/>
+          </a:p>
+        </p:txBody>
+      </p:sp>
+      <p:sp>
+        <p:nvSpPr>
+          <p:cNvPr id="5" name="TextBox 4">
+            <a:extLst>
+              <a:ext uri="{FF2B5EF4-FFF2-40B4-BE49-F238E27FC236}">
+                <a16:creationId xmlns:a16="http://schemas.microsoft.com/office/drawing/2014/main" id="{7B2387A5-494E-4836-B0A8-491E97F7ED7A}"/>
+              </a:ext>
+            </a:extLst>
+          </p:cNvPr>
+          <p:cNvSpPr txBox="1"/>
+          <p:nvPr/>
+        </p:nvSpPr>
+        <p:spPr>
+          <a:xfrm>
+            <a:off x="16973550" y="22146284"/>
+            <a:ext cx="585580" cy="153888"/>
+          </a:xfrm>
+          <a:prstGeom prst="rect">
+            <a:avLst/>
+          </a:prstGeom>
+          <a:noFill/>
+          <a:ln>
+            <a:solidFill>
+              <a:schemeClr val="tx1"/>
+            </a:solidFill>
+          </a:ln>
+        </p:spPr>
+        <p:txBody>
+          <a:bodyPr wrap="square" rtlCol="0">
+            <a:spAutoFit/>
+          </a:bodyPr>
+          <a:lstStyle/>
+          <a:p>
+            <a:r>
+              <a:rPr lang="en-US" sz="400" dirty="0" err="1"/>
+              <a:t>SubscribableStore</a:t>
+            </a:r>
+            <a:endParaRPr lang="en-US" sz="400" dirty="0"/>
+          </a:p>
+        </p:txBody>
+      </p:sp>
+      <p:cxnSp>
+        <p:nvCxnSpPr>
+          <p:cNvPr id="7" name="Straight Arrow Connector 6">
+            <a:extLst>
+              <a:ext uri="{FF2B5EF4-FFF2-40B4-BE49-F238E27FC236}">
+                <a16:creationId xmlns:a16="http://schemas.microsoft.com/office/drawing/2014/main" id="{2E6EB049-3D31-43DE-A864-C3C3BC2A1A04}"/>
+              </a:ext>
+            </a:extLst>
+          </p:cNvPr>
+          <p:cNvCxnSpPr>
+            <a:stCxn id="5" idx="0"/>
+            <a:endCxn id="4" idx="2"/>
+          </p:cNvCxnSpPr>
+          <p:nvPr/>
+        </p:nvCxnSpPr>
+        <p:spPr>
+          <a:xfrm flipV="1">
+            <a:off x="17266340" y="21953438"/>
+            <a:ext cx="0" cy="192846"/>
+          </a:xfrm>
+          <a:prstGeom prst="straightConnector1">
+            <a:avLst/>
+          </a:prstGeom>
+          <a:ln>
+            <a:solidFill>
+              <a:schemeClr val="tx1"/>
+            </a:solidFill>
+            <a:tailEnd type="triangle"/>
+          </a:ln>
+        </p:spPr>
+        <p:style>
+          <a:lnRef idx="1">
+            <a:schemeClr val="accent1"/>
+          </a:lnRef>
+          <a:fillRef idx="0">
+            <a:schemeClr val="accent1"/>
+          </a:fillRef>
+          <a:effectRef idx="0">
+            <a:schemeClr val="accent1"/>
+          </a:effectRef>
+          <a:fontRef idx="minor">
+            <a:schemeClr val="tx1"/>
+          </a:fontRef>
+        </p:style>
+      </p:cxnSp>
+      <p:cxnSp>
+        <p:nvCxnSpPr>
+          <p:cNvPr id="9" name="Straight Arrow Connector 8">
+            <a:extLst>
+              <a:ext uri="{FF2B5EF4-FFF2-40B4-BE49-F238E27FC236}">
+                <a16:creationId xmlns:a16="http://schemas.microsoft.com/office/drawing/2014/main" id="{1EF62B7B-1D7E-4961-9744-5C19A64F13C8}"/>
+              </a:ext>
+            </a:extLst>
+          </p:cNvPr>
+          <p:cNvCxnSpPr>
+            <a:cxnSpLocks/>
+            <a:stCxn id="12" idx="0"/>
+            <a:endCxn id="5" idx="2"/>
+          </p:cNvCxnSpPr>
+          <p:nvPr/>
+        </p:nvCxnSpPr>
+        <p:spPr>
+          <a:xfrm flipV="1">
+            <a:off x="17266340" y="22300172"/>
+            <a:ext cx="0" cy="181385"/>
+          </a:xfrm>
+          <a:prstGeom prst="straightConnector1">
+            <a:avLst/>
+          </a:prstGeom>
+          <a:ln>
+            <a:solidFill>
+              <a:schemeClr val="tx1"/>
+            </a:solidFill>
+            <a:tailEnd type="triangle"/>
+          </a:ln>
+        </p:spPr>
+        <p:style>
+          <a:lnRef idx="1">
+            <a:schemeClr val="accent1"/>
+          </a:lnRef>
+          <a:fillRef idx="0">
+            <a:schemeClr val="accent1"/>
+          </a:fillRef>
+          <a:effectRef idx="0">
+            <a:schemeClr val="accent1"/>
+          </a:effectRef>
+          <a:fontRef idx="minor">
+            <a:schemeClr val="tx1"/>
+          </a:fontRef>
+        </p:style>
+      </p:cxnSp>
+      <p:sp>
+        <p:nvSpPr>
+          <p:cNvPr id="12" name="TextBox 11">
+            <a:extLst>
+              <a:ext uri="{FF2B5EF4-FFF2-40B4-BE49-F238E27FC236}">
+                <a16:creationId xmlns:a16="http://schemas.microsoft.com/office/drawing/2014/main" id="{B6C381B3-FBD7-40FC-9E3A-44BE739C8719}"/>
+              </a:ext>
+            </a:extLst>
+          </p:cNvPr>
+          <p:cNvSpPr txBox="1"/>
+          <p:nvPr/>
+        </p:nvSpPr>
+        <p:spPr>
+          <a:xfrm>
+            <a:off x="16787661" y="22481557"/>
+            <a:ext cx="957357" cy="153888"/>
+          </a:xfrm>
+          <a:prstGeom prst="rect">
+            <a:avLst/>
+          </a:prstGeom>
+          <a:noFill/>
+          <a:ln>
+            <a:solidFill>
+              <a:schemeClr val="tx1"/>
+            </a:solidFill>
+          </a:ln>
+        </p:spPr>
+        <p:txBody>
+          <a:bodyPr wrap="square" rtlCol="0">
+            <a:spAutoFit/>
+          </a:bodyPr>
+          <a:lstStyle/>
+          <a:p>
+            <a:pPr algn="ctr"/>
+            <a:r>
+              <a:rPr lang="en-US" sz="400" dirty="0" err="1"/>
+              <a:t>SubscribableContentUserStore</a:t>
+            </a:r>
+            <a:endParaRPr lang="en-US" sz="400" dirty="0"/>
+          </a:p>
+        </p:txBody>
+      </p:sp>
+      <p:sp>
+        <p:nvSpPr>
+          <p:cNvPr id="13" name="TextBox 12">
+            <a:extLst>
+              <a:ext uri="{FF2B5EF4-FFF2-40B4-BE49-F238E27FC236}">
+                <a16:creationId xmlns:a16="http://schemas.microsoft.com/office/drawing/2014/main" id="{E0771606-FCA2-44DF-BD7D-6D9759811BA5}"/>
+              </a:ext>
+            </a:extLst>
+          </p:cNvPr>
+          <p:cNvSpPr txBox="1"/>
+          <p:nvPr/>
+        </p:nvSpPr>
+        <p:spPr>
+          <a:xfrm>
+            <a:off x="16643442" y="22855788"/>
+            <a:ext cx="1245793" cy="153888"/>
+          </a:xfrm>
+          <a:prstGeom prst="rect">
+            <a:avLst/>
+          </a:prstGeom>
+          <a:noFill/>
+          <a:ln>
+            <a:solidFill>
+              <a:schemeClr val="tx1"/>
+            </a:solidFill>
+          </a:ln>
+        </p:spPr>
+        <p:txBody>
+          <a:bodyPr wrap="square" rtlCol="0">
+            <a:spAutoFit/>
+          </a:bodyPr>
+          <a:lstStyle/>
+          <a:p>
+            <a:pPr algn="ctr"/>
+            <a:r>
+              <a:rPr lang="en-US" sz="400" dirty="0" err="1"/>
+              <a:t>MutableSubscribableContentUserStore</a:t>
+            </a:r>
+            <a:endParaRPr lang="en-US" sz="400" dirty="0"/>
+          </a:p>
+        </p:txBody>
+      </p:sp>
+      <p:cxnSp>
+        <p:nvCxnSpPr>
+          <p:cNvPr id="14" name="Straight Arrow Connector 13">
+            <a:extLst>
+              <a:ext uri="{FF2B5EF4-FFF2-40B4-BE49-F238E27FC236}">
+                <a16:creationId xmlns:a16="http://schemas.microsoft.com/office/drawing/2014/main" id="{0E8707D4-E940-46F1-ABE6-2869CF02C991}"/>
+              </a:ext>
+            </a:extLst>
+          </p:cNvPr>
+          <p:cNvCxnSpPr>
+            <a:cxnSpLocks/>
+            <a:stCxn id="13" idx="0"/>
+            <a:endCxn id="12" idx="2"/>
+          </p:cNvCxnSpPr>
+          <p:nvPr/>
+        </p:nvCxnSpPr>
+        <p:spPr>
+          <a:xfrm flipV="1">
+            <a:off x="17266339" y="22635445"/>
+            <a:ext cx="1" cy="220343"/>
+          </a:xfrm>
+          <a:prstGeom prst="straightConnector1">
+            <a:avLst/>
+          </a:prstGeom>
+          <a:ln>
+            <a:solidFill>
+              <a:schemeClr val="tx1"/>
+            </a:solidFill>
+            <a:tailEnd type="triangle"/>
+          </a:ln>
+        </p:spPr>
+        <p:style>
+          <a:lnRef idx="1">
+            <a:schemeClr val="accent1"/>
+          </a:lnRef>
+          <a:fillRef idx="0">
+            <a:schemeClr val="accent1"/>
+          </a:fillRef>
+          <a:effectRef idx="0">
+            <a:schemeClr val="accent1"/>
+          </a:effectRef>
+          <a:fontRef idx="minor">
+            <a:schemeClr val="tx1"/>
+          </a:fontRef>
+        </p:style>
+      </p:cxnSp>
+      <p:sp>
+        <p:nvSpPr>
+          <p:cNvPr id="26" name="TextBox 25">
+            <a:extLst>
+              <a:ext uri="{FF2B5EF4-FFF2-40B4-BE49-F238E27FC236}">
+                <a16:creationId xmlns:a16="http://schemas.microsoft.com/office/drawing/2014/main" id="{0501C58A-C641-4D30-833C-3C8B9B9B1CEA}"/>
+              </a:ext>
+            </a:extLst>
+          </p:cNvPr>
+          <p:cNvSpPr txBox="1"/>
+          <p:nvPr/>
+        </p:nvSpPr>
+        <p:spPr>
+          <a:xfrm>
+            <a:off x="18593959" y="20561664"/>
+            <a:ext cx="1053472" cy="215444"/>
+          </a:xfrm>
+          <a:prstGeom prst="rect">
+            <a:avLst/>
+          </a:prstGeom>
+          <a:noFill/>
+          <a:ln>
+            <a:solidFill>
+              <a:schemeClr val="tx1"/>
+            </a:solidFill>
+          </a:ln>
+        </p:spPr>
+        <p:txBody>
+          <a:bodyPr wrap="square" rtlCol="0">
+            <a:spAutoFit/>
+          </a:bodyPr>
+          <a:lstStyle/>
+          <a:p>
+            <a:pPr algn="ctr"/>
+            <a:r>
+              <a:rPr lang="en-US" sz="400" dirty="0"/>
+              <a:t>&lt;&lt;interface&gt;&gt;</a:t>
+            </a:r>
+          </a:p>
+          <a:p>
+            <a:pPr algn="ctr"/>
+            <a:r>
+              <a:rPr lang="en-US" sz="400" dirty="0" err="1"/>
+              <a:t>Isubscribable</a:t>
+            </a:r>
+            <a:r>
+              <a:rPr lang="en-US" sz="400" dirty="0"/>
+              <a:t>&lt;</a:t>
+            </a:r>
+            <a:r>
+              <a:rPr lang="en-US" sz="400" dirty="0" err="1"/>
+              <a:t>UpdatesType</a:t>
+            </a:r>
+            <a:r>
+              <a:rPr lang="en-US" sz="400" dirty="0"/>
+              <a:t>&gt;</a:t>
+            </a:r>
+          </a:p>
+        </p:txBody>
+      </p:sp>
+      <p:sp>
+        <p:nvSpPr>
+          <p:cNvPr id="27" name="TextBox 26">
+            <a:extLst>
+              <a:ext uri="{FF2B5EF4-FFF2-40B4-BE49-F238E27FC236}">
+                <a16:creationId xmlns:a16="http://schemas.microsoft.com/office/drawing/2014/main" id="{BF58E4EE-DF21-4408-B3A7-F3B20B5AACA4}"/>
+              </a:ext>
+            </a:extLst>
+          </p:cNvPr>
+          <p:cNvSpPr txBox="1"/>
+          <p:nvPr/>
+        </p:nvSpPr>
+        <p:spPr>
+          <a:xfrm>
+            <a:off x="18564441" y="21460186"/>
+            <a:ext cx="951218" cy="215444"/>
+          </a:xfrm>
+          <a:prstGeom prst="rect">
+            <a:avLst/>
+          </a:prstGeom>
+          <a:noFill/>
+          <a:ln>
+            <a:solidFill>
+              <a:schemeClr val="tx1"/>
+            </a:solidFill>
+          </a:ln>
+        </p:spPr>
+        <p:txBody>
+          <a:bodyPr wrap="square" rtlCol="0">
+            <a:spAutoFit/>
+          </a:bodyPr>
+          <a:lstStyle/>
+          <a:p>
+            <a:pPr algn="ctr"/>
+            <a:r>
+              <a:rPr lang="en-US" sz="400" dirty="0"/>
+              <a:t>&lt;&lt;interface&gt;&gt;</a:t>
+            </a:r>
+          </a:p>
+          <a:p>
+            <a:pPr algn="ctr"/>
+            <a:r>
+              <a:rPr lang="en-US" sz="400" dirty="0" err="1"/>
+              <a:t>ISubscribableStore</a:t>
+            </a:r>
+            <a:endParaRPr lang="en-US" sz="400" dirty="0"/>
+          </a:p>
+        </p:txBody>
+      </p:sp>
+      <p:sp>
+        <p:nvSpPr>
+          <p:cNvPr id="28" name="TextBox 27">
+            <a:extLst>
+              <a:ext uri="{FF2B5EF4-FFF2-40B4-BE49-F238E27FC236}">
+                <a16:creationId xmlns:a16="http://schemas.microsoft.com/office/drawing/2014/main" id="{4514A2E6-ABAA-43AB-9D96-8C030701D7BB}"/>
+              </a:ext>
+            </a:extLst>
+          </p:cNvPr>
+          <p:cNvSpPr txBox="1"/>
+          <p:nvPr/>
+        </p:nvSpPr>
+        <p:spPr>
+          <a:xfrm>
+            <a:off x="19968205" y="20557691"/>
+            <a:ext cx="951218" cy="215444"/>
+          </a:xfrm>
+          <a:prstGeom prst="rect">
+            <a:avLst/>
+          </a:prstGeom>
+          <a:noFill/>
+          <a:ln>
+            <a:solidFill>
+              <a:schemeClr val="tx1"/>
+            </a:solidFill>
+          </a:ln>
+        </p:spPr>
+        <p:txBody>
+          <a:bodyPr wrap="square" rtlCol="0">
+            <a:spAutoFit/>
+          </a:bodyPr>
+          <a:lstStyle/>
+          <a:p>
+            <a:pPr algn="ctr"/>
+            <a:r>
+              <a:rPr lang="en-US" sz="400" dirty="0"/>
+              <a:t>&lt;&lt;interface&gt;&gt;</a:t>
+            </a:r>
+          </a:p>
+          <a:p>
+            <a:pPr algn="ctr"/>
+            <a:r>
+              <a:rPr lang="en-US" sz="400" dirty="0" err="1"/>
+              <a:t>ICoreSubscribableStore</a:t>
+            </a:r>
+            <a:endParaRPr lang="en-US" sz="400" dirty="0"/>
+          </a:p>
+        </p:txBody>
+      </p:sp>
+      <p:sp>
+        <p:nvSpPr>
+          <p:cNvPr id="29" name="TextBox 28">
+            <a:extLst>
+              <a:ext uri="{FF2B5EF4-FFF2-40B4-BE49-F238E27FC236}">
+                <a16:creationId xmlns:a16="http://schemas.microsoft.com/office/drawing/2014/main" id="{E11770A4-7168-4A89-95D7-C1A65F65F8AE}"/>
+              </a:ext>
+            </a:extLst>
+          </p:cNvPr>
+          <p:cNvSpPr txBox="1"/>
+          <p:nvPr/>
+        </p:nvSpPr>
+        <p:spPr>
+          <a:xfrm>
+            <a:off x="19968205" y="20112765"/>
+            <a:ext cx="951218" cy="215444"/>
+          </a:xfrm>
+          <a:prstGeom prst="rect">
+            <a:avLst/>
+          </a:prstGeom>
+          <a:noFill/>
+          <a:ln>
+            <a:solidFill>
+              <a:schemeClr val="tx1"/>
+            </a:solidFill>
+          </a:ln>
+        </p:spPr>
+        <p:txBody>
+          <a:bodyPr wrap="square" rtlCol="0">
+            <a:spAutoFit/>
+          </a:bodyPr>
+          <a:lstStyle/>
+          <a:p>
+            <a:pPr algn="ctr"/>
+            <a:r>
+              <a:rPr lang="en-US" sz="400" dirty="0"/>
+              <a:t>&lt;&lt;interface&gt;&gt;</a:t>
+            </a:r>
+          </a:p>
+          <a:p>
+            <a:pPr algn="ctr"/>
+            <a:r>
+              <a:rPr lang="en-US" sz="400" dirty="0" err="1"/>
+              <a:t>IDescendantPublisher</a:t>
+            </a:r>
+            <a:endParaRPr lang="en-US" sz="400" dirty="0"/>
+          </a:p>
+        </p:txBody>
+      </p:sp>
+      <p:cxnSp>
+        <p:nvCxnSpPr>
+          <p:cNvPr id="31" name="Straight Arrow Connector 30">
+            <a:extLst>
+              <a:ext uri="{FF2B5EF4-FFF2-40B4-BE49-F238E27FC236}">
+                <a16:creationId xmlns:a16="http://schemas.microsoft.com/office/drawing/2014/main" id="{784D70DE-3EB4-4A6C-9314-909CD69DE042}"/>
+              </a:ext>
+            </a:extLst>
+          </p:cNvPr>
+          <p:cNvCxnSpPr>
+            <a:stCxn id="28" idx="0"/>
+            <a:endCxn id="29" idx="2"/>
+          </p:cNvCxnSpPr>
+          <p:nvPr/>
+        </p:nvCxnSpPr>
+        <p:spPr>
+          <a:xfrm flipV="1">
+            <a:off x="20443814" y="20328209"/>
+            <a:ext cx="0" cy="229482"/>
+          </a:xfrm>
+          <a:prstGeom prst="straightConnector1">
+            <a:avLst/>
+          </a:prstGeom>
+          <a:ln>
+            <a:solidFill>
+              <a:schemeClr val="tx1"/>
+            </a:solidFill>
+            <a:tailEnd type="triangle"/>
+          </a:ln>
+        </p:spPr>
+        <p:style>
+          <a:lnRef idx="1">
+            <a:schemeClr val="accent1"/>
+          </a:lnRef>
+          <a:fillRef idx="0">
+            <a:schemeClr val="accent1"/>
+          </a:fillRef>
+          <a:effectRef idx="0">
+            <a:schemeClr val="accent1"/>
+          </a:effectRef>
+          <a:fontRef idx="minor">
+            <a:schemeClr val="tx1"/>
+          </a:fontRef>
+        </p:style>
+      </p:cxnSp>
+      <p:cxnSp>
+        <p:nvCxnSpPr>
+          <p:cNvPr id="32" name="Straight Arrow Connector 31">
+            <a:extLst>
+              <a:ext uri="{FF2B5EF4-FFF2-40B4-BE49-F238E27FC236}">
+                <a16:creationId xmlns:a16="http://schemas.microsoft.com/office/drawing/2014/main" id="{5A4C0E2B-C188-46A5-BA3E-BE694A0C9E99}"/>
+              </a:ext>
+            </a:extLst>
+          </p:cNvPr>
+          <p:cNvCxnSpPr>
+            <a:cxnSpLocks/>
+            <a:stCxn id="27" idx="0"/>
+            <a:endCxn id="26" idx="2"/>
+          </p:cNvCxnSpPr>
+          <p:nvPr/>
+        </p:nvCxnSpPr>
+        <p:spPr>
+          <a:xfrm flipV="1">
+            <a:off x="19040050" y="20777108"/>
+            <a:ext cx="80645" cy="683078"/>
+          </a:xfrm>
+          <a:prstGeom prst="straightConnector1">
+            <a:avLst/>
+          </a:prstGeom>
+          <a:ln>
+            <a:solidFill>
+              <a:schemeClr val="tx1"/>
+            </a:solidFill>
+            <a:tailEnd type="triangle"/>
+          </a:ln>
+        </p:spPr>
+        <p:style>
+          <a:lnRef idx="1">
+            <a:schemeClr val="accent1"/>
+          </a:lnRef>
+          <a:fillRef idx="0">
+            <a:schemeClr val="accent1"/>
+          </a:fillRef>
+          <a:effectRef idx="0">
+            <a:schemeClr val="accent1"/>
+          </a:effectRef>
+          <a:fontRef idx="minor">
+            <a:schemeClr val="tx1"/>
+          </a:fontRef>
+        </p:style>
+      </p:cxnSp>
+      <p:cxnSp>
+        <p:nvCxnSpPr>
+          <p:cNvPr id="35" name="Straight Arrow Connector 34">
+            <a:extLst>
+              <a:ext uri="{FF2B5EF4-FFF2-40B4-BE49-F238E27FC236}">
+                <a16:creationId xmlns:a16="http://schemas.microsoft.com/office/drawing/2014/main" id="{A7E31B88-B520-4CE3-9F08-9834629BE558}"/>
+              </a:ext>
+            </a:extLst>
+          </p:cNvPr>
+          <p:cNvCxnSpPr>
+            <a:cxnSpLocks/>
+            <a:stCxn id="27" idx="0"/>
+            <a:endCxn id="28" idx="2"/>
+          </p:cNvCxnSpPr>
+          <p:nvPr/>
+        </p:nvCxnSpPr>
+        <p:spPr>
+          <a:xfrm flipV="1">
+            <a:off x="19040050" y="20773135"/>
+            <a:ext cx="1403764" cy="687051"/>
+          </a:xfrm>
+          <a:prstGeom prst="straightConnector1">
+            <a:avLst/>
+          </a:prstGeom>
+          <a:ln>
+            <a:solidFill>
+              <a:schemeClr val="tx1"/>
+            </a:solidFill>
+            <a:tailEnd type="triangle"/>
+          </a:ln>
+        </p:spPr>
+        <p:style>
+          <a:lnRef idx="1">
+            <a:schemeClr val="accent1"/>
+          </a:lnRef>
+          <a:fillRef idx="0">
+            <a:schemeClr val="accent1"/>
+          </a:fillRef>
+          <a:effectRef idx="0">
+            <a:schemeClr val="accent1"/>
+          </a:effectRef>
+          <a:fontRef idx="minor">
+            <a:schemeClr val="tx1"/>
+          </a:fontRef>
+        </p:style>
+      </p:cxnSp>
+      <p:sp>
+        <p:nvSpPr>
+          <p:cNvPr id="38" name="TextBox 37">
+            <a:extLst>
+              <a:ext uri="{FF2B5EF4-FFF2-40B4-BE49-F238E27FC236}">
+                <a16:creationId xmlns:a16="http://schemas.microsoft.com/office/drawing/2014/main" id="{8015F1DD-9F11-449F-9B1E-5A9945C2F5FA}"/>
+              </a:ext>
+            </a:extLst>
+          </p:cNvPr>
+          <p:cNvSpPr txBox="1"/>
+          <p:nvPr/>
+        </p:nvSpPr>
+        <p:spPr>
+          <a:xfrm>
+            <a:off x="18212213" y="22049861"/>
+            <a:ext cx="903854" cy="215444"/>
+          </a:xfrm>
+          <a:prstGeom prst="rect">
+            <a:avLst/>
+          </a:prstGeom>
+          <a:noFill/>
+          <a:ln>
+            <a:solidFill>
+              <a:schemeClr val="tx1"/>
+            </a:solidFill>
+          </a:ln>
+        </p:spPr>
+        <p:txBody>
+          <a:bodyPr wrap="square" rtlCol="0">
+            <a:spAutoFit/>
+          </a:bodyPr>
+          <a:lstStyle/>
+          <a:p>
+            <a:pPr algn="ctr"/>
+            <a:r>
+              <a:rPr lang="en-US" sz="400" dirty="0"/>
+              <a:t>&lt;&lt;interface&gt;&gt;</a:t>
+            </a:r>
+          </a:p>
+          <a:p>
+            <a:pPr algn="ctr"/>
+            <a:r>
+              <a:rPr lang="en-US" sz="400" dirty="0" err="1"/>
+              <a:t>ISubscribableContentUserStore</a:t>
+            </a:r>
+            <a:endParaRPr lang="en-US" sz="400" dirty="0"/>
+          </a:p>
+        </p:txBody>
+      </p:sp>
+      <p:cxnSp>
+        <p:nvCxnSpPr>
+          <p:cNvPr id="40" name="Straight Arrow Connector 39">
+            <a:extLst>
+              <a:ext uri="{FF2B5EF4-FFF2-40B4-BE49-F238E27FC236}">
+                <a16:creationId xmlns:a16="http://schemas.microsoft.com/office/drawing/2014/main" id="{6CF93F79-A4E6-4D37-B198-381FF4602DF9}"/>
+              </a:ext>
+            </a:extLst>
+          </p:cNvPr>
+          <p:cNvCxnSpPr>
+            <a:cxnSpLocks/>
+            <a:stCxn id="12" idx="0"/>
+            <a:endCxn id="38" idx="2"/>
+          </p:cNvCxnSpPr>
+          <p:nvPr/>
+        </p:nvCxnSpPr>
+        <p:spPr>
+          <a:xfrm flipV="1">
+            <a:off x="17266340" y="22265305"/>
+            <a:ext cx="1397800" cy="216252"/>
+          </a:xfrm>
+          <a:prstGeom prst="straightConnector1">
+            <a:avLst/>
+          </a:prstGeom>
+          <a:ln>
+            <a:solidFill>
+              <a:schemeClr val="tx1"/>
+            </a:solidFill>
+            <a:prstDash val="dash"/>
+            <a:tailEnd type="triangle"/>
+          </a:ln>
+        </p:spPr>
+        <p:style>
+          <a:lnRef idx="1">
+            <a:schemeClr val="accent1"/>
+          </a:lnRef>
+          <a:fillRef idx="0">
+            <a:schemeClr val="accent1"/>
+          </a:fillRef>
+          <a:effectRef idx="0">
+            <a:schemeClr val="accent1"/>
+          </a:effectRef>
+          <a:fontRef idx="minor">
+            <a:schemeClr val="tx1"/>
+          </a:fontRef>
+        </p:style>
+      </p:cxnSp>
+      <p:cxnSp>
+        <p:nvCxnSpPr>
+          <p:cNvPr id="43" name="Straight Arrow Connector 42">
+            <a:extLst>
+              <a:ext uri="{FF2B5EF4-FFF2-40B4-BE49-F238E27FC236}">
+                <a16:creationId xmlns:a16="http://schemas.microsoft.com/office/drawing/2014/main" id="{7129B66C-09AA-4413-9C5C-9739187B6DD6}"/>
+              </a:ext>
+            </a:extLst>
+          </p:cNvPr>
+          <p:cNvCxnSpPr>
+            <a:cxnSpLocks/>
+            <a:stCxn id="38" idx="0"/>
+            <a:endCxn id="27" idx="2"/>
+          </p:cNvCxnSpPr>
+          <p:nvPr/>
+        </p:nvCxnSpPr>
+        <p:spPr>
+          <a:xfrm flipV="1">
+            <a:off x="18664140" y="21675630"/>
+            <a:ext cx="375910" cy="374231"/>
+          </a:xfrm>
+          <a:prstGeom prst="straightConnector1">
+            <a:avLst/>
+          </a:prstGeom>
+          <a:ln>
+            <a:solidFill>
+              <a:schemeClr val="tx1"/>
+            </a:solidFill>
+            <a:tailEnd type="triangle"/>
+          </a:ln>
+        </p:spPr>
+        <p:style>
+          <a:lnRef idx="1">
+            <a:schemeClr val="accent1"/>
+          </a:lnRef>
+          <a:fillRef idx="0">
+            <a:schemeClr val="accent1"/>
+          </a:fillRef>
+          <a:effectRef idx="0">
+            <a:schemeClr val="accent1"/>
+          </a:effectRef>
+          <a:fontRef idx="minor">
+            <a:schemeClr val="tx1"/>
+          </a:fontRef>
+        </p:style>
+      </p:cxnSp>
+      <p:cxnSp>
+        <p:nvCxnSpPr>
+          <p:cNvPr id="46" name="Straight Arrow Connector 45">
+            <a:extLst>
+              <a:ext uri="{FF2B5EF4-FFF2-40B4-BE49-F238E27FC236}">
+                <a16:creationId xmlns:a16="http://schemas.microsoft.com/office/drawing/2014/main" id="{8EF7673B-4983-4D71-8F2C-859065633D7D}"/>
+              </a:ext>
+            </a:extLst>
+          </p:cNvPr>
+          <p:cNvCxnSpPr>
+            <a:cxnSpLocks/>
+            <a:stCxn id="5" idx="0"/>
+            <a:endCxn id="27" idx="2"/>
+          </p:cNvCxnSpPr>
+          <p:nvPr/>
+        </p:nvCxnSpPr>
+        <p:spPr>
+          <a:xfrm flipV="1">
+            <a:off x="17266340" y="21675630"/>
+            <a:ext cx="1773710" cy="470654"/>
+          </a:xfrm>
+          <a:prstGeom prst="straightConnector1">
+            <a:avLst/>
+          </a:prstGeom>
+          <a:ln>
+            <a:solidFill>
+              <a:schemeClr val="tx1"/>
+            </a:solidFill>
+            <a:prstDash val="dash"/>
+            <a:tailEnd type="triangle"/>
+          </a:ln>
+        </p:spPr>
+        <p:style>
+          <a:lnRef idx="1">
+            <a:schemeClr val="accent1"/>
+          </a:lnRef>
+          <a:fillRef idx="0">
+            <a:schemeClr val="accent1"/>
+          </a:fillRef>
+          <a:effectRef idx="0">
+            <a:schemeClr val="accent1"/>
+          </a:effectRef>
+          <a:fontRef idx="minor">
+            <a:schemeClr val="tx1"/>
+          </a:fontRef>
+        </p:style>
+      </p:cxnSp>
+      <p:cxnSp>
+        <p:nvCxnSpPr>
+          <p:cNvPr id="55" name="Straight Arrow Connector 54">
+            <a:extLst>
+              <a:ext uri="{FF2B5EF4-FFF2-40B4-BE49-F238E27FC236}">
+                <a16:creationId xmlns:a16="http://schemas.microsoft.com/office/drawing/2014/main" id="{BDEFD1A8-8D34-4C69-BDFD-668021A4E0B7}"/>
+              </a:ext>
+            </a:extLst>
+          </p:cNvPr>
+          <p:cNvCxnSpPr>
+            <a:cxnSpLocks/>
+            <a:stCxn id="4" idx="0"/>
+            <a:endCxn id="26" idx="2"/>
+          </p:cNvCxnSpPr>
+          <p:nvPr/>
+        </p:nvCxnSpPr>
+        <p:spPr>
+          <a:xfrm flipV="1">
+            <a:off x="17266340" y="20777108"/>
+            <a:ext cx="1854355" cy="1022442"/>
+          </a:xfrm>
+          <a:prstGeom prst="straightConnector1">
+            <a:avLst/>
+          </a:prstGeom>
+          <a:ln>
+            <a:solidFill>
+              <a:schemeClr val="tx1"/>
+            </a:solidFill>
+            <a:prstDash val="dash"/>
+            <a:tailEnd type="triangle"/>
+          </a:ln>
+        </p:spPr>
+        <p:style>
+          <a:lnRef idx="1">
+            <a:schemeClr val="accent1"/>
+          </a:lnRef>
+          <a:fillRef idx="0">
+            <a:schemeClr val="accent1"/>
+          </a:fillRef>
+          <a:effectRef idx="0">
+            <a:schemeClr val="accent1"/>
+          </a:effectRef>
+          <a:fontRef idx="minor">
+            <a:schemeClr val="tx1"/>
+          </a:fontRef>
+        </p:style>
+      </p:cxnSp>
+      <p:sp>
+        <p:nvSpPr>
+          <p:cNvPr id="62" name="TextBox 61">
+            <a:extLst>
+              <a:ext uri="{FF2B5EF4-FFF2-40B4-BE49-F238E27FC236}">
+                <a16:creationId xmlns:a16="http://schemas.microsoft.com/office/drawing/2014/main" id="{16F1B07F-5F8B-4300-AEE0-8E018E9E89D6}"/>
+              </a:ext>
+            </a:extLst>
+          </p:cNvPr>
+          <p:cNvSpPr txBox="1"/>
+          <p:nvPr/>
+        </p:nvSpPr>
+        <p:spPr>
+          <a:xfrm>
+            <a:off x="18074822" y="22513017"/>
+            <a:ext cx="1178636" cy="153888"/>
+          </a:xfrm>
+          <a:prstGeom prst="rect">
+            <a:avLst/>
+          </a:prstGeom>
+          <a:noFill/>
+          <a:ln>
+            <a:solidFill>
+              <a:schemeClr val="tx1"/>
+            </a:solidFill>
+          </a:ln>
+        </p:spPr>
+        <p:txBody>
+          <a:bodyPr wrap="square" rtlCol="0">
+            <a:spAutoFit/>
+          </a:bodyPr>
+          <a:lstStyle/>
+          <a:p>
+            <a:pPr algn="ctr"/>
+            <a:r>
+              <a:rPr lang="en-US" sz="400" dirty="0" err="1"/>
+              <a:t>IMutableSubscribableContentUserStore</a:t>
+            </a:r>
+            <a:endParaRPr lang="en-US" sz="400" dirty="0"/>
+          </a:p>
+        </p:txBody>
+      </p:sp>
+      <p:cxnSp>
+        <p:nvCxnSpPr>
+          <p:cNvPr id="63" name="Straight Arrow Connector 62">
+            <a:extLst>
+              <a:ext uri="{FF2B5EF4-FFF2-40B4-BE49-F238E27FC236}">
+                <a16:creationId xmlns:a16="http://schemas.microsoft.com/office/drawing/2014/main" id="{B83CE5E3-631F-488D-A8FD-10A804551D21}"/>
+              </a:ext>
+            </a:extLst>
+          </p:cNvPr>
+          <p:cNvCxnSpPr>
+            <a:cxnSpLocks/>
+            <a:stCxn id="13" idx="0"/>
+            <a:endCxn id="62" idx="2"/>
+          </p:cNvCxnSpPr>
+          <p:nvPr/>
+        </p:nvCxnSpPr>
+        <p:spPr>
+          <a:xfrm flipV="1">
+            <a:off x="17266339" y="22666905"/>
+            <a:ext cx="1397801" cy="188883"/>
+          </a:xfrm>
+          <a:prstGeom prst="straightConnector1">
+            <a:avLst/>
+          </a:prstGeom>
+          <a:ln>
+            <a:solidFill>
+              <a:schemeClr val="tx1"/>
+            </a:solidFill>
+            <a:prstDash val="dash"/>
+            <a:tailEnd type="triangle"/>
+          </a:ln>
+        </p:spPr>
+        <p:style>
+          <a:lnRef idx="1">
+            <a:schemeClr val="accent1"/>
+          </a:lnRef>
+          <a:fillRef idx="0">
+            <a:schemeClr val="accent1"/>
+          </a:fillRef>
+          <a:effectRef idx="0">
+            <a:schemeClr val="accent1"/>
+          </a:effectRef>
+          <a:fontRef idx="minor">
+            <a:schemeClr val="tx1"/>
+          </a:fontRef>
+        </p:style>
+      </p:cxnSp>
+      <p:cxnSp>
+        <p:nvCxnSpPr>
+          <p:cNvPr id="67" name="Straight Arrow Connector 66">
+            <a:extLst>
+              <a:ext uri="{FF2B5EF4-FFF2-40B4-BE49-F238E27FC236}">
+                <a16:creationId xmlns:a16="http://schemas.microsoft.com/office/drawing/2014/main" id="{54ED954B-6291-4FD6-B07A-4BE36A16DE8E}"/>
+              </a:ext>
+            </a:extLst>
+          </p:cNvPr>
+          <p:cNvCxnSpPr>
+            <a:cxnSpLocks/>
+            <a:stCxn id="62" idx="0"/>
+            <a:endCxn id="38" idx="2"/>
+          </p:cNvCxnSpPr>
+          <p:nvPr/>
+        </p:nvCxnSpPr>
+        <p:spPr>
+          <a:xfrm flipV="1">
+            <a:off x="18664140" y="22265305"/>
+            <a:ext cx="0" cy="247712"/>
+          </a:xfrm>
+          <a:prstGeom prst="straightConnector1">
+            <a:avLst/>
+          </a:prstGeom>
+          <a:ln>
+            <a:solidFill>
+              <a:schemeClr val="tx1"/>
+            </a:solidFill>
+            <a:tailEnd type="triangle"/>
+          </a:ln>
+        </p:spPr>
+        <p:style>
+          <a:lnRef idx="1">
+            <a:schemeClr val="accent1"/>
+          </a:lnRef>
+          <a:fillRef idx="0">
+            <a:schemeClr val="accent1"/>
+          </a:fillRef>
+          <a:effectRef idx="0">
+            <a:schemeClr val="accent1"/>
+          </a:effectRef>
+          <a:fontRef idx="minor">
+            <a:schemeClr val="tx1"/>
+          </a:fontRef>
+        </p:style>
+      </p:cxnSp>
+      <p:sp>
+        <p:nvSpPr>
+          <p:cNvPr id="72" name="TextBox 71">
+            <a:extLst>
+              <a:ext uri="{FF2B5EF4-FFF2-40B4-BE49-F238E27FC236}">
+                <a16:creationId xmlns:a16="http://schemas.microsoft.com/office/drawing/2014/main" id="{A239D109-6E8A-4AEF-8D04-2ABD969CB5A2}"/>
+              </a:ext>
+            </a:extLst>
+          </p:cNvPr>
+          <p:cNvSpPr txBox="1"/>
+          <p:nvPr/>
+        </p:nvSpPr>
+        <p:spPr>
+          <a:xfrm>
+            <a:off x="19777624" y="22049861"/>
+            <a:ext cx="1239826" cy="276999"/>
+          </a:xfrm>
+          <a:prstGeom prst="rect">
+            <a:avLst/>
+          </a:prstGeom>
+          <a:noFill/>
+          <a:ln>
+            <a:solidFill>
+              <a:schemeClr val="tx1"/>
+            </a:solidFill>
+          </a:ln>
+        </p:spPr>
+        <p:txBody>
+          <a:bodyPr wrap="square" rtlCol="0">
+            <a:spAutoFit/>
+          </a:bodyPr>
+          <a:lstStyle/>
+          <a:p>
+            <a:pPr algn="ctr"/>
+            <a:r>
+              <a:rPr lang="en-US" sz="400" dirty="0" err="1"/>
+              <a:t>IMutable</a:t>
+            </a:r>
+            <a:r>
+              <a:rPr lang="en-US" sz="400" dirty="0"/>
+              <a:t>&lt;</a:t>
+            </a:r>
+            <a:r>
+              <a:rPr lang="en-US" sz="400" dirty="0" err="1"/>
+              <a:t>MutationInterface</a:t>
+            </a:r>
+            <a:r>
+              <a:rPr lang="en-US" sz="400" dirty="0"/>
+              <a:t>&gt;</a:t>
+            </a:r>
+          </a:p>
+          <a:p>
+            <a:pPr algn="ctr"/>
+            <a:r>
+              <a:rPr lang="en-US" sz="400" dirty="0"/>
+              <a:t>+</a:t>
+            </a:r>
+            <a:r>
+              <a:rPr lang="en-US" sz="400" dirty="0" err="1"/>
+              <a:t>addMutation</a:t>
+            </a:r>
+            <a:r>
+              <a:rPr lang="en-US" sz="400" dirty="0"/>
+              <a:t>(mutation: </a:t>
+            </a:r>
+            <a:r>
+              <a:rPr lang="en-US" sz="400" dirty="0" err="1"/>
+              <a:t>MutationInterface</a:t>
+            </a:r>
+            <a:r>
+              <a:rPr lang="en-US" sz="400" dirty="0"/>
+              <a:t>)</a:t>
+            </a:r>
+          </a:p>
+          <a:p>
+            <a:pPr algn="ctr"/>
+            <a:r>
+              <a:rPr lang="en-US" sz="400" dirty="0"/>
+              <a:t>+mutations(): </a:t>
+            </a:r>
+            <a:r>
+              <a:rPr lang="en-US" sz="400" dirty="0" err="1"/>
+              <a:t>MutationInterface</a:t>
+            </a:r>
+            <a:r>
+              <a:rPr lang="en-US" sz="400"/>
+              <a:t>[]</a:t>
+            </a:r>
+            <a:endParaRPr lang="en-US" sz="400" dirty="0"/>
+          </a:p>
+        </p:txBody>
+      </p:sp>
+      <p:cxnSp>
+        <p:nvCxnSpPr>
+          <p:cNvPr id="73" name="Straight Arrow Connector 72">
+            <a:extLst>
+              <a:ext uri="{FF2B5EF4-FFF2-40B4-BE49-F238E27FC236}">
+                <a16:creationId xmlns:a16="http://schemas.microsoft.com/office/drawing/2014/main" id="{39D884D8-F0EA-4A1D-A148-613BE8138AC2}"/>
+              </a:ext>
+            </a:extLst>
+          </p:cNvPr>
+          <p:cNvCxnSpPr>
+            <a:cxnSpLocks/>
+            <a:stCxn id="62" idx="0"/>
+            <a:endCxn id="72" idx="2"/>
+          </p:cNvCxnSpPr>
+          <p:nvPr/>
+        </p:nvCxnSpPr>
+        <p:spPr>
+          <a:xfrm flipV="1">
+            <a:off x="18664140" y="22326860"/>
+            <a:ext cx="1733397" cy="186157"/>
+          </a:xfrm>
+          <a:prstGeom prst="straightConnector1">
+            <a:avLst/>
+          </a:prstGeom>
+          <a:ln>
+            <a:solidFill>
+              <a:schemeClr val="tx1"/>
+            </a:solidFill>
+            <a:tailEnd type="triangle"/>
+          </a:ln>
+        </p:spPr>
+        <p:style>
+          <a:lnRef idx="1">
+            <a:schemeClr val="accent1"/>
+          </a:lnRef>
+          <a:fillRef idx="0">
+            <a:schemeClr val="accent1"/>
+          </a:fillRef>
+          <a:effectRef idx="0">
+            <a:schemeClr val="accent1"/>
+          </a:effectRef>
+          <a:fontRef idx="minor">
+            <a:schemeClr val="tx1"/>
+          </a:fontRef>
+        </p:style>
+      </p:cxnSp>
     </p:spTree>
     <p:extLst>
       <p:ext uri="{BB962C8B-B14F-4D97-AF65-F5344CB8AC3E}">
-        <p14:creationId xmlns:p14="http://schemas.microsoft.com/office/powerpoint/2010/main" val="3139668986"/>
+        <p14:creationId xmlns:p14="http://schemas.microsoft.com/office/powerpoint/2010/main" val="1828436438"/>
       </p:ext>
     </p:extLst>
   </p:cSld>

</xml_diff>

<commit_message>
Get specialTreeLoader connected to knawledgeMap. Rename SyncToDB to DBSyncer
</commit_message>
<xml_diff>
--- a/docs/architecture.pptx
+++ b/docs/architecture.pptx
@@ -17857,10 +17857,9 @@
               <a:t>MutationInterface</a:t>
             </a:r>
             <a:r>
-              <a:rPr lang="en-US" sz="400"/>
+              <a:rPr lang="en-US" sz="400" dirty="0"/>
               <a:t>[]</a:t>
             </a:r>
-            <a:endParaRPr lang="en-US" sz="400" dirty="0"/>
           </a:p>
         </p:txBody>
       </p:sp>
@@ -17892,6 +17891,141 @@
             <a:solidFill>
               <a:schemeClr val="tx1"/>
             </a:solidFill>
+            <a:tailEnd type="triangle"/>
+          </a:ln>
+        </p:spPr>
+        <p:style>
+          <a:lnRef idx="1">
+            <a:schemeClr val="accent1"/>
+          </a:lnRef>
+          <a:fillRef idx="0">
+            <a:schemeClr val="accent1"/>
+          </a:fillRef>
+          <a:effectRef idx="0">
+            <a:schemeClr val="accent1"/>
+          </a:effectRef>
+          <a:fontRef idx="minor">
+            <a:schemeClr val="tx1"/>
+          </a:fontRef>
+        </p:style>
+      </p:cxnSp>
+      <p:sp>
+        <p:nvSpPr>
+          <p:cNvPr id="76" name="TextBox 75">
+            <a:extLst>
+              <a:ext uri="{FF2B5EF4-FFF2-40B4-BE49-F238E27FC236}">
+                <a16:creationId xmlns:a16="http://schemas.microsoft.com/office/drawing/2014/main" id="{51179089-E921-4AF5-8712-4B2D3191DEF5}"/>
+              </a:ext>
+            </a:extLst>
+          </p:cNvPr>
+          <p:cNvSpPr txBox="1"/>
+          <p:nvPr/>
+        </p:nvSpPr>
+        <p:spPr>
+          <a:xfrm>
+            <a:off x="16309377" y="22146284"/>
+            <a:ext cx="520798" cy="153888"/>
+          </a:xfrm>
+          <a:prstGeom prst="rect">
+            <a:avLst/>
+          </a:prstGeom>
+          <a:noFill/>
+          <a:ln>
+            <a:solidFill>
+              <a:schemeClr val="tx1"/>
+            </a:solidFill>
+          </a:ln>
+        </p:spPr>
+        <p:txBody>
+          <a:bodyPr wrap="square" rtlCol="0">
+            <a:spAutoFit/>
+          </a:bodyPr>
+          <a:lstStyle/>
+          <a:p>
+            <a:pPr algn="ctr"/>
+            <a:r>
+              <a:rPr lang="en-US" sz="400" dirty="0" err="1"/>
+              <a:t>Subscribable</a:t>
+            </a:r>
+            <a:endParaRPr lang="en-US" sz="400" dirty="0"/>
+          </a:p>
+        </p:txBody>
+      </p:sp>
+      <p:cxnSp>
+        <p:nvCxnSpPr>
+          <p:cNvPr id="77" name="Straight Arrow Connector 76">
+            <a:extLst>
+              <a:ext uri="{FF2B5EF4-FFF2-40B4-BE49-F238E27FC236}">
+                <a16:creationId xmlns:a16="http://schemas.microsoft.com/office/drawing/2014/main" id="{97F2B420-154C-4505-84D7-692DA35AFF8F}"/>
+              </a:ext>
+            </a:extLst>
+          </p:cNvPr>
+          <p:cNvCxnSpPr>
+            <a:cxnSpLocks/>
+            <a:stCxn id="76" idx="0"/>
+            <a:endCxn id="4" idx="2"/>
+          </p:cNvCxnSpPr>
+          <p:nvPr/>
+        </p:nvCxnSpPr>
+        <p:spPr>
+          <a:xfrm flipV="1">
+            <a:off x="16569776" y="21953438"/>
+            <a:ext cx="696564" cy="192846"/>
+          </a:xfrm>
+          <a:prstGeom prst="straightConnector1">
+            <a:avLst/>
+          </a:prstGeom>
+          <a:ln>
+            <a:solidFill>
+              <a:schemeClr val="tx1"/>
+            </a:solidFill>
+            <a:tailEnd type="triangle"/>
+          </a:ln>
+        </p:spPr>
+        <p:style>
+          <a:lnRef idx="1">
+            <a:schemeClr val="accent1"/>
+          </a:lnRef>
+          <a:fillRef idx="0">
+            <a:schemeClr val="accent1"/>
+          </a:fillRef>
+          <a:effectRef idx="0">
+            <a:schemeClr val="accent1"/>
+          </a:effectRef>
+          <a:fontRef idx="minor">
+            <a:schemeClr val="tx1"/>
+          </a:fontRef>
+        </p:style>
+      </p:cxnSp>
+      <p:cxnSp>
+        <p:nvCxnSpPr>
+          <p:cNvPr id="81" name="Straight Arrow Connector 80">
+            <a:extLst>
+              <a:ext uri="{FF2B5EF4-FFF2-40B4-BE49-F238E27FC236}">
+                <a16:creationId xmlns:a16="http://schemas.microsoft.com/office/drawing/2014/main" id="{255CD660-2F4C-4CA9-B21E-D46D39B28737}"/>
+              </a:ext>
+            </a:extLst>
+          </p:cNvPr>
+          <p:cNvCxnSpPr>
+            <a:cxnSpLocks/>
+            <a:stCxn id="76" idx="0"/>
+            <a:endCxn id="26" idx="2"/>
+          </p:cNvCxnSpPr>
+          <p:nvPr/>
+        </p:nvCxnSpPr>
+        <p:spPr>
+          <a:xfrm flipV="1">
+            <a:off x="16569776" y="20777108"/>
+            <a:ext cx="2550919" cy="1369176"/>
+          </a:xfrm>
+          <a:prstGeom prst="straightConnector1">
+            <a:avLst/>
+          </a:prstGeom>
+          <a:ln>
+            <a:solidFill>
+              <a:schemeClr val="tx1"/>
+            </a:solidFill>
+            <a:prstDash val="dash"/>
             <a:tailEnd type="triangle"/>
           </a:ln>
         </p:spPr>

</xml_diff>

<commit_message>
Make it so that when a user clicks on proficiency, the update does bubble back to sigmaNode. It does not yet bubble back to the vue-template live though. You have to reclick on the node for the vue template to get the update
</commit_message>
<xml_diff>
--- a/docs/architecture.pptx
+++ b/docs/architecture.pptx
@@ -116,7 +116,7 @@
 
 <file path=ppt/commentAuthors.xml><?xml version="1.0" encoding="utf-8"?>
 <p:cmAuthorLst xmlns:a="http://schemas.openxmlformats.org/drawingml/2006/main" xmlns:r="http://schemas.openxmlformats.org/officeDocument/2006/relationships" xmlns:p="http://schemas.openxmlformats.org/presentationml/2006/main">
-  <p:cmAuthor id="1" name="John Simerlink" initials="JS" lastIdx="4" clrIdx="0">
+  <p:cmAuthor id="1" name="John Simerlink" initials="JS" lastIdx="6" clrIdx="0">
     <p:extLst>
       <p:ext uri="{19B8F6BF-5375-455C-9EA6-DF929625EA0E}">
         <p15:presenceInfo xmlns:p15="http://schemas.microsoft.com/office/powerpoint/2012/main" userId="bb2883f3ca9420d0" providerId="Windows Live"/>
@@ -159,6 +159,26 @@
       <p:ext uri="{C676402C-5697-4E1C-873F-D02D1690AC5C}">
         <p15:threadingInfo xmlns:p15="http://schemas.microsoft.com/office/powerpoint/2012/main" timeZoneBias="300">
           <p15:parentCm authorId="1" idx="2"/>
+        </p15:threadingInfo>
+      </p:ext>
+    </p:extLst>
+  </p:cm>
+  <p:cm authorId="1" dt="2018-01-20T19:57:32.694" idx="5">
+    <p:pos x="12640" y="15345"/>
+    <p:text>called by GlobalDataStore in the globalDataStore.addCreateMutation() method</p:text>
+    <p:extLst>
+      <p:ext uri="{C676402C-5697-4E1C-873F-D02D1690AC5C}">
+        <p15:threadingInfo xmlns:p15="http://schemas.microsoft.com/office/powerpoint/2012/main" timeZoneBias="300"/>
+      </p:ext>
+    </p:extLst>
+  </p:cm>
+  <p:cm authorId="1" dt="2018-01-20T19:59:14.896" idx="6">
+    <p:pos x="12640" y="15441"/>
+    <p:text/>
+    <p:extLst>
+      <p:ext uri="{C676402C-5697-4E1C-873F-D02D1690AC5C}">
+        <p15:threadingInfo xmlns:p15="http://schemas.microsoft.com/office/powerpoint/2012/main" timeZoneBias="300">
+          <p15:parentCm authorId="1" idx="5"/>
         </p15:threadingInfo>
       </p:ext>
     </p:extLst>
@@ -7395,8 +7415,8 @@
         </p:nvCxnSpPr>
         <p:spPr>
           <a:xfrm flipH="1">
-            <a:off x="20263785" y="24413995"/>
-            <a:ext cx="2988" cy="166543"/>
+            <a:off x="20263785" y="24475550"/>
+            <a:ext cx="2988" cy="104988"/>
           </a:xfrm>
           <a:prstGeom prst="straightConnector1">
             <a:avLst/>
@@ -10573,12 +10593,12 @@
         </p:nvCxnSpPr>
         <p:spPr>
           <a:xfrm rot="10800000" flipH="1">
-            <a:off x="19232897" y="24090831"/>
-            <a:ext cx="2988" cy="874429"/>
+            <a:off x="19232897" y="24121607"/>
+            <a:ext cx="2988" cy="843652"/>
           </a:xfrm>
           <a:prstGeom prst="bentConnector3">
             <a:avLst>
-              <a:gd name="adj1" fmla="val -9460007"/>
+              <a:gd name="adj1" fmla="val -7650602"/>
             </a:avLst>
           </a:prstGeom>
           <a:ln w="9525">
@@ -10621,8 +10641,8 @@
         </p:nvCxnSpPr>
         <p:spPr>
           <a:xfrm rot="10800000" flipH="1">
-            <a:off x="19235884" y="22882706"/>
-            <a:ext cx="2523311" cy="1208124"/>
+            <a:off x="19235884" y="22882707"/>
+            <a:ext cx="2523311" cy="1238901"/>
           </a:xfrm>
           <a:prstGeom prst="bentConnector3">
             <a:avLst>
@@ -12566,7 +12586,7 @@
         <p:spPr>
           <a:xfrm>
             <a:off x="19235885" y="23767664"/>
-            <a:ext cx="2061776" cy="646331"/>
+            <a:ext cx="2061776" cy="707886"/>
           </a:xfrm>
           <a:prstGeom prst="rect">
             <a:avLst/>
@@ -12634,6 +12654,21 @@
             <a:r>
               <a:rPr lang="en-US" sz="400" dirty="0"/>
               <a:t>	-also subscribes to each of its members’ update events, appends the object id to the update/event, and bubbles up these modified events to any objects that subscribed to it</a:t>
+            </a:r>
+          </a:p>
+          <a:p>
+            <a:pPr defTabSz="160020"/>
+            <a:r>
+              <a:rPr lang="en-US" sz="400" dirty="0"/>
+              <a:t>	+</a:t>
+            </a:r>
+            <a:r>
+              <a:rPr lang="en-US" sz="400" dirty="0" err="1"/>
+              <a:t>addAndSubscribeToItem</a:t>
+            </a:r>
+            <a:r>
+              <a:rPr lang="en-US" sz="400" dirty="0"/>
+              <a:t>()</a:t>
             </a:r>
           </a:p>
         </p:txBody>
@@ -15163,7 +15198,7 @@
         <p:spPr>
           <a:xfrm flipH="1" flipV="1">
             <a:off x="17091131" y="23839936"/>
-            <a:ext cx="2144754" cy="250894"/>
+            <a:ext cx="2144754" cy="281671"/>
           </a:xfrm>
           <a:prstGeom prst="straightConnector1">
             <a:avLst/>

</xml_diff>

<commit_message>
Refactor part of the appContainer to use dependency injetion
</commit_message>
<xml_diff>
--- a/docs/architecture.pptx
+++ b/docs/architecture.pptx
@@ -317,7 +317,7 @@
           <a:p>
             <a:fld id="{0A05F3B5-6F50-4323-80C0-955EB0110BAC}" type="datetimeFigureOut">
               <a:rPr lang="en-US" smtClean="0"/>
-              <a:t>1/12/2018</a:t>
+              <a:t>1/22/2018</a:t>
             </a:fld>
             <a:endParaRPr lang="en-US"/>
           </a:p>
@@ -487,7 +487,7 @@
           <a:p>
             <a:fld id="{0A05F3B5-6F50-4323-80C0-955EB0110BAC}" type="datetimeFigureOut">
               <a:rPr lang="en-US" smtClean="0"/>
-              <a:t>1/12/2018</a:t>
+              <a:t>1/22/2018</a:t>
             </a:fld>
             <a:endParaRPr lang="en-US"/>
           </a:p>
@@ -667,7 +667,7 @@
           <a:p>
             <a:fld id="{0A05F3B5-6F50-4323-80C0-955EB0110BAC}" type="datetimeFigureOut">
               <a:rPr lang="en-US" smtClean="0"/>
-              <a:t>1/12/2018</a:t>
+              <a:t>1/22/2018</a:t>
             </a:fld>
             <a:endParaRPr lang="en-US"/>
           </a:p>
@@ -837,7 +837,7 @@
           <a:p>
             <a:fld id="{0A05F3B5-6F50-4323-80C0-955EB0110BAC}" type="datetimeFigureOut">
               <a:rPr lang="en-US" smtClean="0"/>
-              <a:t>1/12/2018</a:t>
+              <a:t>1/22/2018</a:t>
             </a:fld>
             <a:endParaRPr lang="en-US"/>
           </a:p>
@@ -1081,7 +1081,7 @@
           <a:p>
             <a:fld id="{0A05F3B5-6F50-4323-80C0-955EB0110BAC}" type="datetimeFigureOut">
               <a:rPr lang="en-US" smtClean="0"/>
-              <a:t>1/12/2018</a:t>
+              <a:t>1/22/2018</a:t>
             </a:fld>
             <a:endParaRPr lang="en-US"/>
           </a:p>
@@ -1313,7 +1313,7 @@
           <a:p>
             <a:fld id="{0A05F3B5-6F50-4323-80C0-955EB0110BAC}" type="datetimeFigureOut">
               <a:rPr lang="en-US" smtClean="0"/>
-              <a:t>1/12/2018</a:t>
+              <a:t>1/22/2018</a:t>
             </a:fld>
             <a:endParaRPr lang="en-US"/>
           </a:p>
@@ -1680,7 +1680,7 @@
           <a:p>
             <a:fld id="{0A05F3B5-6F50-4323-80C0-955EB0110BAC}" type="datetimeFigureOut">
               <a:rPr lang="en-US" smtClean="0"/>
-              <a:t>1/12/2018</a:t>
+              <a:t>1/22/2018</a:t>
             </a:fld>
             <a:endParaRPr lang="en-US"/>
           </a:p>
@@ -1798,7 +1798,7 @@
           <a:p>
             <a:fld id="{0A05F3B5-6F50-4323-80C0-955EB0110BAC}" type="datetimeFigureOut">
               <a:rPr lang="en-US" smtClean="0"/>
-              <a:t>1/12/2018</a:t>
+              <a:t>1/22/2018</a:t>
             </a:fld>
             <a:endParaRPr lang="en-US"/>
           </a:p>
@@ -1893,7 +1893,7 @@
           <a:p>
             <a:fld id="{0A05F3B5-6F50-4323-80C0-955EB0110BAC}" type="datetimeFigureOut">
               <a:rPr lang="en-US" smtClean="0"/>
-              <a:t>1/12/2018</a:t>
+              <a:t>1/22/2018</a:t>
             </a:fld>
             <a:endParaRPr lang="en-US"/>
           </a:p>
@@ -2170,7 +2170,7 @@
           <a:p>
             <a:fld id="{0A05F3B5-6F50-4323-80C0-955EB0110BAC}" type="datetimeFigureOut">
               <a:rPr lang="en-US" smtClean="0"/>
-              <a:t>1/12/2018</a:t>
+              <a:t>1/22/2018</a:t>
             </a:fld>
             <a:endParaRPr lang="en-US"/>
           </a:p>
@@ -2427,7 +2427,7 @@
           <a:p>
             <a:fld id="{0A05F3B5-6F50-4323-80C0-955EB0110BAC}" type="datetimeFigureOut">
               <a:rPr lang="en-US" smtClean="0"/>
-              <a:t>1/12/2018</a:t>
+              <a:t>1/22/2018</a:t>
             </a:fld>
             <a:endParaRPr lang="en-US"/>
           </a:p>
@@ -2640,7 +2640,7 @@
           <a:p>
             <a:fld id="{0A05F3B5-6F50-4323-80C0-955EB0110BAC}" type="datetimeFigureOut">
               <a:rPr lang="en-US" smtClean="0"/>
-              <a:t>1/12/2018</a:t>
+              <a:t>1/22/2018</a:t>
             </a:fld>
             <a:endParaRPr lang="en-US"/>
           </a:p>
@@ -16759,6 +16759,73 @@
           </a:p>
         </p:txBody>
       </p:sp>
+      <p:sp>
+        <p:nvSpPr>
+          <p:cNvPr id="22" name="Rectangle 21">
+            <a:extLst>
+              <a:ext uri="{FF2B5EF4-FFF2-40B4-BE49-F238E27FC236}">
+                <a16:creationId xmlns:a16="http://schemas.microsoft.com/office/drawing/2014/main" id="{45C065D3-4FDC-4EAC-910E-4A18D60B18AC}"/>
+              </a:ext>
+            </a:extLst>
+          </p:cNvPr>
+          <p:cNvSpPr/>
+          <p:nvPr/>
+        </p:nvSpPr>
+        <p:spPr>
+          <a:xfrm>
+            <a:off x="24445896" y="25418534"/>
+            <a:ext cx="2314608" cy="369332"/>
+          </a:xfrm>
+          <a:prstGeom prst="rect">
+            <a:avLst/>
+          </a:prstGeom>
+        </p:spPr>
+        <p:txBody>
+          <a:bodyPr wrap="none">
+            <a:spAutoFit/>
+          </a:bodyPr>
+          <a:lstStyle/>
+          <a:p>
+            <a:r>
+              <a:rPr lang="en-US" dirty="0" err="1">
+                <a:solidFill>
+                  <a:srgbClr val="444444"/>
+                </a:solidFill>
+                <a:latin typeface="noticia text"/>
+              </a:rPr>
+              <a:t>Ite</a:t>
+            </a:r>
+            <a:r>
+              <a:rPr lang="en-US" dirty="0">
+                <a:solidFill>
+                  <a:srgbClr val="444444"/>
+                </a:solidFill>
+                <a:latin typeface="noticia text"/>
+              </a:rPr>
+              <a:t>, </a:t>
+            </a:r>
+            <a:r>
+              <a:rPr lang="en-US" dirty="0" err="1">
+                <a:solidFill>
+                  <a:srgbClr val="444444"/>
+                </a:solidFill>
+                <a:latin typeface="noticia text"/>
+              </a:rPr>
+              <a:t>inflammate</a:t>
+            </a:r>
+            <a:r>
+              <a:rPr lang="en-US" dirty="0">
+                <a:solidFill>
+                  <a:srgbClr val="444444"/>
+                </a:solidFill>
+                <a:latin typeface="noticia text"/>
+              </a:rPr>
+              <a:t> omnia </a:t>
+            </a:r>
+            <a:endParaRPr lang="en-US" dirty="0"/>
+          </a:p>
+        </p:txBody>
+      </p:sp>
     </p:spTree>
     <p:extLst>
       <p:ext uri="{BB962C8B-B14F-4D97-AF65-F5344CB8AC3E}">

</xml_diff>

<commit_message>
Fix Bug where the second time you click on a contentItem proficiency, the UI doesn't update. This was due to the mutablesubscribableglobalstore overriding the startPublishing method of its parent SubscribableGlobalStore
</commit_message>
<xml_diff>
--- a/docs/architecture.pptx
+++ b/docs/architecture.pptx
@@ -126,10 +126,6 @@
 </p:cmAuthorLst>
 </file>
 
-<file path=ppt/revisionInfo.xml><?xml version="1.0" encoding="utf-8"?>
-<p1510:revInfo xmlns:a="http://schemas.openxmlformats.org/drawingml/2006/main" xmlns:r="http://schemas.openxmlformats.org/officeDocument/2006/relationships" xmlns:p1510="http://schemas.microsoft.com/office/powerpoint/2015/10/main"/>
-</file>
-
 <file path=ppt/comments/comment1.xml><?xml version="1.0" encoding="utf-8"?>
 <p:cmLst xmlns:a="http://schemas.openxmlformats.org/drawingml/2006/main" xmlns:r="http://schemas.openxmlformats.org/officeDocument/2006/relationships" xmlns:p="http://schemas.openxmlformats.org/presentationml/2006/main">
   <p:cm authorId="1" dt="2018-01-17T12:22:15.072" idx="2">
@@ -317,7 +313,7 @@
           <a:p>
             <a:fld id="{0A05F3B5-6F50-4323-80C0-955EB0110BAC}" type="datetimeFigureOut">
               <a:rPr lang="en-US" smtClean="0"/>
-              <a:t>1/22/2018</a:t>
+              <a:t>2/18/2018</a:t>
             </a:fld>
             <a:endParaRPr lang="en-US"/>
           </a:p>
@@ -487,7 +483,7 @@
           <a:p>
             <a:fld id="{0A05F3B5-6F50-4323-80C0-955EB0110BAC}" type="datetimeFigureOut">
               <a:rPr lang="en-US" smtClean="0"/>
-              <a:t>1/22/2018</a:t>
+              <a:t>2/18/2018</a:t>
             </a:fld>
             <a:endParaRPr lang="en-US"/>
           </a:p>
@@ -667,7 +663,7 @@
           <a:p>
             <a:fld id="{0A05F3B5-6F50-4323-80C0-955EB0110BAC}" type="datetimeFigureOut">
               <a:rPr lang="en-US" smtClean="0"/>
-              <a:t>1/22/2018</a:t>
+              <a:t>2/18/2018</a:t>
             </a:fld>
             <a:endParaRPr lang="en-US"/>
           </a:p>
@@ -837,7 +833,7 @@
           <a:p>
             <a:fld id="{0A05F3B5-6F50-4323-80C0-955EB0110BAC}" type="datetimeFigureOut">
               <a:rPr lang="en-US" smtClean="0"/>
-              <a:t>1/22/2018</a:t>
+              <a:t>2/18/2018</a:t>
             </a:fld>
             <a:endParaRPr lang="en-US"/>
           </a:p>
@@ -1081,7 +1077,7 @@
           <a:p>
             <a:fld id="{0A05F3B5-6F50-4323-80C0-955EB0110BAC}" type="datetimeFigureOut">
               <a:rPr lang="en-US" smtClean="0"/>
-              <a:t>1/22/2018</a:t>
+              <a:t>2/18/2018</a:t>
             </a:fld>
             <a:endParaRPr lang="en-US"/>
           </a:p>
@@ -1313,7 +1309,7 @@
           <a:p>
             <a:fld id="{0A05F3B5-6F50-4323-80C0-955EB0110BAC}" type="datetimeFigureOut">
               <a:rPr lang="en-US" smtClean="0"/>
-              <a:t>1/22/2018</a:t>
+              <a:t>2/18/2018</a:t>
             </a:fld>
             <a:endParaRPr lang="en-US"/>
           </a:p>
@@ -1680,7 +1676,7 @@
           <a:p>
             <a:fld id="{0A05F3B5-6F50-4323-80C0-955EB0110BAC}" type="datetimeFigureOut">
               <a:rPr lang="en-US" smtClean="0"/>
-              <a:t>1/22/2018</a:t>
+              <a:t>2/18/2018</a:t>
             </a:fld>
             <a:endParaRPr lang="en-US"/>
           </a:p>
@@ -1798,7 +1794,7 @@
           <a:p>
             <a:fld id="{0A05F3B5-6F50-4323-80C0-955EB0110BAC}" type="datetimeFigureOut">
               <a:rPr lang="en-US" smtClean="0"/>
-              <a:t>1/22/2018</a:t>
+              <a:t>2/18/2018</a:t>
             </a:fld>
             <a:endParaRPr lang="en-US"/>
           </a:p>
@@ -1893,7 +1889,7 @@
           <a:p>
             <a:fld id="{0A05F3B5-6F50-4323-80C0-955EB0110BAC}" type="datetimeFigureOut">
               <a:rPr lang="en-US" smtClean="0"/>
-              <a:t>1/22/2018</a:t>
+              <a:t>2/18/2018</a:t>
             </a:fld>
             <a:endParaRPr lang="en-US"/>
           </a:p>
@@ -2170,7 +2166,7 @@
           <a:p>
             <a:fld id="{0A05F3B5-6F50-4323-80C0-955EB0110BAC}" type="datetimeFigureOut">
               <a:rPr lang="en-US" smtClean="0"/>
-              <a:t>1/22/2018</a:t>
+              <a:t>2/18/2018</a:t>
             </a:fld>
             <a:endParaRPr lang="en-US"/>
           </a:p>
@@ -2427,7 +2423,7 @@
           <a:p>
             <a:fld id="{0A05F3B5-6F50-4323-80C0-955EB0110BAC}" type="datetimeFigureOut">
               <a:rPr lang="en-US" smtClean="0"/>
-              <a:t>1/22/2018</a:t>
+              <a:t>2/18/2018</a:t>
             </a:fld>
             <a:endParaRPr lang="en-US"/>
           </a:p>
@@ -2640,7 +2636,7 @@
           <a:p>
             <a:fld id="{0A05F3B5-6F50-4323-80C0-955EB0110BAC}" type="datetimeFigureOut">
               <a:rPr lang="en-US" smtClean="0"/>
-              <a:t>1/22/2018</a:t>
+              <a:t>2/18/2018</a:t>
             </a:fld>
             <a:endParaRPr lang="en-US"/>
           </a:p>
@@ -18146,6 +18142,94 @@
           </a:fontRef>
         </p:style>
       </p:cxnSp>
+      <p:sp>
+        <p:nvSpPr>
+          <p:cNvPr id="30" name="TextBox 29">
+            <a:extLst>
+              <a:ext uri="{FF2B5EF4-FFF2-40B4-BE49-F238E27FC236}">
+                <a16:creationId xmlns:a16="http://schemas.microsoft.com/office/drawing/2014/main" id="{FACE5BB3-329C-4824-A9CE-AFB1E0DDE55A}"/>
+              </a:ext>
+            </a:extLst>
+          </p:cNvPr>
+          <p:cNvSpPr txBox="1"/>
+          <p:nvPr/>
+        </p:nvSpPr>
+        <p:spPr>
+          <a:xfrm>
+            <a:off x="16643441" y="23198559"/>
+            <a:ext cx="1245793" cy="153888"/>
+          </a:xfrm>
+          <a:prstGeom prst="rect">
+            <a:avLst/>
+          </a:prstGeom>
+          <a:noFill/>
+          <a:ln>
+            <a:solidFill>
+              <a:schemeClr val="tx1"/>
+            </a:solidFill>
+          </a:ln>
+        </p:spPr>
+        <p:txBody>
+          <a:bodyPr wrap="square" rtlCol="0">
+            <a:spAutoFit/>
+          </a:bodyPr>
+          <a:lstStyle/>
+          <a:p>
+            <a:pPr algn="ctr"/>
+            <a:r>
+              <a:rPr lang="en-US" sz="400" dirty="0" err="1"/>
+              <a:t>AutoSaveMutableSubscribableContentUserStore</a:t>
+            </a:r>
+            <a:endParaRPr lang="en-US" sz="400" dirty="0"/>
+          </a:p>
+        </p:txBody>
+      </p:sp>
+      <p:cxnSp>
+        <p:nvCxnSpPr>
+          <p:cNvPr id="33" name="Straight Arrow Connector 32">
+            <a:extLst>
+              <a:ext uri="{FF2B5EF4-FFF2-40B4-BE49-F238E27FC236}">
+                <a16:creationId xmlns:a16="http://schemas.microsoft.com/office/drawing/2014/main" id="{BB43D5F2-BCEA-4458-850A-9C424E62C8C0}"/>
+              </a:ext>
+            </a:extLst>
+          </p:cNvPr>
+          <p:cNvCxnSpPr>
+            <a:cxnSpLocks/>
+            <a:stCxn id="30" idx="0"/>
+            <a:endCxn id="13" idx="2"/>
+          </p:cNvCxnSpPr>
+          <p:nvPr/>
+        </p:nvCxnSpPr>
+        <p:spPr>
+          <a:xfrm flipV="1">
+            <a:off x="17266338" y="23009676"/>
+            <a:ext cx="1" cy="188883"/>
+          </a:xfrm>
+          <a:prstGeom prst="straightConnector1">
+            <a:avLst/>
+          </a:prstGeom>
+          <a:ln>
+            <a:solidFill>
+              <a:schemeClr val="tx1"/>
+            </a:solidFill>
+            <a:tailEnd type="triangle"/>
+          </a:ln>
+        </p:spPr>
+        <p:style>
+          <a:lnRef idx="1">
+            <a:schemeClr val="accent1"/>
+          </a:lnRef>
+          <a:fillRef idx="0">
+            <a:schemeClr val="accent1"/>
+          </a:fillRef>
+          <a:effectRef idx="0">
+            <a:schemeClr val="accent1"/>
+          </a:effectRef>
+          <a:fontRef idx="minor">
+            <a:schemeClr val="tx1"/>
+          </a:fontRef>
+        </p:style>
+      </p:cxnSp>
     </p:spTree>
     <p:extLst>
       <p:ext uri="{BB962C8B-B14F-4D97-AF65-F5344CB8AC3E}">

</xml_diff>